<commit_message>
updated imagepull secret with artifactory info
</commit_message>
<xml_diff>
--- a/kubernetes/08_administration.pptx
+++ b/kubernetes/08_administration.pptx
@@ -5,10 +5,10 @@
     <p:sldMasterId id="2147483733" r:id="rId1"/>
   </p:sldMasterIdLst>
   <p:notesMasterIdLst>
-    <p:notesMasterId r:id="rId15"/>
+    <p:notesMasterId r:id="rId16"/>
   </p:notesMasterIdLst>
   <p:handoutMasterIdLst>
-    <p:handoutMasterId r:id="rId16"/>
+    <p:handoutMasterId r:id="rId17"/>
   </p:handoutMasterIdLst>
   <p:sldIdLst>
     <p:sldId id="433" r:id="rId2"/>
@@ -18,12 +18,13 @@
     <p:sldId id="451" r:id="rId6"/>
     <p:sldId id="452" r:id="rId7"/>
     <p:sldId id="453" r:id="rId8"/>
-    <p:sldId id="446" r:id="rId9"/>
-    <p:sldId id="448" r:id="rId10"/>
-    <p:sldId id="445" r:id="rId11"/>
-    <p:sldId id="450" r:id="rId12"/>
-    <p:sldId id="449" r:id="rId13"/>
-    <p:sldId id="265" r:id="rId14"/>
+    <p:sldId id="454" r:id="rId9"/>
+    <p:sldId id="446" r:id="rId10"/>
+    <p:sldId id="448" r:id="rId11"/>
+    <p:sldId id="445" r:id="rId12"/>
+    <p:sldId id="450" r:id="rId13"/>
+    <p:sldId id="449" r:id="rId14"/>
+    <p:sldId id="265" r:id="rId15"/>
   </p:sldIdLst>
   <p:sldSz cx="12195175" cy="6858000"/>
   <p:notesSz cx="6858000" cy="9144000"/>
@@ -987,11 +988,7 @@
             </a:r>
             <a:r>
               <a:rPr lang="en-US" baseline="0" dirty="0"/>
-              <a:t>: </a:t>
-            </a:r>
-            <a:r>
-              <a:rPr lang="en-US" baseline="0" dirty="0"/>
-              <a:t>https://kubernetes.io/docs/reference/generated/kubernetes-api/v1.9/#podspec-v1-core</a:t>
+              <a:t>: https://kubernetes.io/docs/reference/generated/kubernetes-api/v1.9/#podspec-v1-core</a:t>
             </a:r>
           </a:p>
         </p:txBody>
@@ -1176,6 +1173,20 @@
           <a:bodyPr/>
           <a:lstStyle/>
           <a:p>
+            <a:r>
+              <a:rPr lang="en-US" dirty="0"/>
+              <a:t>Docker build</a:t>
+            </a:r>
+            <a:r>
+              <a:rPr lang="en-US" baseline="0" dirty="0"/>
+              <a:t> =&gt; local</a:t>
+            </a:r>
+          </a:p>
+          <a:p>
+            <a:r>
+              <a:rPr lang="en-US" baseline="0" dirty="0"/>
+              <a:t>Docker push =&gt; local to registry with authentication</a:t>
+            </a:r>
             <a:endParaRPr lang="en-US" dirty="0"/>
           </a:p>
         </p:txBody>
@@ -1196,9 +1207,94 @@
           <a:lstStyle/>
           <a:p>
             <a:fld id="{7D8C2C35-2B8A-446E-BEC0-FD36716C29AC}" type="slidenum">
+              <a:rPr lang="de-DE" smtClean="0"/>
+              <a:pPr/>
+              <a:t>8</a:t>
+            </a:fld>
+            <a:endParaRPr lang="de-DE" dirty="0"/>
+          </a:p>
+        </p:txBody>
+      </p:sp>
+    </p:spTree>
+    <p:extLst>
+      <p:ext uri="{BB962C8B-B14F-4D97-AF65-F5344CB8AC3E}">
+        <p14:creationId xmlns:p14="http://schemas.microsoft.com/office/powerpoint/2010/main" val="997705256"/>
+      </p:ext>
+    </p:extLst>
+  </p:cSld>
+  <p:clrMapOvr>
+    <a:masterClrMapping/>
+  </p:clrMapOvr>
+</p:notes>
+</file>
+
+<file path=ppt/notesSlides/notesSlide8.xml><?xml version="1.0" encoding="utf-8"?>
+<p:notes xmlns:a="http://schemas.openxmlformats.org/drawingml/2006/main" xmlns:r="http://schemas.openxmlformats.org/officeDocument/2006/relationships" xmlns:p="http://schemas.openxmlformats.org/presentationml/2006/main">
+  <p:cSld>
+    <p:spTree>
+      <p:nvGrpSpPr>
+        <p:cNvPr id="1" name=""/>
+        <p:cNvGrpSpPr/>
+        <p:nvPr/>
+      </p:nvGrpSpPr>
+      <p:grpSpPr>
+        <a:xfrm>
+          <a:off x="0" y="0"/>
+          <a:ext cx="0" cy="0"/>
+          <a:chOff x="0" y="0"/>
+          <a:chExt cx="0" cy="0"/>
+        </a:xfrm>
+      </p:grpSpPr>
+      <p:sp>
+        <p:nvSpPr>
+          <p:cNvPr id="2" name="Slide Image Placeholder 1"/>
+          <p:cNvSpPr>
+            <a:spLocks noGrp="1" noRot="1" noChangeAspect="1"/>
+          </p:cNvSpPr>
+          <p:nvPr>
+            <p:ph type="sldImg"/>
+          </p:nvPr>
+        </p:nvSpPr>
+        <p:spPr/>
+      </p:sp>
+      <p:sp>
+        <p:nvSpPr>
+          <p:cNvPr id="3" name="Notes Placeholder 2"/>
+          <p:cNvSpPr>
+            <a:spLocks noGrp="1"/>
+          </p:cNvSpPr>
+          <p:nvPr>
+            <p:ph type="body" idx="1"/>
+          </p:nvPr>
+        </p:nvSpPr>
+        <p:spPr/>
+        <p:txBody>
+          <a:bodyPr/>
+          <a:lstStyle/>
+          <a:p>
+            <a:endParaRPr lang="en-US" dirty="0"/>
+          </a:p>
+        </p:txBody>
+      </p:sp>
+      <p:sp>
+        <p:nvSpPr>
+          <p:cNvPr id="4" name="Slide Number Placeholder 3"/>
+          <p:cNvSpPr>
+            <a:spLocks noGrp="1"/>
+          </p:cNvSpPr>
+          <p:nvPr>
+            <p:ph type="sldNum" sz="quarter" idx="10"/>
+          </p:nvPr>
+        </p:nvSpPr>
+        <p:spPr/>
+        <p:txBody>
+          <a:bodyPr/>
+          <a:lstStyle/>
+          <a:p>
+            <a:fld id="{7D8C2C35-2B8A-446E-BEC0-FD36716C29AC}" type="slidenum">
               <a:rPr lang="en-US" smtClean="0"/>
               <a:pPr/>
-              <a:t>8</a:t>
+              <a:t>9</a:t>
             </a:fld>
             <a:endParaRPr lang="en-US" dirty="0"/>
           </a:p>
@@ -1217,7 +1313,7 @@
 </p:notes>
 </file>
 
-<file path=ppt/notesSlides/notesSlide8.xml><?xml version="1.0" encoding="utf-8"?>
+<file path=ppt/notesSlides/notesSlide9.xml><?xml version="1.0" encoding="utf-8"?>
 <p:notes xmlns:a="http://schemas.openxmlformats.org/drawingml/2006/main" xmlns:r="http://schemas.openxmlformats.org/officeDocument/2006/relationships" xmlns:p="http://schemas.openxmlformats.org/presentationml/2006/main">
   <p:cSld>
     <p:spTree>
@@ -1252,7 +1348,7 @@
             <a:fld id="{7D8C2C35-2B8A-446E-BEC0-FD36716C29AC}" type="slidenum">
               <a:rPr lang="en-US" smtClean="0"/>
               <a:pPr/>
-              <a:t>13</a:t>
+              <a:t>14</a:t>
             </a:fld>
             <a:endParaRPr lang="en-US" dirty="0"/>
           </a:p>
@@ -14677,6 +14773,296 @@
 </file>
 
 <file path=ppt/slides/slide10.xml><?xml version="1.0" encoding="utf-8"?>
+<p:sld xmlns:a="http://schemas.openxmlformats.org/drawingml/2006/main" xmlns:r="http://schemas.openxmlformats.org/officeDocument/2006/relationships" xmlns:p="http://schemas.openxmlformats.org/presentationml/2006/main" show="0">
+  <p:cSld>
+    <p:spTree>
+      <p:nvGrpSpPr>
+        <p:cNvPr id="1" name=""/>
+        <p:cNvGrpSpPr/>
+        <p:nvPr/>
+      </p:nvGrpSpPr>
+      <p:grpSpPr>
+        <a:xfrm>
+          <a:off x="0" y="0"/>
+          <a:ext cx="0" cy="0"/>
+          <a:chOff x="0" y="0"/>
+          <a:chExt cx="0" cy="0"/>
+        </a:xfrm>
+      </p:grpSpPr>
+      <p:sp>
+        <p:nvSpPr>
+          <p:cNvPr id="4" name="Text Placeholder 3"/>
+          <p:cNvSpPr>
+            <a:spLocks noGrp="1"/>
+          </p:cNvSpPr>
+          <p:nvPr>
+            <p:ph type="body" sz="quarter" idx="10"/>
+          </p:nvPr>
+        </p:nvSpPr>
+        <p:spPr>
+          <a:xfrm>
+            <a:off x="504000" y="1110343"/>
+            <a:ext cx="11185200" cy="4266129"/>
+          </a:xfrm>
+        </p:spPr>
+        <p:txBody>
+          <a:bodyPr/>
+          <a:lstStyle/>
+          <a:p>
+            <a:pPr marL="342900" indent="-342900">
+              <a:buFontTx/>
+              <a:buChar char="-"/>
+            </a:pPr>
+            <a:r>
+              <a:rPr lang="en-US" dirty="0"/>
+              <a:t>Create a network policy</a:t>
+            </a:r>
+          </a:p>
+          <a:p>
+            <a:r>
+              <a:rPr lang="de-DE" dirty="0" err="1"/>
+              <a:t>kubectl</a:t>
+            </a:r>
+            <a:r>
+              <a:rPr lang="de-DE" dirty="0"/>
+              <a:t> </a:t>
+            </a:r>
+            <a:r>
+              <a:rPr lang="de-DE" dirty="0" err="1"/>
+              <a:t>run</a:t>
+            </a:r>
+            <a:r>
+              <a:rPr lang="de-DE" dirty="0"/>
+              <a:t> </a:t>
+            </a:r>
+            <a:r>
+              <a:rPr lang="de-DE" dirty="0" err="1"/>
+              <a:t>nginx</a:t>
+            </a:r>
+            <a:r>
+              <a:rPr lang="de-DE" dirty="0"/>
+              <a:t> --image</a:t>
+            </a:r>
+            <a:r>
+              <a:rPr lang="de-DE" b="1" dirty="0"/>
+              <a:t>=</a:t>
+            </a:r>
+            <a:r>
+              <a:rPr lang="de-DE" dirty="0" err="1"/>
+              <a:t>nginx</a:t>
+            </a:r>
+            <a:r>
+              <a:rPr lang="de-DE" dirty="0"/>
+              <a:t> --</a:t>
+            </a:r>
+            <a:r>
+              <a:rPr lang="de-DE" dirty="0" err="1"/>
+              <a:t>replicas</a:t>
+            </a:r>
+            <a:r>
+              <a:rPr lang="de-DE" b="1" dirty="0"/>
+              <a:t>=</a:t>
+            </a:r>
+            <a:r>
+              <a:rPr lang="de-DE" dirty="0"/>
+              <a:t>2 </a:t>
+            </a:r>
+          </a:p>
+          <a:p>
+            <a:r>
+              <a:rPr lang="de-DE" dirty="0" err="1"/>
+              <a:t>kubectl</a:t>
+            </a:r>
+            <a:r>
+              <a:rPr lang="de-DE" dirty="0"/>
+              <a:t> </a:t>
+            </a:r>
+            <a:r>
+              <a:rPr lang="de-DE" dirty="0" err="1"/>
+              <a:t>expose</a:t>
+            </a:r>
+            <a:r>
+              <a:rPr lang="de-DE" dirty="0"/>
+              <a:t> </a:t>
+            </a:r>
+            <a:r>
+              <a:rPr lang="de-DE" dirty="0" err="1"/>
+              <a:t>deployment</a:t>
+            </a:r>
+            <a:r>
+              <a:rPr lang="de-DE" dirty="0"/>
+              <a:t> </a:t>
+            </a:r>
+            <a:r>
+              <a:rPr lang="de-DE" dirty="0" err="1"/>
+              <a:t>nginx</a:t>
+            </a:r>
+            <a:r>
+              <a:rPr lang="de-DE" dirty="0"/>
+              <a:t> --</a:t>
+            </a:r>
+            <a:r>
+              <a:rPr lang="de-DE" dirty="0" err="1"/>
+              <a:t>port</a:t>
+            </a:r>
+            <a:r>
+              <a:rPr lang="de-DE" b="1" dirty="0"/>
+              <a:t>=</a:t>
+            </a:r>
+            <a:r>
+              <a:rPr lang="de-DE" dirty="0"/>
+              <a:t>80</a:t>
+            </a:r>
+          </a:p>
+          <a:p>
+            <a:r>
+              <a:rPr lang="de-DE" dirty="0" err="1"/>
+              <a:t>kubectl</a:t>
+            </a:r>
+            <a:r>
+              <a:rPr lang="de-DE" dirty="0"/>
+              <a:t> </a:t>
+            </a:r>
+            <a:r>
+              <a:rPr lang="de-DE" dirty="0" err="1"/>
+              <a:t>run</a:t>
+            </a:r>
+            <a:r>
+              <a:rPr lang="de-DE" dirty="0"/>
+              <a:t> </a:t>
+            </a:r>
+            <a:r>
+              <a:rPr lang="de-DE" dirty="0" err="1"/>
+              <a:t>busybox</a:t>
+            </a:r>
+            <a:r>
+              <a:rPr lang="de-DE" dirty="0"/>
+              <a:t> --</a:t>
+            </a:r>
+            <a:r>
+              <a:rPr lang="de-DE" dirty="0" err="1"/>
+              <a:t>rm</a:t>
+            </a:r>
+            <a:r>
+              <a:rPr lang="de-DE" dirty="0"/>
+              <a:t> -</a:t>
+            </a:r>
+            <a:r>
+              <a:rPr lang="de-DE" dirty="0" err="1"/>
+              <a:t>ti</a:t>
+            </a:r>
+            <a:r>
+              <a:rPr lang="de-DE" dirty="0"/>
+              <a:t> --image</a:t>
+            </a:r>
+            <a:r>
+              <a:rPr lang="de-DE" b="1" dirty="0"/>
+              <a:t>=</a:t>
+            </a:r>
+            <a:r>
+              <a:rPr lang="de-DE" dirty="0" err="1"/>
+              <a:t>busybox</a:t>
+            </a:r>
+            <a:r>
+              <a:rPr lang="de-DE" dirty="0"/>
+              <a:t> /bin/sh</a:t>
+            </a:r>
+          </a:p>
+          <a:p>
+            <a:r>
+              <a:rPr lang="de-DE" dirty="0"/>
+              <a:t> # </a:t>
+            </a:r>
+            <a:r>
+              <a:rPr lang="de-DE" dirty="0" err="1"/>
+              <a:t>wget</a:t>
+            </a:r>
+            <a:r>
+              <a:rPr lang="de-DE" dirty="0"/>
+              <a:t> --spider --timeout=1 </a:t>
+            </a:r>
+            <a:r>
+              <a:rPr lang="de-DE" dirty="0" err="1"/>
+              <a:t>nginx</a:t>
+            </a:r>
+            <a:endParaRPr lang="en-US" dirty="0"/>
+          </a:p>
+          <a:p>
+            <a:r>
+              <a:rPr lang="en-US" dirty="0" err="1"/>
+              <a:t>Kubectl</a:t>
+            </a:r>
+            <a:r>
+              <a:rPr lang="en-US" dirty="0"/>
+              <a:t> create –f network-</a:t>
+            </a:r>
+            <a:r>
+              <a:rPr lang="en-US" dirty="0" err="1"/>
+              <a:t>policy.yaml</a:t>
+            </a:r>
+            <a:endParaRPr lang="en-US" dirty="0"/>
+          </a:p>
+          <a:p>
+            <a:r>
+              <a:rPr lang="en-US" dirty="0" err="1"/>
+              <a:t>Kubectl</a:t>
+            </a:r>
+            <a:r>
+              <a:rPr lang="en-US" dirty="0"/>
+              <a:t> run ..</a:t>
+            </a:r>
+          </a:p>
+          <a:p>
+            <a:r>
+              <a:rPr lang="en-US" dirty="0" err="1"/>
+              <a:t>Kubectl</a:t>
+            </a:r>
+            <a:r>
+              <a:rPr lang="en-US" dirty="0"/>
+              <a:t> run … -l access=true</a:t>
+            </a:r>
+          </a:p>
+          <a:p>
+            <a:endParaRPr lang="en-US" dirty="0"/>
+          </a:p>
+        </p:txBody>
+      </p:sp>
+      <p:sp>
+        <p:nvSpPr>
+          <p:cNvPr id="3" name="Title 2"/>
+          <p:cNvSpPr>
+            <a:spLocks noGrp="1"/>
+          </p:cNvSpPr>
+          <p:nvPr>
+            <p:ph type="title"/>
+          </p:nvPr>
+        </p:nvSpPr>
+        <p:spPr/>
+        <p:txBody>
+          <a:bodyPr/>
+          <a:lstStyle/>
+          <a:p>
+            <a:r>
+              <a:rPr lang="en-US" dirty="0"/>
+              <a:t>Demo</a:t>
+            </a:r>
+          </a:p>
+        </p:txBody>
+      </p:sp>
+    </p:spTree>
+    <p:extLst>
+      <p:ext uri="{BB962C8B-B14F-4D97-AF65-F5344CB8AC3E}">
+        <p14:creationId xmlns:p14="http://schemas.microsoft.com/office/powerpoint/2010/main" val="1163760557"/>
+      </p:ext>
+    </p:extLst>
+  </p:cSld>
+  <p:clrMapOvr>
+    <a:masterClrMapping/>
+  </p:clrMapOvr>
+</p:sld>
+</file>
+
+<file path=ppt/slides/slide11.xml><?xml version="1.0" encoding="utf-8"?>
 <p:sld xmlns:a="http://schemas.openxmlformats.org/drawingml/2006/main" xmlns:r="http://schemas.openxmlformats.org/officeDocument/2006/relationships" xmlns:p="http://schemas.openxmlformats.org/presentationml/2006/main">
   <p:cSld>
     <p:spTree>
@@ -15896,7 +16282,7 @@
 </p:sld>
 </file>
 
-<file path=ppt/slides/slide11.xml><?xml version="1.0" encoding="utf-8"?>
+<file path=ppt/slides/slide12.xml><?xml version="1.0" encoding="utf-8"?>
 <p:sld xmlns:a="http://schemas.openxmlformats.org/drawingml/2006/main" xmlns:r="http://schemas.openxmlformats.org/officeDocument/2006/relationships" xmlns:p="http://schemas.openxmlformats.org/presentationml/2006/main">
   <p:cSld>
     <p:spTree>
@@ -17001,7 +17387,7 @@
 </p:sld>
 </file>
 
-<file path=ppt/slides/slide12.xml><?xml version="1.0" encoding="utf-8"?>
+<file path=ppt/slides/slide13.xml><?xml version="1.0" encoding="utf-8"?>
 <p:sld xmlns:a="http://schemas.openxmlformats.org/drawingml/2006/main" xmlns:r="http://schemas.openxmlformats.org/officeDocument/2006/relationships" xmlns:p="http://schemas.openxmlformats.org/presentationml/2006/main">
   <p:cSld>
     <p:spTree>
@@ -17573,7 +17959,7 @@
 </p:sld>
 </file>
 
-<file path=ppt/slides/slide13.xml><?xml version="1.0" encoding="utf-8"?>
+<file path=ppt/slides/slide14.xml><?xml version="1.0" encoding="utf-8"?>
 <p:sld xmlns:a="http://schemas.openxmlformats.org/drawingml/2006/main" xmlns:r="http://schemas.openxmlformats.org/officeDocument/2006/relationships" xmlns:p="http://schemas.openxmlformats.org/presentationml/2006/main" show="0">
   <p:cSld>
     <p:spTree>
@@ -21082,6 +21468,823 @@
       </p:grpSpPr>
       <p:sp>
         <p:nvSpPr>
+          <p:cNvPr id="36" name="Rectangle 35"/>
+          <p:cNvSpPr/>
+          <p:nvPr/>
+        </p:nvSpPr>
+        <p:spPr>
+          <a:xfrm>
+            <a:off x="2791326" y="1091288"/>
+            <a:ext cx="6280485" cy="1892541"/>
+          </a:xfrm>
+          <a:prstGeom prst="rect">
+            <a:avLst/>
+          </a:prstGeom>
+        </p:spPr>
+        <p:style>
+          <a:lnRef idx="2">
+            <a:schemeClr val="accent2"/>
+          </a:lnRef>
+          <a:fillRef idx="1">
+            <a:schemeClr val="lt1"/>
+          </a:fillRef>
+          <a:effectRef idx="0">
+            <a:schemeClr val="accent2"/>
+          </a:effectRef>
+          <a:fontRef idx="minor">
+            <a:schemeClr val="dk1"/>
+          </a:fontRef>
+        </p:style>
+        <p:txBody>
+          <a:bodyPr rtlCol="0" anchor="t"/>
+          <a:lstStyle/>
+          <a:p>
+            <a:pPr algn="ctr"/>
+            <a:r>
+              <a:rPr lang="en-US" sz="2000" b="1" dirty="0">
+                <a:solidFill>
+                  <a:sysClr val="windowText" lastClr="000000"/>
+                </a:solidFill>
+              </a:rPr>
+              <a:t>Corporate Network</a:t>
+            </a:r>
+          </a:p>
+        </p:txBody>
+      </p:sp>
+      <p:sp>
+        <p:nvSpPr>
+          <p:cNvPr id="3" name="Title 2"/>
+          <p:cNvSpPr>
+            <a:spLocks noGrp="1"/>
+          </p:cNvSpPr>
+          <p:nvPr>
+            <p:ph type="title"/>
+          </p:nvPr>
+        </p:nvSpPr>
+        <p:spPr/>
+        <p:txBody>
+          <a:bodyPr/>
+          <a:lstStyle/>
+          <a:p>
+            <a:r>
+              <a:rPr lang="en-US" dirty="0"/>
+              <a:t>Image Pull Secret together with </a:t>
+            </a:r>
+            <a:r>
+              <a:rPr lang="en-US" dirty="0" err="1"/>
+              <a:t>Artifactory</a:t>
+            </a:r>
+            <a:endParaRPr lang="en-US" dirty="0"/>
+          </a:p>
+        </p:txBody>
+      </p:sp>
+      <p:sp>
+        <p:nvSpPr>
+          <p:cNvPr id="28" name="Rectangle 27"/>
+          <p:cNvSpPr/>
+          <p:nvPr/>
+        </p:nvSpPr>
+        <p:spPr>
+          <a:xfrm>
+            <a:off x="3151414" y="3475687"/>
+            <a:ext cx="5649685" cy="949353"/>
+          </a:xfrm>
+          <a:prstGeom prst="rect">
+            <a:avLst/>
+          </a:prstGeom>
+        </p:spPr>
+        <p:style>
+          <a:lnRef idx="2">
+            <a:schemeClr val="accent1">
+              <a:shade val="50000"/>
+            </a:schemeClr>
+          </a:lnRef>
+          <a:fillRef idx="1">
+            <a:schemeClr val="accent1"/>
+          </a:fillRef>
+          <a:effectRef idx="0">
+            <a:schemeClr val="accent1"/>
+          </a:effectRef>
+          <a:fontRef idx="minor">
+            <a:schemeClr val="lt1"/>
+          </a:fontRef>
+        </p:style>
+        <p:txBody>
+          <a:bodyPr rtlCol="0" anchor="ctr"/>
+          <a:lstStyle/>
+          <a:p>
+            <a:pPr algn="ctr"/>
+            <a:r>
+              <a:rPr lang="en-US" sz="2000" b="1" dirty="0"/>
+              <a:t>DMZ </a:t>
+            </a:r>
+            <a:r>
+              <a:rPr lang="en-US" sz="2000" b="1" dirty="0" err="1"/>
+              <a:t>Artifactory</a:t>
+            </a:r>
+            <a:endParaRPr lang="en-US" sz="2000" b="1" dirty="0"/>
+          </a:p>
+          <a:p>
+            <a:pPr algn="ctr"/>
+            <a:r>
+              <a:rPr lang="en-US" sz="2000" b="1" dirty="0"/>
+              <a:t>Repository “test”</a:t>
+            </a:r>
+          </a:p>
+        </p:txBody>
+      </p:sp>
+      <p:sp>
+        <p:nvSpPr>
+          <p:cNvPr id="31" name="Rectangle 30"/>
+          <p:cNvSpPr/>
+          <p:nvPr/>
+        </p:nvSpPr>
+        <p:spPr>
+          <a:xfrm>
+            <a:off x="6236046" y="1564816"/>
+            <a:ext cx="2050884" cy="524899"/>
+          </a:xfrm>
+          <a:prstGeom prst="rect">
+            <a:avLst/>
+          </a:prstGeom>
+        </p:spPr>
+        <p:style>
+          <a:lnRef idx="1">
+            <a:schemeClr val="accent2"/>
+          </a:lnRef>
+          <a:fillRef idx="2">
+            <a:schemeClr val="accent2"/>
+          </a:fillRef>
+          <a:effectRef idx="1">
+            <a:schemeClr val="accent2"/>
+          </a:effectRef>
+          <a:fontRef idx="minor">
+            <a:schemeClr val="dk1"/>
+          </a:fontRef>
+        </p:style>
+        <p:txBody>
+          <a:bodyPr rtlCol="0" anchor="ctr"/>
+          <a:lstStyle/>
+          <a:p>
+            <a:pPr algn="ctr"/>
+            <a:r>
+              <a:rPr lang="en-US" dirty="0">
+                <a:solidFill>
+                  <a:schemeClr val="dk1"/>
+                </a:solidFill>
+              </a:rPr>
+              <a:t>Docker build</a:t>
+            </a:r>
+          </a:p>
+        </p:txBody>
+      </p:sp>
+      <p:cxnSp>
+        <p:nvCxnSpPr>
+          <p:cNvPr id="32" name="Straight Arrow Connector 31"/>
+          <p:cNvCxnSpPr>
+            <a:stCxn id="49" idx="2"/>
+            <a:endCxn id="28" idx="0"/>
+          </p:cNvCxnSpPr>
+          <p:nvPr/>
+        </p:nvCxnSpPr>
+        <p:spPr>
+          <a:xfrm>
+            <a:off x="4513686" y="2089714"/>
+            <a:ext cx="1462571" cy="1385973"/>
+          </a:xfrm>
+          <a:prstGeom prst="straightConnector1">
+            <a:avLst/>
+          </a:prstGeom>
+          <a:ln w="57150">
+            <a:solidFill>
+              <a:schemeClr val="tx2"/>
+            </a:solidFill>
+            <a:tailEnd type="triangle"/>
+          </a:ln>
+        </p:spPr>
+        <p:style>
+          <a:lnRef idx="1">
+            <a:schemeClr val="accent1"/>
+          </a:lnRef>
+          <a:fillRef idx="0">
+            <a:schemeClr val="accent1"/>
+          </a:fillRef>
+          <a:effectRef idx="0">
+            <a:schemeClr val="accent1"/>
+          </a:effectRef>
+          <a:fontRef idx="minor">
+            <a:schemeClr val="tx1"/>
+          </a:fontRef>
+        </p:style>
+      </p:cxnSp>
+      <p:cxnSp>
+        <p:nvCxnSpPr>
+          <p:cNvPr id="33" name="Straight Arrow Connector 32"/>
+          <p:cNvCxnSpPr>
+            <a:stCxn id="31" idx="2"/>
+            <a:endCxn id="28" idx="0"/>
+          </p:cNvCxnSpPr>
+          <p:nvPr/>
+        </p:nvCxnSpPr>
+        <p:spPr>
+          <a:xfrm flipH="1">
+            <a:off x="5976257" y="2089715"/>
+            <a:ext cx="1285231" cy="1385972"/>
+          </a:xfrm>
+          <a:prstGeom prst="straightConnector1">
+            <a:avLst/>
+          </a:prstGeom>
+          <a:ln w="57150">
+            <a:solidFill>
+              <a:schemeClr val="tx2"/>
+            </a:solidFill>
+            <a:tailEnd type="triangle"/>
+          </a:ln>
+        </p:spPr>
+        <p:style>
+          <a:lnRef idx="1">
+            <a:schemeClr val="accent1"/>
+          </a:lnRef>
+          <a:fillRef idx="0">
+            <a:schemeClr val="accent1"/>
+          </a:fillRef>
+          <a:effectRef idx="0">
+            <a:schemeClr val="accent1"/>
+          </a:effectRef>
+          <a:fontRef idx="minor">
+            <a:schemeClr val="tx1"/>
+          </a:fontRef>
+        </p:style>
+      </p:cxnSp>
+      <p:sp>
+        <p:nvSpPr>
+          <p:cNvPr id="35" name="Rectangle 34"/>
+          <p:cNvSpPr/>
+          <p:nvPr/>
+        </p:nvSpPr>
+        <p:spPr>
+          <a:xfrm>
+            <a:off x="4153723" y="2394231"/>
+            <a:ext cx="3555690" cy="360947"/>
+          </a:xfrm>
+          <a:prstGeom prst="rect">
+            <a:avLst/>
+          </a:prstGeom>
+        </p:spPr>
+        <p:style>
+          <a:lnRef idx="1">
+            <a:schemeClr val="accent2"/>
+          </a:lnRef>
+          <a:fillRef idx="2">
+            <a:schemeClr val="accent2"/>
+          </a:fillRef>
+          <a:effectRef idx="1">
+            <a:schemeClr val="accent2"/>
+          </a:effectRef>
+          <a:fontRef idx="minor">
+            <a:schemeClr val="dk1"/>
+          </a:fontRef>
+        </p:style>
+        <p:txBody>
+          <a:bodyPr rtlCol="0" anchor="ctr"/>
+          <a:lstStyle/>
+          <a:p>
+            <a:pPr algn="ctr"/>
+            <a:r>
+              <a:rPr lang="en-US" dirty="0"/>
+              <a:t>Docker push</a:t>
+            </a:r>
+          </a:p>
+        </p:txBody>
+      </p:sp>
+      <p:sp>
+        <p:nvSpPr>
+          <p:cNvPr id="49" name="Rectangle 48"/>
+          <p:cNvSpPr/>
+          <p:nvPr/>
+        </p:nvSpPr>
+        <p:spPr>
+          <a:xfrm>
+            <a:off x="3488244" y="1564815"/>
+            <a:ext cx="2050884" cy="524899"/>
+          </a:xfrm>
+          <a:prstGeom prst="rect">
+            <a:avLst/>
+          </a:prstGeom>
+        </p:spPr>
+        <p:style>
+          <a:lnRef idx="1">
+            <a:schemeClr val="accent2"/>
+          </a:lnRef>
+          <a:fillRef idx="2">
+            <a:schemeClr val="accent2"/>
+          </a:fillRef>
+          <a:effectRef idx="1">
+            <a:schemeClr val="accent2"/>
+          </a:effectRef>
+          <a:fontRef idx="minor">
+            <a:schemeClr val="dk1"/>
+          </a:fontRef>
+        </p:style>
+        <p:txBody>
+          <a:bodyPr rtlCol="0" anchor="ctr"/>
+          <a:lstStyle/>
+          <a:p>
+            <a:pPr algn="ctr"/>
+            <a:r>
+              <a:rPr lang="en-US" dirty="0">
+                <a:solidFill>
+                  <a:schemeClr val="dk1"/>
+                </a:solidFill>
+              </a:rPr>
+              <a:t>Docker build</a:t>
+            </a:r>
+          </a:p>
+        </p:txBody>
+      </p:sp>
+      <p:sp>
+        <p:nvSpPr>
+          <p:cNvPr id="54" name="Rectangle 53"/>
+          <p:cNvSpPr/>
+          <p:nvPr/>
+        </p:nvSpPr>
+        <p:spPr>
+          <a:xfrm>
+            <a:off x="6376307" y="5549421"/>
+            <a:ext cx="2326571" cy="834190"/>
+          </a:xfrm>
+          <a:prstGeom prst="rect">
+            <a:avLst/>
+          </a:prstGeom>
+        </p:spPr>
+        <p:style>
+          <a:lnRef idx="1">
+            <a:schemeClr val="accent2"/>
+          </a:lnRef>
+          <a:fillRef idx="2">
+            <a:schemeClr val="accent2"/>
+          </a:fillRef>
+          <a:effectRef idx="1">
+            <a:schemeClr val="accent2"/>
+          </a:effectRef>
+          <a:fontRef idx="minor">
+            <a:schemeClr val="dk1"/>
+          </a:fontRef>
+        </p:style>
+        <p:txBody>
+          <a:bodyPr rtlCol="0" anchor="ctr"/>
+          <a:lstStyle/>
+          <a:p>
+            <a:pPr algn="ctr"/>
+            <a:r>
+              <a:rPr lang="en-US" dirty="0"/>
+              <a:t>K8s @Azure</a:t>
+            </a:r>
+          </a:p>
+        </p:txBody>
+      </p:sp>
+      <p:sp>
+        <p:nvSpPr>
+          <p:cNvPr id="55" name="Rectangle: Folded Corner 54"/>
+          <p:cNvSpPr/>
+          <p:nvPr/>
+        </p:nvSpPr>
+        <p:spPr>
+          <a:xfrm>
+            <a:off x="8329897" y="5284725"/>
+            <a:ext cx="1227221" cy="525385"/>
+          </a:xfrm>
+          <a:prstGeom prst="foldedCorner">
+            <a:avLst/>
+          </a:prstGeom>
+        </p:spPr>
+        <p:style>
+          <a:lnRef idx="2">
+            <a:schemeClr val="accent2">
+              <a:shade val="50000"/>
+            </a:schemeClr>
+          </a:lnRef>
+          <a:fillRef idx="1">
+            <a:schemeClr val="accent2"/>
+          </a:fillRef>
+          <a:effectRef idx="0">
+            <a:schemeClr val="accent2"/>
+          </a:effectRef>
+          <a:fontRef idx="minor">
+            <a:schemeClr val="lt1"/>
+          </a:fontRef>
+        </p:style>
+        <p:txBody>
+          <a:bodyPr rtlCol="0" anchor="ctr"/>
+          <a:lstStyle/>
+          <a:p>
+            <a:pPr algn="ctr"/>
+            <a:r>
+              <a:rPr lang="en-US" sz="1600" dirty="0"/>
+              <a:t>Image Pull Secret</a:t>
+            </a:r>
+          </a:p>
+        </p:txBody>
+      </p:sp>
+      <p:sp>
+        <p:nvSpPr>
+          <p:cNvPr id="56" name="Oval 55"/>
+          <p:cNvSpPr/>
+          <p:nvPr/>
+        </p:nvSpPr>
+        <p:spPr>
+          <a:xfrm>
+            <a:off x="8606626" y="5709852"/>
+            <a:ext cx="192505" cy="200526"/>
+          </a:xfrm>
+          <a:prstGeom prst="ellipse">
+            <a:avLst/>
+          </a:prstGeom>
+        </p:spPr>
+        <p:style>
+          <a:lnRef idx="2">
+            <a:schemeClr val="accent2">
+              <a:shade val="50000"/>
+            </a:schemeClr>
+          </a:lnRef>
+          <a:fillRef idx="1">
+            <a:schemeClr val="accent2"/>
+          </a:fillRef>
+          <a:effectRef idx="0">
+            <a:schemeClr val="accent2"/>
+          </a:effectRef>
+          <a:fontRef idx="minor">
+            <a:schemeClr val="lt1"/>
+          </a:fontRef>
+        </p:style>
+        <p:txBody>
+          <a:bodyPr rtlCol="0" anchor="ctr"/>
+          <a:lstStyle/>
+          <a:p>
+            <a:pPr algn="ctr"/>
+            <a:endParaRPr lang="en-US"/>
+          </a:p>
+        </p:txBody>
+      </p:sp>
+      <p:sp>
+        <p:nvSpPr>
+          <p:cNvPr id="57" name="Flowchart: Delay 56"/>
+          <p:cNvSpPr/>
+          <p:nvPr/>
+        </p:nvSpPr>
+        <p:spPr>
+          <a:xfrm rot="16200000">
+            <a:off x="8570527" y="5942457"/>
+            <a:ext cx="264702" cy="264698"/>
+          </a:xfrm>
+          <a:prstGeom prst="flowChartDelay">
+            <a:avLst/>
+          </a:prstGeom>
+        </p:spPr>
+        <p:style>
+          <a:lnRef idx="2">
+            <a:schemeClr val="accent2">
+              <a:shade val="50000"/>
+            </a:schemeClr>
+          </a:lnRef>
+          <a:fillRef idx="1">
+            <a:schemeClr val="accent2"/>
+          </a:fillRef>
+          <a:effectRef idx="0">
+            <a:schemeClr val="accent2"/>
+          </a:effectRef>
+          <a:fontRef idx="minor">
+            <a:schemeClr val="lt1"/>
+          </a:fontRef>
+        </p:style>
+        <p:txBody>
+          <a:bodyPr rtlCol="0" anchor="ctr"/>
+          <a:lstStyle/>
+          <a:p>
+            <a:pPr algn="ctr"/>
+            <a:endParaRPr lang="en-US"/>
+          </a:p>
+        </p:txBody>
+      </p:sp>
+      <p:sp>
+        <p:nvSpPr>
+          <p:cNvPr id="58" name="Rectangle 57"/>
+          <p:cNvSpPr/>
+          <p:nvPr/>
+        </p:nvSpPr>
+        <p:spPr>
+          <a:xfrm>
+            <a:off x="2461570" y="5549421"/>
+            <a:ext cx="2326571" cy="834190"/>
+          </a:xfrm>
+          <a:prstGeom prst="rect">
+            <a:avLst/>
+          </a:prstGeom>
+        </p:spPr>
+        <p:style>
+          <a:lnRef idx="1">
+            <a:schemeClr val="accent2"/>
+          </a:lnRef>
+          <a:fillRef idx="2">
+            <a:schemeClr val="accent2"/>
+          </a:fillRef>
+          <a:effectRef idx="1">
+            <a:schemeClr val="accent2"/>
+          </a:effectRef>
+          <a:fontRef idx="minor">
+            <a:schemeClr val="dk1"/>
+          </a:fontRef>
+        </p:style>
+        <p:txBody>
+          <a:bodyPr rtlCol="0" anchor="ctr"/>
+          <a:lstStyle/>
+          <a:p>
+            <a:pPr algn="ctr"/>
+            <a:r>
+              <a:rPr lang="en-US" dirty="0"/>
+              <a:t>K8s @GCP</a:t>
+            </a:r>
+          </a:p>
+        </p:txBody>
+      </p:sp>
+      <p:sp>
+        <p:nvSpPr>
+          <p:cNvPr id="59" name="Rectangle: Folded Corner 58"/>
+          <p:cNvSpPr/>
+          <p:nvPr/>
+        </p:nvSpPr>
+        <p:spPr>
+          <a:xfrm>
+            <a:off x="4415160" y="5284725"/>
+            <a:ext cx="1227221" cy="525385"/>
+          </a:xfrm>
+          <a:prstGeom prst="foldedCorner">
+            <a:avLst/>
+          </a:prstGeom>
+        </p:spPr>
+        <p:style>
+          <a:lnRef idx="2">
+            <a:schemeClr val="accent2">
+              <a:shade val="50000"/>
+            </a:schemeClr>
+          </a:lnRef>
+          <a:fillRef idx="1">
+            <a:schemeClr val="accent2"/>
+          </a:fillRef>
+          <a:effectRef idx="0">
+            <a:schemeClr val="accent2"/>
+          </a:effectRef>
+          <a:fontRef idx="minor">
+            <a:schemeClr val="lt1"/>
+          </a:fontRef>
+        </p:style>
+        <p:txBody>
+          <a:bodyPr rtlCol="0" anchor="ctr"/>
+          <a:lstStyle/>
+          <a:p>
+            <a:pPr algn="ctr"/>
+            <a:r>
+              <a:rPr lang="en-US" sz="1600" dirty="0"/>
+              <a:t>Image Pull Secret</a:t>
+            </a:r>
+          </a:p>
+        </p:txBody>
+      </p:sp>
+      <p:sp>
+        <p:nvSpPr>
+          <p:cNvPr id="60" name="Oval 59"/>
+          <p:cNvSpPr/>
+          <p:nvPr/>
+        </p:nvSpPr>
+        <p:spPr>
+          <a:xfrm>
+            <a:off x="4691889" y="5709852"/>
+            <a:ext cx="192505" cy="200526"/>
+          </a:xfrm>
+          <a:prstGeom prst="ellipse">
+            <a:avLst/>
+          </a:prstGeom>
+        </p:spPr>
+        <p:style>
+          <a:lnRef idx="2">
+            <a:schemeClr val="accent2">
+              <a:shade val="50000"/>
+            </a:schemeClr>
+          </a:lnRef>
+          <a:fillRef idx="1">
+            <a:schemeClr val="accent2"/>
+          </a:fillRef>
+          <a:effectRef idx="0">
+            <a:schemeClr val="accent2"/>
+          </a:effectRef>
+          <a:fontRef idx="minor">
+            <a:schemeClr val="lt1"/>
+          </a:fontRef>
+        </p:style>
+        <p:txBody>
+          <a:bodyPr rtlCol="0" anchor="ctr"/>
+          <a:lstStyle/>
+          <a:p>
+            <a:pPr algn="ctr"/>
+            <a:endParaRPr lang="en-US"/>
+          </a:p>
+        </p:txBody>
+      </p:sp>
+      <p:sp>
+        <p:nvSpPr>
+          <p:cNvPr id="61" name="Flowchart: Delay 60"/>
+          <p:cNvSpPr/>
+          <p:nvPr/>
+        </p:nvSpPr>
+        <p:spPr>
+          <a:xfrm rot="16200000">
+            <a:off x="4655790" y="5942457"/>
+            <a:ext cx="264702" cy="264698"/>
+          </a:xfrm>
+          <a:prstGeom prst="flowChartDelay">
+            <a:avLst/>
+          </a:prstGeom>
+        </p:spPr>
+        <p:style>
+          <a:lnRef idx="2">
+            <a:schemeClr val="accent2">
+              <a:shade val="50000"/>
+            </a:schemeClr>
+          </a:lnRef>
+          <a:fillRef idx="1">
+            <a:schemeClr val="accent2"/>
+          </a:fillRef>
+          <a:effectRef idx="0">
+            <a:schemeClr val="accent2"/>
+          </a:effectRef>
+          <a:fontRef idx="minor">
+            <a:schemeClr val="lt1"/>
+          </a:fontRef>
+        </p:style>
+        <p:txBody>
+          <a:bodyPr rtlCol="0" anchor="ctr"/>
+          <a:lstStyle/>
+          <a:p>
+            <a:pPr algn="ctr"/>
+            <a:endParaRPr lang="en-US"/>
+          </a:p>
+        </p:txBody>
+      </p:sp>
+      <p:cxnSp>
+        <p:nvCxnSpPr>
+          <p:cNvPr id="62" name="Straight Arrow Connector 61"/>
+          <p:cNvCxnSpPr>
+            <a:stCxn id="28" idx="2"/>
+            <a:endCxn id="58" idx="0"/>
+          </p:cNvCxnSpPr>
+          <p:nvPr/>
+        </p:nvCxnSpPr>
+        <p:spPr>
+          <a:xfrm flipH="1">
+            <a:off x="3624856" y="4425040"/>
+            <a:ext cx="2351401" cy="1124381"/>
+          </a:xfrm>
+          <a:prstGeom prst="straightConnector1">
+            <a:avLst/>
+          </a:prstGeom>
+          <a:ln w="57150">
+            <a:solidFill>
+              <a:schemeClr val="tx2"/>
+            </a:solidFill>
+            <a:tailEnd type="triangle"/>
+          </a:ln>
+        </p:spPr>
+        <p:style>
+          <a:lnRef idx="1">
+            <a:schemeClr val="accent1"/>
+          </a:lnRef>
+          <a:fillRef idx="0">
+            <a:schemeClr val="accent1"/>
+          </a:fillRef>
+          <a:effectRef idx="0">
+            <a:schemeClr val="accent1"/>
+          </a:effectRef>
+          <a:fontRef idx="minor">
+            <a:schemeClr val="tx1"/>
+          </a:fontRef>
+        </p:style>
+      </p:cxnSp>
+      <p:cxnSp>
+        <p:nvCxnSpPr>
+          <p:cNvPr id="65" name="Straight Arrow Connector 64"/>
+          <p:cNvCxnSpPr>
+            <a:stCxn id="28" idx="2"/>
+            <a:endCxn id="54" idx="0"/>
+          </p:cNvCxnSpPr>
+          <p:nvPr/>
+        </p:nvCxnSpPr>
+        <p:spPr>
+          <a:xfrm>
+            <a:off x="5976257" y="4425040"/>
+            <a:ext cx="1563336" cy="1124381"/>
+          </a:xfrm>
+          <a:prstGeom prst="straightConnector1">
+            <a:avLst/>
+          </a:prstGeom>
+          <a:ln w="57150">
+            <a:solidFill>
+              <a:schemeClr val="tx2"/>
+            </a:solidFill>
+            <a:tailEnd type="triangle"/>
+          </a:ln>
+        </p:spPr>
+        <p:style>
+          <a:lnRef idx="1">
+            <a:schemeClr val="accent1"/>
+          </a:lnRef>
+          <a:fillRef idx="0">
+            <a:schemeClr val="accent1"/>
+          </a:fillRef>
+          <a:effectRef idx="0">
+            <a:schemeClr val="accent1"/>
+          </a:effectRef>
+          <a:fontRef idx="minor">
+            <a:schemeClr val="tx1"/>
+          </a:fontRef>
+        </p:style>
+      </p:cxnSp>
+      <p:sp>
+        <p:nvSpPr>
+          <p:cNvPr id="68" name="Rectangle 67"/>
+          <p:cNvSpPr/>
+          <p:nvPr/>
+        </p:nvSpPr>
+        <p:spPr>
+          <a:xfrm>
+            <a:off x="4153723" y="4713797"/>
+            <a:ext cx="3555690" cy="360947"/>
+          </a:xfrm>
+          <a:prstGeom prst="rect">
+            <a:avLst/>
+          </a:prstGeom>
+        </p:spPr>
+        <p:style>
+          <a:lnRef idx="1">
+            <a:schemeClr val="accent2"/>
+          </a:lnRef>
+          <a:fillRef idx="2">
+            <a:schemeClr val="accent2"/>
+          </a:fillRef>
+          <a:effectRef idx="1">
+            <a:schemeClr val="accent2"/>
+          </a:effectRef>
+          <a:fontRef idx="minor">
+            <a:schemeClr val="dk1"/>
+          </a:fontRef>
+        </p:style>
+        <p:txBody>
+          <a:bodyPr rtlCol="0" anchor="ctr"/>
+          <a:lstStyle/>
+          <a:p>
+            <a:pPr algn="ctr"/>
+            <a:r>
+              <a:rPr lang="en-US" dirty="0">
+                <a:solidFill>
+                  <a:schemeClr val="dk1"/>
+                </a:solidFill>
+              </a:rPr>
+              <a:t>Docker pull</a:t>
+            </a:r>
+          </a:p>
+        </p:txBody>
+      </p:sp>
+    </p:spTree>
+    <p:extLst>
+      <p:ext uri="{BB962C8B-B14F-4D97-AF65-F5344CB8AC3E}">
+        <p14:creationId xmlns:p14="http://schemas.microsoft.com/office/powerpoint/2010/main" val="4252572192"/>
+      </p:ext>
+    </p:extLst>
+  </p:cSld>
+  <p:clrMapOvr>
+    <a:masterClrMapping/>
+  </p:clrMapOvr>
+</p:sld>
+</file>
+
+<file path=ppt/slides/slide9.xml><?xml version="1.0" encoding="utf-8"?>
+<p:sld xmlns:a="http://schemas.openxmlformats.org/drawingml/2006/main" xmlns:r="http://schemas.openxmlformats.org/officeDocument/2006/relationships" xmlns:p="http://schemas.openxmlformats.org/presentationml/2006/main">
+  <p:cSld>
+    <p:spTree>
+      <p:nvGrpSpPr>
+        <p:cNvPr id="1" name=""/>
+        <p:cNvGrpSpPr/>
+        <p:nvPr/>
+      </p:nvGrpSpPr>
+      <p:grpSpPr>
+        <a:xfrm>
+          <a:off x="0" y="0"/>
+          <a:ext cx="0" cy="0"/>
+          <a:chOff x="0" y="0"/>
+          <a:chExt cx="0" cy="0"/>
+        </a:xfrm>
+      </p:grpSpPr>
+      <p:sp>
+        <p:nvSpPr>
           <p:cNvPr id="2" name="Title 1"/>
           <p:cNvSpPr>
             <a:spLocks noGrp="1"/>
@@ -22157,296 +23360,6 @@
     <p:extLst>
       <p:ext uri="{BB962C8B-B14F-4D97-AF65-F5344CB8AC3E}">
         <p14:creationId xmlns:p14="http://schemas.microsoft.com/office/powerpoint/2010/main" val="4084543091"/>
-      </p:ext>
-    </p:extLst>
-  </p:cSld>
-  <p:clrMapOvr>
-    <a:masterClrMapping/>
-  </p:clrMapOvr>
-</p:sld>
-</file>
-
-<file path=ppt/slides/slide9.xml><?xml version="1.0" encoding="utf-8"?>
-<p:sld xmlns:a="http://schemas.openxmlformats.org/drawingml/2006/main" xmlns:r="http://schemas.openxmlformats.org/officeDocument/2006/relationships" xmlns:p="http://schemas.openxmlformats.org/presentationml/2006/main" show="0">
-  <p:cSld>
-    <p:spTree>
-      <p:nvGrpSpPr>
-        <p:cNvPr id="1" name=""/>
-        <p:cNvGrpSpPr/>
-        <p:nvPr/>
-      </p:nvGrpSpPr>
-      <p:grpSpPr>
-        <a:xfrm>
-          <a:off x="0" y="0"/>
-          <a:ext cx="0" cy="0"/>
-          <a:chOff x="0" y="0"/>
-          <a:chExt cx="0" cy="0"/>
-        </a:xfrm>
-      </p:grpSpPr>
-      <p:sp>
-        <p:nvSpPr>
-          <p:cNvPr id="4" name="Text Placeholder 3"/>
-          <p:cNvSpPr>
-            <a:spLocks noGrp="1"/>
-          </p:cNvSpPr>
-          <p:nvPr>
-            <p:ph type="body" sz="quarter" idx="10"/>
-          </p:nvPr>
-        </p:nvSpPr>
-        <p:spPr>
-          <a:xfrm>
-            <a:off x="504000" y="1110343"/>
-            <a:ext cx="11185200" cy="4266129"/>
-          </a:xfrm>
-        </p:spPr>
-        <p:txBody>
-          <a:bodyPr/>
-          <a:lstStyle/>
-          <a:p>
-            <a:pPr marL="342900" indent="-342900">
-              <a:buFontTx/>
-              <a:buChar char="-"/>
-            </a:pPr>
-            <a:r>
-              <a:rPr lang="en-US" dirty="0"/>
-              <a:t>Create a network policy</a:t>
-            </a:r>
-          </a:p>
-          <a:p>
-            <a:r>
-              <a:rPr lang="de-DE" dirty="0" err="1"/>
-              <a:t>kubectl</a:t>
-            </a:r>
-            <a:r>
-              <a:rPr lang="de-DE" dirty="0"/>
-              <a:t> </a:t>
-            </a:r>
-            <a:r>
-              <a:rPr lang="de-DE" dirty="0" err="1"/>
-              <a:t>run</a:t>
-            </a:r>
-            <a:r>
-              <a:rPr lang="de-DE" dirty="0"/>
-              <a:t> </a:t>
-            </a:r>
-            <a:r>
-              <a:rPr lang="de-DE" dirty="0" err="1"/>
-              <a:t>nginx</a:t>
-            </a:r>
-            <a:r>
-              <a:rPr lang="de-DE" dirty="0"/>
-              <a:t> --image</a:t>
-            </a:r>
-            <a:r>
-              <a:rPr lang="de-DE" b="1" dirty="0"/>
-              <a:t>=</a:t>
-            </a:r>
-            <a:r>
-              <a:rPr lang="de-DE" dirty="0" err="1"/>
-              <a:t>nginx</a:t>
-            </a:r>
-            <a:r>
-              <a:rPr lang="de-DE" dirty="0"/>
-              <a:t> --</a:t>
-            </a:r>
-            <a:r>
-              <a:rPr lang="de-DE" dirty="0" err="1"/>
-              <a:t>replicas</a:t>
-            </a:r>
-            <a:r>
-              <a:rPr lang="de-DE" b="1" dirty="0"/>
-              <a:t>=</a:t>
-            </a:r>
-            <a:r>
-              <a:rPr lang="de-DE" dirty="0"/>
-              <a:t>2 </a:t>
-            </a:r>
-          </a:p>
-          <a:p>
-            <a:r>
-              <a:rPr lang="de-DE" dirty="0" err="1"/>
-              <a:t>kubectl</a:t>
-            </a:r>
-            <a:r>
-              <a:rPr lang="de-DE" dirty="0"/>
-              <a:t> </a:t>
-            </a:r>
-            <a:r>
-              <a:rPr lang="de-DE" dirty="0" err="1"/>
-              <a:t>expose</a:t>
-            </a:r>
-            <a:r>
-              <a:rPr lang="de-DE" dirty="0"/>
-              <a:t> </a:t>
-            </a:r>
-            <a:r>
-              <a:rPr lang="de-DE" dirty="0" err="1"/>
-              <a:t>deployment</a:t>
-            </a:r>
-            <a:r>
-              <a:rPr lang="de-DE" dirty="0"/>
-              <a:t> </a:t>
-            </a:r>
-            <a:r>
-              <a:rPr lang="de-DE" dirty="0" err="1"/>
-              <a:t>nginx</a:t>
-            </a:r>
-            <a:r>
-              <a:rPr lang="de-DE" dirty="0"/>
-              <a:t> --</a:t>
-            </a:r>
-            <a:r>
-              <a:rPr lang="de-DE" dirty="0" err="1"/>
-              <a:t>port</a:t>
-            </a:r>
-            <a:r>
-              <a:rPr lang="de-DE" b="1" dirty="0"/>
-              <a:t>=</a:t>
-            </a:r>
-            <a:r>
-              <a:rPr lang="de-DE" dirty="0"/>
-              <a:t>80</a:t>
-            </a:r>
-          </a:p>
-          <a:p>
-            <a:r>
-              <a:rPr lang="de-DE" dirty="0" err="1"/>
-              <a:t>kubectl</a:t>
-            </a:r>
-            <a:r>
-              <a:rPr lang="de-DE" dirty="0"/>
-              <a:t> </a:t>
-            </a:r>
-            <a:r>
-              <a:rPr lang="de-DE" dirty="0" err="1"/>
-              <a:t>run</a:t>
-            </a:r>
-            <a:r>
-              <a:rPr lang="de-DE" dirty="0"/>
-              <a:t> </a:t>
-            </a:r>
-            <a:r>
-              <a:rPr lang="de-DE" dirty="0" err="1"/>
-              <a:t>busybox</a:t>
-            </a:r>
-            <a:r>
-              <a:rPr lang="de-DE" dirty="0"/>
-              <a:t> --</a:t>
-            </a:r>
-            <a:r>
-              <a:rPr lang="de-DE" dirty="0" err="1"/>
-              <a:t>rm</a:t>
-            </a:r>
-            <a:r>
-              <a:rPr lang="de-DE" dirty="0"/>
-              <a:t> -</a:t>
-            </a:r>
-            <a:r>
-              <a:rPr lang="de-DE" dirty="0" err="1"/>
-              <a:t>ti</a:t>
-            </a:r>
-            <a:r>
-              <a:rPr lang="de-DE" dirty="0"/>
-              <a:t> --image</a:t>
-            </a:r>
-            <a:r>
-              <a:rPr lang="de-DE" b="1" dirty="0"/>
-              <a:t>=</a:t>
-            </a:r>
-            <a:r>
-              <a:rPr lang="de-DE" dirty="0" err="1"/>
-              <a:t>busybox</a:t>
-            </a:r>
-            <a:r>
-              <a:rPr lang="de-DE" dirty="0"/>
-              <a:t> /bin/sh</a:t>
-            </a:r>
-          </a:p>
-          <a:p>
-            <a:r>
-              <a:rPr lang="de-DE" dirty="0"/>
-              <a:t> # </a:t>
-            </a:r>
-            <a:r>
-              <a:rPr lang="de-DE" dirty="0" err="1"/>
-              <a:t>wget</a:t>
-            </a:r>
-            <a:r>
-              <a:rPr lang="de-DE" dirty="0"/>
-              <a:t> --spider --timeout=1 </a:t>
-            </a:r>
-            <a:r>
-              <a:rPr lang="de-DE" dirty="0" err="1"/>
-              <a:t>nginx</a:t>
-            </a:r>
-            <a:endParaRPr lang="en-US" dirty="0"/>
-          </a:p>
-          <a:p>
-            <a:r>
-              <a:rPr lang="en-US" dirty="0" err="1"/>
-              <a:t>Kubectl</a:t>
-            </a:r>
-            <a:r>
-              <a:rPr lang="en-US" dirty="0"/>
-              <a:t> create –f network-</a:t>
-            </a:r>
-            <a:r>
-              <a:rPr lang="en-US" dirty="0" err="1"/>
-              <a:t>policy.yaml</a:t>
-            </a:r>
-            <a:endParaRPr lang="en-US" dirty="0"/>
-          </a:p>
-          <a:p>
-            <a:r>
-              <a:rPr lang="en-US" dirty="0" err="1"/>
-              <a:t>Kubectl</a:t>
-            </a:r>
-            <a:r>
-              <a:rPr lang="en-US" dirty="0"/>
-              <a:t> run ..</a:t>
-            </a:r>
-          </a:p>
-          <a:p>
-            <a:r>
-              <a:rPr lang="en-US" dirty="0" err="1"/>
-              <a:t>Kubectl</a:t>
-            </a:r>
-            <a:r>
-              <a:rPr lang="en-US" dirty="0"/>
-              <a:t> run … -l access=true</a:t>
-            </a:r>
-          </a:p>
-          <a:p>
-            <a:endParaRPr lang="en-US" dirty="0"/>
-          </a:p>
-        </p:txBody>
-      </p:sp>
-      <p:sp>
-        <p:nvSpPr>
-          <p:cNvPr id="3" name="Title 2"/>
-          <p:cNvSpPr>
-            <a:spLocks noGrp="1"/>
-          </p:cNvSpPr>
-          <p:nvPr>
-            <p:ph type="title"/>
-          </p:nvPr>
-        </p:nvSpPr>
-        <p:spPr/>
-        <p:txBody>
-          <a:bodyPr/>
-          <a:lstStyle/>
-          <a:p>
-            <a:r>
-              <a:rPr lang="en-US" dirty="0"/>
-              <a:t>Demo</a:t>
-            </a:r>
-          </a:p>
-        </p:txBody>
-      </p:sp>
-    </p:spTree>
-    <p:extLst>
-      <p:ext uri="{BB962C8B-B14F-4D97-AF65-F5344CB8AC3E}">
-        <p14:creationId xmlns:p14="http://schemas.microsoft.com/office/powerpoint/2010/main" val="1163760557"/>
       </p:ext>
     </p:extLst>
   </p:cSld>

</xml_diff>

<commit_message>
more details about image pull concepts
</commit_message>
<xml_diff>
--- a/kubernetes/08_administration.pptx
+++ b/kubernetes/08_administration.pptx
@@ -5,26 +5,27 @@
     <p:sldMasterId id="2147483733" r:id="rId1"/>
   </p:sldMasterIdLst>
   <p:notesMasterIdLst>
-    <p:notesMasterId r:id="rId16"/>
+    <p:notesMasterId r:id="rId17"/>
   </p:notesMasterIdLst>
   <p:handoutMasterIdLst>
-    <p:handoutMasterId r:id="rId17"/>
+    <p:handoutMasterId r:id="rId18"/>
   </p:handoutMasterIdLst>
   <p:sldIdLst>
     <p:sldId id="433" r:id="rId2"/>
     <p:sldId id="442" r:id="rId3"/>
     <p:sldId id="443" r:id="rId4"/>
     <p:sldId id="444" r:id="rId5"/>
-    <p:sldId id="451" r:id="rId6"/>
-    <p:sldId id="452" r:id="rId7"/>
-    <p:sldId id="453" r:id="rId8"/>
-    <p:sldId id="454" r:id="rId9"/>
-    <p:sldId id="446" r:id="rId10"/>
-    <p:sldId id="448" r:id="rId11"/>
-    <p:sldId id="445" r:id="rId12"/>
-    <p:sldId id="450" r:id="rId13"/>
-    <p:sldId id="449" r:id="rId14"/>
-    <p:sldId id="265" r:id="rId15"/>
+    <p:sldId id="455" r:id="rId6"/>
+    <p:sldId id="451" r:id="rId7"/>
+    <p:sldId id="452" r:id="rId8"/>
+    <p:sldId id="453" r:id="rId9"/>
+    <p:sldId id="454" r:id="rId10"/>
+    <p:sldId id="446" r:id="rId11"/>
+    <p:sldId id="448" r:id="rId12"/>
+    <p:sldId id="445" r:id="rId13"/>
+    <p:sldId id="450" r:id="rId14"/>
+    <p:sldId id="449" r:id="rId15"/>
+    <p:sldId id="265" r:id="rId16"/>
   </p:sldIdLst>
   <p:sldSz cx="12195175" cy="6858000"/>
   <p:notesSz cx="6858000" cy="9144000"/>
@@ -613,6 +614,98 @@
 </p:notes>
 </file>
 
+<file path=ppt/notesSlides/notesSlide10.xml><?xml version="1.0" encoding="utf-8"?>
+<p:notes xmlns:a="http://schemas.openxmlformats.org/drawingml/2006/main" xmlns:r="http://schemas.openxmlformats.org/officeDocument/2006/relationships" xmlns:p="http://schemas.openxmlformats.org/presentationml/2006/main">
+  <p:cSld>
+    <p:spTree>
+      <p:nvGrpSpPr>
+        <p:cNvPr id="1" name=""/>
+        <p:cNvGrpSpPr/>
+        <p:nvPr/>
+      </p:nvGrpSpPr>
+      <p:grpSpPr>
+        <a:xfrm>
+          <a:off x="0" y="0"/>
+          <a:ext cx="0" cy="0"/>
+          <a:chOff x="0" y="0"/>
+          <a:chExt cx="0" cy="0"/>
+        </a:xfrm>
+      </p:grpSpPr>
+      <p:sp>
+        <p:nvSpPr>
+          <p:cNvPr id="4" name="Slide Number Placeholder 3"/>
+          <p:cNvSpPr>
+            <a:spLocks noGrp="1"/>
+          </p:cNvSpPr>
+          <p:nvPr>
+            <p:ph type="sldNum" sz="quarter" idx="10"/>
+          </p:nvPr>
+        </p:nvSpPr>
+        <p:spPr/>
+        <p:txBody>
+          <a:bodyPr/>
+          <a:lstStyle/>
+          <a:p>
+            <a:fld id="{7D8C2C35-2B8A-446E-BEC0-FD36716C29AC}" type="slidenum">
+              <a:rPr lang="en-US" smtClean="0"/>
+              <a:pPr/>
+              <a:t>15</a:t>
+            </a:fld>
+            <a:endParaRPr lang="en-US" dirty="0"/>
+          </a:p>
+        </p:txBody>
+      </p:sp>
+      <p:sp>
+        <p:nvSpPr>
+          <p:cNvPr id="6" name="Slide Image Placeholder 5"/>
+          <p:cNvSpPr>
+            <a:spLocks noGrp="1" noRot="1" noChangeAspect="1"/>
+          </p:cNvSpPr>
+          <p:nvPr>
+            <p:ph type="sldImg"/>
+          </p:nvPr>
+        </p:nvSpPr>
+        <p:spPr>
+          <a:xfrm>
+            <a:off x="547688" y="612775"/>
+            <a:ext cx="5762625" cy="3241675"/>
+          </a:xfrm>
+        </p:spPr>
+      </p:sp>
+      <p:sp>
+        <p:nvSpPr>
+          <p:cNvPr id="7" name="Notes Placeholder 6"/>
+          <p:cNvSpPr>
+            <a:spLocks noGrp="1"/>
+          </p:cNvSpPr>
+          <p:nvPr>
+            <p:ph type="body" idx="1"/>
+          </p:nvPr>
+        </p:nvSpPr>
+        <p:spPr/>
+        <p:txBody>
+          <a:bodyPr>
+            <a:normAutofit/>
+          </a:bodyPr>
+          <a:lstStyle/>
+          <a:p>
+            <a:endParaRPr lang="en-US" dirty="0"/>
+          </a:p>
+        </p:txBody>
+      </p:sp>
+    </p:spTree>
+    <p:extLst>
+      <p:ext uri="{BB962C8B-B14F-4D97-AF65-F5344CB8AC3E}">
+        <p14:creationId xmlns:p14="http://schemas.microsoft.com/office/powerpoint/2010/main" val="2544264309"/>
+      </p:ext>
+    </p:extLst>
+  </p:cSld>
+  <p:clrMapOvr>
+    <a:masterClrMapping/>
+  </p:clrMapOvr>
+</p:notes>
+</file>
+
 <file path=ppt/notesSlides/notesSlide2.xml><?xml version="1.0" encoding="utf-8"?>
 <p:notes xmlns:a="http://schemas.openxmlformats.org/drawingml/2006/main" xmlns:r="http://schemas.openxmlformats.org/officeDocument/2006/relationships" xmlns:p="http://schemas.openxmlformats.org/presentationml/2006/main">
   <p:cSld>
@@ -829,31 +922,22 @@
           <a:p>
             <a:r>
               <a:rPr lang="en-US" dirty="0"/>
-              <a:t>Private registries</a:t>
+              <a:t>Docker daemon runs on</a:t>
             </a:r>
             <a:r>
               <a:rPr lang="en-US" baseline="0" dirty="0"/>
-              <a:t> are usually protect by user &amp; password</a:t>
-            </a:r>
-          </a:p>
-          <a:p>
+              <a:t> each node and has an individual, local image store</a:t>
+            </a:r>
+            <a:endParaRPr lang="en-US" dirty="0"/>
+          </a:p>
+          <a:p>
+            <a:r>
+              <a:rPr lang="en-US" dirty="0"/>
+              <a:t>Demo</a:t>
+            </a:r>
             <a:r>
               <a:rPr lang="en-US" baseline="0" dirty="0"/>
-              <a:t>An anonymous </a:t>
-            </a:r>
-            <a:r>
-              <a:rPr lang="en-US" baseline="0" dirty="0" err="1"/>
-              <a:t>docker</a:t>
-            </a:r>
-            <a:r>
-              <a:rPr lang="en-US" baseline="0" dirty="0"/>
-              <a:t> daemon cannot pull images from a protected registry</a:t>
-            </a:r>
-          </a:p>
-          <a:p>
-            <a:r>
-              <a:rPr lang="en-US" baseline="0" dirty="0"/>
-              <a:t>=&gt; Authentication is required</a:t>
+              <a:t> part: show image list of a node</a:t>
             </a:r>
             <a:endParaRPr lang="en-US" dirty="0"/>
           </a:p>
@@ -886,7 +970,7 @@
     </p:spTree>
     <p:extLst>
       <p:ext uri="{BB962C8B-B14F-4D97-AF65-F5344CB8AC3E}">
-        <p14:creationId xmlns:p14="http://schemas.microsoft.com/office/powerpoint/2010/main" val="1215616285"/>
+        <p14:creationId xmlns:p14="http://schemas.microsoft.com/office/powerpoint/2010/main" val="281705885"/>
       </p:ext>
     </p:extLst>
   </p:cSld>
@@ -942,11 +1026,17 @@
           <a:p>
             <a:r>
               <a:rPr lang="en-US" dirty="0"/>
-              <a:t>Image Pull</a:t>
+              <a:t>Private registries</a:t>
             </a:r>
             <a:r>
               <a:rPr lang="en-US" baseline="0" dirty="0"/>
-              <a:t> Secrets contain the same info as .</a:t>
+              <a:t> are usually protect by user &amp; password</a:t>
+            </a:r>
+          </a:p>
+          <a:p>
+            <a:r>
+              <a:rPr lang="en-US" baseline="0" dirty="0"/>
+              <a:t>An anonymous </a:t>
             </a:r>
             <a:r>
               <a:rPr lang="en-US" baseline="0" dirty="0" err="1"/>
@@ -954,42 +1044,15 @@
             </a:r>
             <a:r>
               <a:rPr lang="en-US" baseline="0" dirty="0"/>
-              <a:t>/</a:t>
-            </a:r>
-            <a:r>
-              <a:rPr lang="en-US" baseline="0" dirty="0" err="1"/>
-              <a:t>config.json</a:t>
-            </a:r>
+              <a:t> daemon cannot pull images from a protected registry</a:t>
+            </a:r>
+          </a:p>
+          <a:p>
             <a:r>
               <a:rPr lang="en-US" baseline="0" dirty="0"/>
-              <a:t> &amp; works similar to ‘</a:t>
-            </a:r>
-            <a:r>
-              <a:rPr lang="en-US" baseline="0" dirty="0" err="1"/>
-              <a:t>docker</a:t>
-            </a:r>
-            <a:r>
-              <a:rPr lang="en-US" baseline="0" dirty="0"/>
-              <a:t> login …’</a:t>
-            </a:r>
-          </a:p>
-          <a:p>
-            <a:r>
-              <a:rPr lang="en-US" baseline="0" dirty="0" err="1"/>
-              <a:t>ImagePullSecrets</a:t>
-            </a:r>
-            <a:r>
-              <a:rPr lang="en-US" baseline="0" dirty="0"/>
-              <a:t> can be specified as part of the </a:t>
-            </a:r>
-            <a:r>
-              <a:rPr lang="en-US" baseline="0" dirty="0" err="1"/>
-              <a:t>PodSpec</a:t>
-            </a:r>
-            <a:r>
-              <a:rPr lang="en-US" baseline="0" dirty="0"/>
-              <a:t>: https://kubernetes.io/docs/reference/generated/kubernetes-api/v1.9/#podspec-v1-core</a:t>
-            </a:r>
+              <a:t>=&gt; Authentication is required</a:t>
+            </a:r>
+            <a:endParaRPr lang="en-US" dirty="0"/>
           </a:p>
         </p:txBody>
       </p:sp>
@@ -1020,7 +1083,7 @@
     </p:spTree>
     <p:extLst>
       <p:ext uri="{BB962C8B-B14F-4D97-AF65-F5344CB8AC3E}">
-        <p14:creationId xmlns:p14="http://schemas.microsoft.com/office/powerpoint/2010/main" val="4009320709"/>
+        <p14:creationId xmlns:p14="http://schemas.microsoft.com/office/powerpoint/2010/main" val="1215616285"/>
       </p:ext>
     </p:extLst>
   </p:cSld>
@@ -1076,19 +1139,54 @@
           <a:p>
             <a:r>
               <a:rPr lang="en-US" dirty="0"/>
-              <a:t>Assign</a:t>
+              <a:t>Image Pull</a:t>
             </a:r>
             <a:r>
               <a:rPr lang="en-US" baseline="0" dirty="0"/>
-              <a:t> the image pull secret to the default (or any other) service account</a:t>
-            </a:r>
-          </a:p>
-          <a:p>
+              <a:t> Secrets contain the same info as .</a:t>
+            </a:r>
+            <a:r>
+              <a:rPr lang="en-US" baseline="0" dirty="0" err="1"/>
+              <a:t>docker</a:t>
+            </a:r>
             <a:r>
               <a:rPr lang="en-US" baseline="0" dirty="0"/>
-              <a:t>The service account gives its’ identity to the pod =&gt; the pot can use the image pull secret</a:t>
-            </a:r>
-            <a:endParaRPr lang="en-US" dirty="0"/>
+              <a:t>/</a:t>
+            </a:r>
+            <a:r>
+              <a:rPr lang="en-US" baseline="0" dirty="0" err="1"/>
+              <a:t>config.json</a:t>
+            </a:r>
+            <a:r>
+              <a:rPr lang="en-US" baseline="0" dirty="0"/>
+              <a:t> &amp; works similar to ‘</a:t>
+            </a:r>
+            <a:r>
+              <a:rPr lang="en-US" baseline="0" dirty="0" err="1"/>
+              <a:t>docker</a:t>
+            </a:r>
+            <a:r>
+              <a:rPr lang="en-US" baseline="0" dirty="0"/>
+              <a:t> login …’</a:t>
+            </a:r>
+          </a:p>
+          <a:p>
+            <a:r>
+              <a:rPr lang="en-US" baseline="0" dirty="0" err="1"/>
+              <a:t>ImagePullSecrets</a:t>
+            </a:r>
+            <a:r>
+              <a:rPr lang="en-US" baseline="0" dirty="0"/>
+              <a:t> can be specified as part of the </a:t>
+            </a:r>
+            <a:r>
+              <a:rPr lang="en-US" baseline="0" dirty="0" err="1"/>
+              <a:t>PodSpec</a:t>
+            </a:r>
+            <a:r>
+              <a:rPr lang="en-US" baseline="0" dirty="0"/>
+              <a:t>: https://kubernetes.io/docs/reference/generated/kubernetes-api/v1.9/#podspec-v1-core</a:t>
+            </a:r>
           </a:p>
         </p:txBody>
       </p:sp>
@@ -1119,7 +1217,7 @@
     </p:spTree>
     <p:extLst>
       <p:ext uri="{BB962C8B-B14F-4D97-AF65-F5344CB8AC3E}">
-        <p14:creationId xmlns:p14="http://schemas.microsoft.com/office/powerpoint/2010/main" val="2972073235"/>
+        <p14:creationId xmlns:p14="http://schemas.microsoft.com/office/powerpoint/2010/main" val="4009320709"/>
       </p:ext>
     </p:extLst>
   </p:cSld>
@@ -1175,17 +1273,17 @@
           <a:p>
             <a:r>
               <a:rPr lang="en-US" dirty="0"/>
-              <a:t>Docker build</a:t>
+              <a:t>Assign</a:t>
             </a:r>
             <a:r>
               <a:rPr lang="en-US" baseline="0" dirty="0"/>
-              <a:t> =&gt; local</a:t>
+              <a:t> the image pull secret to the default (or any other) service account</a:t>
             </a:r>
           </a:p>
           <a:p>
             <a:r>
               <a:rPr lang="en-US" baseline="0" dirty="0"/>
-              <a:t>Docker push =&gt; local to registry with authentication</a:t>
+              <a:t>The service account gives its’ identity to the pod =&gt; the pot can use the image pull secret</a:t>
             </a:r>
             <a:endParaRPr lang="en-US" dirty="0"/>
           </a:p>
@@ -1218,7 +1316,7 @@
     </p:spTree>
     <p:extLst>
       <p:ext uri="{BB962C8B-B14F-4D97-AF65-F5344CB8AC3E}">
-        <p14:creationId xmlns:p14="http://schemas.microsoft.com/office/powerpoint/2010/main" val="997705256"/>
+        <p14:creationId xmlns:p14="http://schemas.microsoft.com/office/powerpoint/2010/main" val="2972073235"/>
       </p:ext>
     </p:extLst>
   </p:cSld>
@@ -1272,6 +1370,20 @@
           <a:bodyPr/>
           <a:lstStyle/>
           <a:p>
+            <a:r>
+              <a:rPr lang="en-US" dirty="0"/>
+              <a:t>Docker build</a:t>
+            </a:r>
+            <a:r>
+              <a:rPr lang="en-US" baseline="0" dirty="0"/>
+              <a:t> =&gt; local</a:t>
+            </a:r>
+          </a:p>
+          <a:p>
+            <a:r>
+              <a:rPr lang="en-US" baseline="0" dirty="0"/>
+              <a:t>Docker push =&gt; local to registry with authentication</a:t>
+            </a:r>
             <a:endParaRPr lang="en-US" dirty="0"/>
           </a:p>
         </p:txBody>
@@ -1292,18 +1404,18 @@
           <a:lstStyle/>
           <a:p>
             <a:fld id="{7D8C2C35-2B8A-446E-BEC0-FD36716C29AC}" type="slidenum">
-              <a:rPr lang="en-US" smtClean="0"/>
+              <a:rPr lang="de-DE" smtClean="0"/>
               <a:pPr/>
               <a:t>9</a:t>
             </a:fld>
-            <a:endParaRPr lang="en-US" dirty="0"/>
+            <a:endParaRPr lang="de-DE" dirty="0"/>
           </a:p>
         </p:txBody>
       </p:sp>
     </p:spTree>
     <p:extLst>
       <p:ext uri="{BB962C8B-B14F-4D97-AF65-F5344CB8AC3E}">
-        <p14:creationId xmlns:p14="http://schemas.microsoft.com/office/powerpoint/2010/main" val="3747275599"/>
+        <p14:creationId xmlns:p14="http://schemas.microsoft.com/office/powerpoint/2010/main" val="997705256"/>
       </p:ext>
     </p:extLst>
   </p:cSld>
@@ -1332,6 +1444,37 @@
       </p:grpSpPr>
       <p:sp>
         <p:nvSpPr>
+          <p:cNvPr id="2" name="Slide Image Placeholder 1"/>
+          <p:cNvSpPr>
+            <a:spLocks noGrp="1" noRot="1" noChangeAspect="1"/>
+          </p:cNvSpPr>
+          <p:nvPr>
+            <p:ph type="sldImg"/>
+          </p:nvPr>
+        </p:nvSpPr>
+        <p:spPr/>
+      </p:sp>
+      <p:sp>
+        <p:nvSpPr>
+          <p:cNvPr id="3" name="Notes Placeholder 2"/>
+          <p:cNvSpPr>
+            <a:spLocks noGrp="1"/>
+          </p:cNvSpPr>
+          <p:nvPr>
+            <p:ph type="body" idx="1"/>
+          </p:nvPr>
+        </p:nvSpPr>
+        <p:spPr/>
+        <p:txBody>
+          <a:bodyPr/>
+          <a:lstStyle/>
+          <a:p>
+            <a:endParaRPr lang="en-US" dirty="0"/>
+          </a:p>
+        </p:txBody>
+      </p:sp>
+      <p:sp>
+        <p:nvSpPr>
           <p:cNvPr id="4" name="Slide Number Placeholder 3"/>
           <p:cNvSpPr>
             <a:spLocks noGrp="1"/>
@@ -1348,46 +1491,8 @@
             <a:fld id="{7D8C2C35-2B8A-446E-BEC0-FD36716C29AC}" type="slidenum">
               <a:rPr lang="en-US" smtClean="0"/>
               <a:pPr/>
-              <a:t>14</a:t>
+              <a:t>10</a:t>
             </a:fld>
-            <a:endParaRPr lang="en-US" dirty="0"/>
-          </a:p>
-        </p:txBody>
-      </p:sp>
-      <p:sp>
-        <p:nvSpPr>
-          <p:cNvPr id="6" name="Slide Image Placeholder 5"/>
-          <p:cNvSpPr>
-            <a:spLocks noGrp="1" noRot="1" noChangeAspect="1"/>
-          </p:cNvSpPr>
-          <p:nvPr>
-            <p:ph type="sldImg"/>
-          </p:nvPr>
-        </p:nvSpPr>
-        <p:spPr>
-          <a:xfrm>
-            <a:off x="547688" y="612775"/>
-            <a:ext cx="5762625" cy="3241675"/>
-          </a:xfrm>
-        </p:spPr>
-      </p:sp>
-      <p:sp>
-        <p:nvSpPr>
-          <p:cNvPr id="7" name="Notes Placeholder 6"/>
-          <p:cNvSpPr>
-            <a:spLocks noGrp="1"/>
-          </p:cNvSpPr>
-          <p:nvPr>
-            <p:ph type="body" idx="1"/>
-          </p:nvPr>
-        </p:nvSpPr>
-        <p:spPr/>
-        <p:txBody>
-          <a:bodyPr>
-            <a:normAutofit/>
-          </a:bodyPr>
-          <a:lstStyle/>
-          <a:p>
             <a:endParaRPr lang="en-US" dirty="0"/>
           </a:p>
         </p:txBody>
@@ -1395,7 +1500,7 @@
     </p:spTree>
     <p:extLst>
       <p:ext uri="{BB962C8B-B14F-4D97-AF65-F5344CB8AC3E}">
-        <p14:creationId xmlns:p14="http://schemas.microsoft.com/office/powerpoint/2010/main" val="2544264309"/>
+        <p14:creationId xmlns:p14="http://schemas.microsoft.com/office/powerpoint/2010/main" val="3747275599"/>
       </p:ext>
     </p:extLst>
   </p:cSld>
@@ -14773,6 +14878,1109 @@
 </file>
 
 <file path=ppt/slides/slide10.xml><?xml version="1.0" encoding="utf-8"?>
+<p:sld xmlns:a="http://schemas.openxmlformats.org/drawingml/2006/main" xmlns:r="http://schemas.openxmlformats.org/officeDocument/2006/relationships" xmlns:p="http://schemas.openxmlformats.org/presentationml/2006/main">
+  <p:cSld>
+    <p:spTree>
+      <p:nvGrpSpPr>
+        <p:cNvPr id="1" name=""/>
+        <p:cNvGrpSpPr/>
+        <p:nvPr/>
+      </p:nvGrpSpPr>
+      <p:grpSpPr>
+        <a:xfrm>
+          <a:off x="0" y="0"/>
+          <a:ext cx="0" cy="0"/>
+          <a:chOff x="0" y="0"/>
+          <a:chExt cx="0" cy="0"/>
+        </a:xfrm>
+      </p:grpSpPr>
+      <p:sp>
+        <p:nvSpPr>
+          <p:cNvPr id="2" name="Title 1"/>
+          <p:cNvSpPr>
+            <a:spLocks noGrp="1"/>
+          </p:cNvSpPr>
+          <p:nvPr>
+            <p:ph type="title"/>
+          </p:nvPr>
+        </p:nvSpPr>
+        <p:spPr/>
+        <p:txBody>
+          <a:bodyPr/>
+          <a:lstStyle/>
+          <a:p>
+            <a:r>
+              <a:rPr lang="en-US" dirty="0" err="1"/>
+              <a:t>NetworkPolicy</a:t>
+            </a:r>
+            <a:endParaRPr lang="en-US" dirty="0"/>
+          </a:p>
+        </p:txBody>
+      </p:sp>
+      <p:sp>
+        <p:nvSpPr>
+          <p:cNvPr id="8" name="Rectangle 7"/>
+          <p:cNvSpPr/>
+          <p:nvPr/>
+        </p:nvSpPr>
+        <p:spPr>
+          <a:xfrm>
+            <a:off x="504000" y="1223190"/>
+            <a:ext cx="10918380" cy="1061829"/>
+          </a:xfrm>
+          <a:prstGeom prst="rect">
+            <a:avLst/>
+          </a:prstGeom>
+        </p:spPr>
+        <p:txBody>
+          <a:bodyPr wrap="square">
+            <a:spAutoFit/>
+          </a:bodyPr>
+          <a:lstStyle/>
+          <a:p>
+            <a:pPr marL="342900" indent="-342900">
+              <a:buFont typeface="Wingdings" panose="05000000000000000000" pitchFamily="2" charset="2"/>
+              <a:buChar char="§"/>
+            </a:pPr>
+            <a:r>
+              <a:rPr lang="en-US" dirty="0"/>
+              <a:t>“Firewall”-like restrictions</a:t>
+            </a:r>
+          </a:p>
+          <a:p>
+            <a:pPr marL="342900" indent="-342900">
+              <a:buFont typeface="Wingdings" panose="05000000000000000000" pitchFamily="2" charset="2"/>
+              <a:buChar char="§"/>
+            </a:pPr>
+            <a:r>
+              <a:rPr lang="en-US" dirty="0"/>
+              <a:t>Define egress and ingress rules for a service</a:t>
+            </a:r>
+          </a:p>
+          <a:p>
+            <a:pPr marL="342900" indent="-342900">
+              <a:buFont typeface="Wingdings" panose="05000000000000000000" pitchFamily="2" charset="2"/>
+              <a:buChar char="§"/>
+            </a:pPr>
+            <a:r>
+              <a:rPr lang="en-US" dirty="0"/>
+              <a:t>Requires support by overlay network plugin</a:t>
+            </a:r>
+          </a:p>
+        </p:txBody>
+      </p:sp>
+      <p:sp>
+        <p:nvSpPr>
+          <p:cNvPr id="7" name="Rectangle 6"/>
+          <p:cNvSpPr/>
+          <p:nvPr/>
+        </p:nvSpPr>
+        <p:spPr bwMode="gray">
+          <a:xfrm>
+            <a:off x="4479700" y="3598223"/>
+            <a:ext cx="1315448" cy="774112"/>
+          </a:xfrm>
+          <a:prstGeom prst="rect">
+            <a:avLst/>
+          </a:prstGeom>
+          <a:ln>
+            <a:headEnd/>
+            <a:tailEnd/>
+          </a:ln>
+        </p:spPr>
+        <p:style>
+          <a:lnRef idx="2">
+            <a:schemeClr val="accent2"/>
+          </a:lnRef>
+          <a:fillRef idx="1">
+            <a:schemeClr val="lt1"/>
+          </a:fillRef>
+          <a:effectRef idx="0">
+            <a:schemeClr val="accent2"/>
+          </a:effectRef>
+          <a:fontRef idx="minor">
+            <a:schemeClr val="dk1"/>
+          </a:fontRef>
+        </p:style>
+        <p:txBody>
+          <a:bodyPr lIns="90000" tIns="72000" rIns="90000" bIns="72000" rtlCol="0" anchor="ctr"/>
+          <a:lstStyle/>
+          <a:p>
+            <a:pPr marR="0" algn="ctr" defTabSz="914400" eaLnBrk="1" fontAlgn="base" latinLnBrk="0" hangingPunct="1">
+              <a:lnSpc>
+                <a:spcPct val="100000"/>
+              </a:lnSpc>
+              <a:spcBef>
+                <a:spcPct val="50000"/>
+              </a:spcBef>
+              <a:spcAft>
+                <a:spcPct val="0"/>
+              </a:spcAft>
+              <a:buClr>
+                <a:srgbClr val="F0AB00"/>
+              </a:buClr>
+              <a:buSzPct val="80000"/>
+              <a:tabLst/>
+            </a:pPr>
+            <a:r>
+              <a:rPr lang="en-US" sz="1800" kern="0" dirty="0">
+                <a:ea typeface="Arial Unicode MS" pitchFamily="34" charset="-128"/>
+                <a:cs typeface="Arial Unicode MS" pitchFamily="34" charset="-128"/>
+              </a:rPr>
+              <a:t>Service</a:t>
+            </a:r>
+            <a:endParaRPr kumimoji="0" lang="en-US" sz="1800" b="0" i="0" u="none" strike="noStrike" kern="0" cap="none" spc="0" normalizeH="0" baseline="0" noProof="0" dirty="0">
+              <a:ln>
+                <a:noFill/>
+              </a:ln>
+              <a:effectLst/>
+              <a:uLnTx/>
+              <a:uFillTx/>
+              <a:ea typeface="Arial Unicode MS" pitchFamily="34" charset="-128"/>
+              <a:cs typeface="Arial Unicode MS" pitchFamily="34" charset="-128"/>
+            </a:endParaRPr>
+          </a:p>
+        </p:txBody>
+      </p:sp>
+      <p:sp>
+        <p:nvSpPr>
+          <p:cNvPr id="12" name="Rectangle 11"/>
+          <p:cNvSpPr/>
+          <p:nvPr/>
+        </p:nvSpPr>
+        <p:spPr bwMode="gray">
+          <a:xfrm>
+            <a:off x="9108965" y="3567880"/>
+            <a:ext cx="1062486" cy="806724"/>
+          </a:xfrm>
+          <a:prstGeom prst="rect">
+            <a:avLst/>
+          </a:prstGeom>
+          <a:ln>
+            <a:headEnd/>
+            <a:tailEnd/>
+          </a:ln>
+        </p:spPr>
+        <p:style>
+          <a:lnRef idx="2">
+            <a:schemeClr val="accent2"/>
+          </a:lnRef>
+          <a:fillRef idx="1">
+            <a:schemeClr val="lt1"/>
+          </a:fillRef>
+          <a:effectRef idx="0">
+            <a:schemeClr val="accent2"/>
+          </a:effectRef>
+          <a:fontRef idx="minor">
+            <a:schemeClr val="dk1"/>
+          </a:fontRef>
+        </p:style>
+        <p:txBody>
+          <a:bodyPr lIns="90000" tIns="72000" rIns="90000" bIns="72000" rtlCol="0" anchor="ctr"/>
+          <a:lstStyle/>
+          <a:p>
+            <a:pPr marR="0" algn="ctr" defTabSz="914400" eaLnBrk="1" fontAlgn="base" latinLnBrk="0" hangingPunct="1">
+              <a:lnSpc>
+                <a:spcPct val="100000"/>
+              </a:lnSpc>
+              <a:spcBef>
+                <a:spcPct val="50000"/>
+              </a:spcBef>
+              <a:spcAft>
+                <a:spcPct val="0"/>
+              </a:spcAft>
+              <a:buClr>
+                <a:srgbClr val="F0AB00"/>
+              </a:buClr>
+              <a:buSzPct val="80000"/>
+              <a:tabLst/>
+            </a:pPr>
+            <a:r>
+              <a:rPr lang="en-US" sz="1800" kern="0" noProof="0" dirty="0">
+                <a:ea typeface="Arial Unicode MS" pitchFamily="34" charset="-128"/>
+                <a:cs typeface="Arial Unicode MS" pitchFamily="34" charset="-128"/>
+              </a:rPr>
+              <a:t>Pod</a:t>
+            </a:r>
+            <a:r>
+              <a:rPr lang="en-US" sz="1800" kern="0" dirty="0">
+                <a:ea typeface="Arial Unicode MS" pitchFamily="34" charset="-128"/>
+                <a:cs typeface="Arial Unicode MS" pitchFamily="34" charset="-128"/>
+              </a:rPr>
+              <a:t> A</a:t>
+            </a:r>
+            <a:endParaRPr kumimoji="0" lang="en-US" sz="1800" b="0" i="0" u="none" strike="noStrike" kern="0" cap="none" spc="0" normalizeH="0" baseline="0" noProof="0" dirty="0">
+              <a:ln>
+                <a:noFill/>
+              </a:ln>
+              <a:effectLst/>
+              <a:uLnTx/>
+              <a:uFillTx/>
+              <a:ea typeface="Arial Unicode MS" pitchFamily="34" charset="-128"/>
+              <a:cs typeface="Arial Unicode MS" pitchFamily="34" charset="-128"/>
+            </a:endParaRPr>
+          </a:p>
+        </p:txBody>
+      </p:sp>
+      <p:cxnSp>
+        <p:nvCxnSpPr>
+          <p:cNvPr id="16" name="Straight Arrow Connector 15"/>
+          <p:cNvCxnSpPr>
+            <a:stCxn id="28" idx="3"/>
+            <a:endCxn id="7" idx="1"/>
+          </p:cNvCxnSpPr>
+          <p:nvPr/>
+        </p:nvCxnSpPr>
+        <p:spPr>
+          <a:xfrm>
+            <a:off x="2760620" y="3228936"/>
+            <a:ext cx="1719080" cy="756343"/>
+          </a:xfrm>
+          <a:prstGeom prst="straightConnector1">
+            <a:avLst/>
+          </a:prstGeom>
+          <a:ln w="38100">
+            <a:solidFill>
+              <a:schemeClr val="tx2">
+                <a:lumMod val="60000"/>
+                <a:lumOff val="40000"/>
+              </a:schemeClr>
+            </a:solidFill>
+            <a:headEnd type="none" w="med" len="med"/>
+            <a:tailEnd type="triangle"/>
+          </a:ln>
+        </p:spPr>
+        <p:style>
+          <a:lnRef idx="1">
+            <a:schemeClr val="accent1"/>
+          </a:lnRef>
+          <a:fillRef idx="0">
+            <a:schemeClr val="accent1"/>
+          </a:fillRef>
+          <a:effectRef idx="0">
+            <a:schemeClr val="accent1"/>
+          </a:effectRef>
+          <a:fontRef idx="minor">
+            <a:schemeClr val="tx1"/>
+          </a:fontRef>
+        </p:style>
+      </p:cxnSp>
+      <p:sp>
+        <p:nvSpPr>
+          <p:cNvPr id="22" name="Rectangle: Single Corner Snipped 21"/>
+          <p:cNvSpPr/>
+          <p:nvPr/>
+        </p:nvSpPr>
+        <p:spPr bwMode="gray">
+          <a:xfrm>
+            <a:off x="6667860" y="5016889"/>
+            <a:ext cx="2322768" cy="1438976"/>
+          </a:xfrm>
+          <a:prstGeom prst="snip1Rect">
+            <a:avLst/>
+          </a:prstGeom>
+          <a:ln>
+            <a:headEnd/>
+            <a:tailEnd/>
+          </a:ln>
+        </p:spPr>
+        <p:style>
+          <a:lnRef idx="2">
+            <a:schemeClr val="accent2"/>
+          </a:lnRef>
+          <a:fillRef idx="1">
+            <a:schemeClr val="lt1"/>
+          </a:fillRef>
+          <a:effectRef idx="0">
+            <a:schemeClr val="accent2"/>
+          </a:effectRef>
+          <a:fontRef idx="minor">
+            <a:schemeClr val="dk1"/>
+          </a:fontRef>
+        </p:style>
+        <p:txBody>
+          <a:bodyPr lIns="90000" tIns="72000" rIns="90000" bIns="72000" rtlCol="0" anchor="ctr"/>
+          <a:lstStyle/>
+          <a:p>
+            <a:pPr marR="0" algn="ctr" defTabSz="914400" eaLnBrk="1" fontAlgn="base" latinLnBrk="0" hangingPunct="1">
+              <a:lnSpc>
+                <a:spcPct val="100000"/>
+              </a:lnSpc>
+              <a:spcBef>
+                <a:spcPct val="50000"/>
+              </a:spcBef>
+              <a:spcAft>
+                <a:spcPct val="0"/>
+              </a:spcAft>
+              <a:buClr>
+                <a:srgbClr val="F0AB00"/>
+              </a:buClr>
+              <a:buSzPct val="80000"/>
+              <a:tabLst/>
+            </a:pPr>
+            <a:r>
+              <a:rPr lang="en-US" sz="1800" kern="0" dirty="0">
+                <a:ea typeface="Arial Unicode MS" pitchFamily="34" charset="-128"/>
+                <a:cs typeface="Arial Unicode MS" pitchFamily="34" charset="-128"/>
+              </a:rPr>
+              <a:t>Network Policy</a:t>
+            </a:r>
+            <a:endParaRPr kumimoji="0" lang="en-US" sz="1800" b="0" i="0" u="none" strike="noStrike" kern="0" cap="none" spc="0" normalizeH="0" baseline="0" noProof="0" dirty="0">
+              <a:ln>
+                <a:noFill/>
+              </a:ln>
+              <a:effectLst/>
+              <a:uLnTx/>
+              <a:uFillTx/>
+              <a:ea typeface="Arial Unicode MS" pitchFamily="34" charset="-128"/>
+              <a:cs typeface="Arial Unicode MS" pitchFamily="34" charset="-128"/>
+            </a:endParaRPr>
+          </a:p>
+        </p:txBody>
+      </p:sp>
+      <p:cxnSp>
+        <p:nvCxnSpPr>
+          <p:cNvPr id="24" name="Straight Arrow Connector 23"/>
+          <p:cNvCxnSpPr>
+            <a:stCxn id="22" idx="3"/>
+          </p:cNvCxnSpPr>
+          <p:nvPr/>
+        </p:nvCxnSpPr>
+        <p:spPr>
+          <a:xfrm flipV="1">
+            <a:off x="7829244" y="4071790"/>
+            <a:ext cx="0" cy="945099"/>
+          </a:xfrm>
+          <a:prstGeom prst="straightConnector1">
+            <a:avLst/>
+          </a:prstGeom>
+          <a:ln w="38100">
+            <a:solidFill>
+              <a:schemeClr val="tx2">
+                <a:lumMod val="60000"/>
+                <a:lumOff val="40000"/>
+              </a:schemeClr>
+            </a:solidFill>
+            <a:headEnd type="none" w="med" len="med"/>
+            <a:tailEnd type="triangle"/>
+          </a:ln>
+        </p:spPr>
+        <p:style>
+          <a:lnRef idx="1">
+            <a:schemeClr val="accent1"/>
+          </a:lnRef>
+          <a:fillRef idx="0">
+            <a:schemeClr val="accent1"/>
+          </a:fillRef>
+          <a:effectRef idx="0">
+            <a:schemeClr val="accent1"/>
+          </a:effectRef>
+          <a:fontRef idx="minor">
+            <a:schemeClr val="tx1"/>
+          </a:fontRef>
+        </p:style>
+      </p:cxnSp>
+      <p:cxnSp>
+        <p:nvCxnSpPr>
+          <p:cNvPr id="27" name="Straight Arrow Connector 26"/>
+          <p:cNvCxnSpPr>
+            <a:stCxn id="7" idx="3"/>
+            <a:endCxn id="12" idx="1"/>
+          </p:cNvCxnSpPr>
+          <p:nvPr/>
+        </p:nvCxnSpPr>
+        <p:spPr>
+          <a:xfrm flipV="1">
+            <a:off x="5795148" y="3971242"/>
+            <a:ext cx="3313817" cy="14037"/>
+          </a:xfrm>
+          <a:prstGeom prst="straightConnector1">
+            <a:avLst/>
+          </a:prstGeom>
+          <a:ln w="38100">
+            <a:solidFill>
+              <a:schemeClr val="tx2">
+                <a:lumMod val="60000"/>
+                <a:lumOff val="40000"/>
+              </a:schemeClr>
+            </a:solidFill>
+            <a:headEnd type="none" w="med" len="med"/>
+            <a:tailEnd type="triangle"/>
+          </a:ln>
+        </p:spPr>
+        <p:style>
+          <a:lnRef idx="1">
+            <a:schemeClr val="accent1"/>
+          </a:lnRef>
+          <a:fillRef idx="0">
+            <a:schemeClr val="accent1"/>
+          </a:fillRef>
+          <a:effectRef idx="0">
+            <a:schemeClr val="accent1"/>
+          </a:effectRef>
+          <a:fontRef idx="minor">
+            <a:schemeClr val="tx1"/>
+          </a:fontRef>
+        </p:style>
+      </p:cxnSp>
+      <p:sp>
+        <p:nvSpPr>
+          <p:cNvPr id="36" name="Lightning Bolt 35"/>
+          <p:cNvSpPr/>
+          <p:nvPr/>
+        </p:nvSpPr>
+        <p:spPr bwMode="gray">
+          <a:xfrm>
+            <a:off x="7381964" y="4071790"/>
+            <a:ext cx="303473" cy="499599"/>
+          </a:xfrm>
+          <a:prstGeom prst="lightningBolt">
+            <a:avLst/>
+          </a:prstGeom>
+          <a:ln>
+            <a:headEnd/>
+            <a:tailEnd/>
+          </a:ln>
+        </p:spPr>
+        <p:style>
+          <a:lnRef idx="2">
+            <a:schemeClr val="accent5">
+              <a:shade val="50000"/>
+            </a:schemeClr>
+          </a:lnRef>
+          <a:fillRef idx="1">
+            <a:schemeClr val="accent5"/>
+          </a:fillRef>
+          <a:effectRef idx="0">
+            <a:schemeClr val="accent5"/>
+          </a:effectRef>
+          <a:fontRef idx="minor">
+            <a:schemeClr val="lt1"/>
+          </a:fontRef>
+        </p:style>
+        <p:txBody>
+          <a:bodyPr lIns="90000" tIns="72000" rIns="90000" bIns="72000" rtlCol="0" anchor="ctr"/>
+          <a:lstStyle/>
+          <a:p>
+            <a:pPr marR="0" algn="ctr" defTabSz="914400" eaLnBrk="1" fontAlgn="base" latinLnBrk="0" hangingPunct="1">
+              <a:lnSpc>
+                <a:spcPct val="100000"/>
+              </a:lnSpc>
+              <a:spcBef>
+                <a:spcPct val="50000"/>
+              </a:spcBef>
+              <a:spcAft>
+                <a:spcPct val="0"/>
+              </a:spcAft>
+              <a:buClr>
+                <a:srgbClr val="F0AB00"/>
+              </a:buClr>
+              <a:buSzPct val="80000"/>
+              <a:tabLst/>
+            </a:pPr>
+            <a:endParaRPr kumimoji="0" lang="en-US" sz="1800" b="0" i="0" u="none" strike="noStrike" kern="0" cap="none" spc="0" normalizeH="0" baseline="0" noProof="0" dirty="0" err="1">
+              <a:ln>
+                <a:noFill/>
+              </a:ln>
+              <a:effectLst/>
+              <a:uLnTx/>
+              <a:uFillTx/>
+              <a:ea typeface="Arial Unicode MS" pitchFamily="34" charset="-128"/>
+              <a:cs typeface="Arial Unicode MS" pitchFamily="34" charset="-128"/>
+            </a:endParaRPr>
+          </a:p>
+        </p:txBody>
+      </p:sp>
+      <p:sp>
+        <p:nvSpPr>
+          <p:cNvPr id="28" name="Rectangle 27"/>
+          <p:cNvSpPr/>
+          <p:nvPr/>
+        </p:nvSpPr>
+        <p:spPr bwMode="gray">
+          <a:xfrm>
+            <a:off x="1698134" y="2825574"/>
+            <a:ext cx="1062486" cy="806724"/>
+          </a:xfrm>
+          <a:prstGeom prst="rect">
+            <a:avLst/>
+          </a:prstGeom>
+          <a:ln>
+            <a:headEnd/>
+            <a:tailEnd/>
+          </a:ln>
+        </p:spPr>
+        <p:style>
+          <a:lnRef idx="2">
+            <a:schemeClr val="accent2"/>
+          </a:lnRef>
+          <a:fillRef idx="1">
+            <a:schemeClr val="lt1"/>
+          </a:fillRef>
+          <a:effectRef idx="0">
+            <a:schemeClr val="accent2"/>
+          </a:effectRef>
+          <a:fontRef idx="minor">
+            <a:schemeClr val="dk1"/>
+          </a:fontRef>
+        </p:style>
+        <p:txBody>
+          <a:bodyPr lIns="90000" tIns="72000" rIns="90000" bIns="72000" rtlCol="0" anchor="ctr"/>
+          <a:lstStyle/>
+          <a:p>
+            <a:pPr marR="0" algn="ctr" defTabSz="914400" eaLnBrk="1" fontAlgn="base" latinLnBrk="0" hangingPunct="1">
+              <a:lnSpc>
+                <a:spcPct val="100000"/>
+              </a:lnSpc>
+              <a:spcBef>
+                <a:spcPct val="50000"/>
+              </a:spcBef>
+              <a:spcAft>
+                <a:spcPct val="0"/>
+              </a:spcAft>
+              <a:buClr>
+                <a:srgbClr val="F0AB00"/>
+              </a:buClr>
+              <a:buSzPct val="80000"/>
+              <a:tabLst/>
+            </a:pPr>
+            <a:r>
+              <a:rPr lang="en-US" sz="1800" kern="0" noProof="0" dirty="0">
+                <a:ea typeface="Arial Unicode MS" pitchFamily="34" charset="-128"/>
+                <a:cs typeface="Arial Unicode MS" pitchFamily="34" charset="-128"/>
+              </a:rPr>
+              <a:t>Pod</a:t>
+            </a:r>
+            <a:r>
+              <a:rPr lang="en-US" sz="1800" kern="0" dirty="0">
+                <a:ea typeface="Arial Unicode MS" pitchFamily="34" charset="-128"/>
+                <a:cs typeface="Arial Unicode MS" pitchFamily="34" charset="-128"/>
+              </a:rPr>
+              <a:t> A</a:t>
+            </a:r>
+            <a:endParaRPr kumimoji="0" lang="en-US" sz="1800" b="0" i="0" u="none" strike="noStrike" kern="0" cap="none" spc="0" normalizeH="0" baseline="0" noProof="0" dirty="0">
+              <a:ln>
+                <a:noFill/>
+              </a:ln>
+              <a:effectLst/>
+              <a:uLnTx/>
+              <a:uFillTx/>
+              <a:ea typeface="Arial Unicode MS" pitchFamily="34" charset="-128"/>
+              <a:cs typeface="Arial Unicode MS" pitchFamily="34" charset="-128"/>
+            </a:endParaRPr>
+          </a:p>
+        </p:txBody>
+      </p:sp>
+      <p:sp>
+        <p:nvSpPr>
+          <p:cNvPr id="29" name="Rectangle 28"/>
+          <p:cNvSpPr/>
+          <p:nvPr/>
+        </p:nvSpPr>
+        <p:spPr bwMode="gray">
+          <a:xfrm>
+            <a:off x="1698134" y="4488940"/>
+            <a:ext cx="1062486" cy="806724"/>
+          </a:xfrm>
+          <a:prstGeom prst="rect">
+            <a:avLst/>
+          </a:prstGeom>
+          <a:ln>
+            <a:headEnd/>
+            <a:tailEnd/>
+          </a:ln>
+        </p:spPr>
+        <p:style>
+          <a:lnRef idx="2">
+            <a:schemeClr val="accent2"/>
+          </a:lnRef>
+          <a:fillRef idx="1">
+            <a:schemeClr val="lt1"/>
+          </a:fillRef>
+          <a:effectRef idx="0">
+            <a:schemeClr val="accent2"/>
+          </a:effectRef>
+          <a:fontRef idx="minor">
+            <a:schemeClr val="dk1"/>
+          </a:fontRef>
+        </p:style>
+        <p:txBody>
+          <a:bodyPr lIns="90000" tIns="72000" rIns="90000" bIns="72000" rtlCol="0" anchor="ctr"/>
+          <a:lstStyle/>
+          <a:p>
+            <a:pPr marR="0" algn="ctr" defTabSz="914400" eaLnBrk="1" fontAlgn="base" latinLnBrk="0" hangingPunct="1">
+              <a:lnSpc>
+                <a:spcPct val="100000"/>
+              </a:lnSpc>
+              <a:spcBef>
+                <a:spcPct val="50000"/>
+              </a:spcBef>
+              <a:spcAft>
+                <a:spcPct val="0"/>
+              </a:spcAft>
+              <a:buClr>
+                <a:srgbClr val="F0AB00"/>
+              </a:buClr>
+              <a:buSzPct val="80000"/>
+              <a:tabLst/>
+            </a:pPr>
+            <a:r>
+              <a:rPr lang="en-US" sz="1800" kern="0" noProof="0" dirty="0">
+                <a:ea typeface="Arial Unicode MS" pitchFamily="34" charset="-128"/>
+                <a:cs typeface="Arial Unicode MS" pitchFamily="34" charset="-128"/>
+              </a:rPr>
+              <a:t>Pod</a:t>
+            </a:r>
+            <a:r>
+              <a:rPr lang="en-US" sz="1800" kern="0" dirty="0">
+                <a:ea typeface="Arial Unicode MS" pitchFamily="34" charset="-128"/>
+                <a:cs typeface="Arial Unicode MS" pitchFamily="34" charset="-128"/>
+              </a:rPr>
+              <a:t> A</a:t>
+            </a:r>
+            <a:endParaRPr kumimoji="0" lang="en-US" sz="1800" b="0" i="0" u="none" strike="noStrike" kern="0" cap="none" spc="0" normalizeH="0" baseline="0" noProof="0" dirty="0">
+              <a:ln>
+                <a:noFill/>
+              </a:ln>
+              <a:effectLst/>
+              <a:uLnTx/>
+              <a:uFillTx/>
+              <a:ea typeface="Arial Unicode MS" pitchFamily="34" charset="-128"/>
+              <a:cs typeface="Arial Unicode MS" pitchFamily="34" charset="-128"/>
+            </a:endParaRPr>
+          </a:p>
+        </p:txBody>
+      </p:sp>
+      <p:cxnSp>
+        <p:nvCxnSpPr>
+          <p:cNvPr id="30" name="Straight Arrow Connector 29"/>
+          <p:cNvCxnSpPr>
+            <a:stCxn id="29" idx="3"/>
+            <a:endCxn id="7" idx="1"/>
+          </p:cNvCxnSpPr>
+          <p:nvPr/>
+        </p:nvCxnSpPr>
+        <p:spPr>
+          <a:xfrm flipV="1">
+            <a:off x="2760620" y="3985279"/>
+            <a:ext cx="1719080" cy="907023"/>
+          </a:xfrm>
+          <a:prstGeom prst="straightConnector1">
+            <a:avLst/>
+          </a:prstGeom>
+          <a:ln w="38100">
+            <a:solidFill>
+              <a:schemeClr val="accent5"/>
+            </a:solidFill>
+            <a:headEnd type="none" w="med" len="med"/>
+            <a:tailEnd type="triangle"/>
+          </a:ln>
+        </p:spPr>
+        <p:style>
+          <a:lnRef idx="1">
+            <a:schemeClr val="accent1"/>
+          </a:lnRef>
+          <a:fillRef idx="0">
+            <a:schemeClr val="accent1"/>
+          </a:fillRef>
+          <a:effectRef idx="0">
+            <a:schemeClr val="accent1"/>
+          </a:effectRef>
+          <a:fontRef idx="minor">
+            <a:schemeClr val="tx1"/>
+          </a:fontRef>
+        </p:style>
+      </p:cxnSp>
+      <p:sp>
+        <p:nvSpPr>
+          <p:cNvPr id="39" name="Flowchart: Document 38"/>
+          <p:cNvSpPr/>
+          <p:nvPr/>
+        </p:nvSpPr>
+        <p:spPr bwMode="gray">
+          <a:xfrm>
+            <a:off x="8133625" y="4782370"/>
+            <a:ext cx="1506583" cy="766354"/>
+          </a:xfrm>
+          <a:prstGeom prst="flowChartDocument">
+            <a:avLst/>
+          </a:prstGeom>
+          <a:ln>
+            <a:headEnd/>
+            <a:tailEnd/>
+          </a:ln>
+        </p:spPr>
+        <p:style>
+          <a:lnRef idx="2">
+            <a:schemeClr val="accent5"/>
+          </a:lnRef>
+          <a:fillRef idx="1">
+            <a:schemeClr val="lt1"/>
+          </a:fillRef>
+          <a:effectRef idx="0">
+            <a:schemeClr val="accent5"/>
+          </a:effectRef>
+          <a:fontRef idx="minor">
+            <a:schemeClr val="dk1"/>
+          </a:fontRef>
+        </p:style>
+        <p:txBody>
+          <a:bodyPr lIns="90000" tIns="72000" rIns="90000" bIns="72000" rtlCol="0" anchor="ctr"/>
+          <a:lstStyle/>
+          <a:p>
+            <a:pPr algn="ctr" defTabSz="914400" fontAlgn="base">
+              <a:spcBef>
+                <a:spcPct val="50000"/>
+              </a:spcBef>
+              <a:spcAft>
+                <a:spcPct val="0"/>
+              </a:spcAft>
+              <a:buClr>
+                <a:srgbClr val="F0AB00"/>
+              </a:buClr>
+              <a:buSzPct val="80000"/>
+            </a:pPr>
+            <a:r>
+              <a:rPr lang="en-US" sz="1800" kern="0" dirty="0">
+                <a:ea typeface="Arial Unicode MS" pitchFamily="34" charset="-128"/>
+                <a:cs typeface="Arial Unicode MS" pitchFamily="34" charset="-128"/>
+              </a:rPr>
+              <a:t>Selector: app: </a:t>
+            </a:r>
+            <a:r>
+              <a:rPr lang="en-US" sz="1800" kern="0" dirty="0" err="1">
+                <a:ea typeface="Arial Unicode MS" pitchFamily="34" charset="-128"/>
+                <a:cs typeface="Arial Unicode MS" pitchFamily="34" charset="-128"/>
+              </a:rPr>
+              <a:t>nginx</a:t>
+            </a:r>
+            <a:endParaRPr lang="en-US" sz="1800" kern="0" dirty="0">
+              <a:ea typeface="Arial Unicode MS" pitchFamily="34" charset="-128"/>
+              <a:cs typeface="Arial Unicode MS" pitchFamily="34" charset="-128"/>
+            </a:endParaRPr>
+          </a:p>
+        </p:txBody>
+      </p:sp>
+      <p:sp>
+        <p:nvSpPr>
+          <p:cNvPr id="49" name="Rectangle 48"/>
+          <p:cNvSpPr/>
+          <p:nvPr/>
+        </p:nvSpPr>
+        <p:spPr bwMode="gray">
+          <a:xfrm>
+            <a:off x="9522959" y="3385000"/>
+            <a:ext cx="1645920" cy="365760"/>
+          </a:xfrm>
+          <a:prstGeom prst="rect">
+            <a:avLst/>
+          </a:prstGeom>
+          <a:ln>
+            <a:headEnd/>
+            <a:tailEnd/>
+          </a:ln>
+        </p:spPr>
+        <p:style>
+          <a:lnRef idx="2">
+            <a:schemeClr val="accent2"/>
+          </a:lnRef>
+          <a:fillRef idx="1">
+            <a:schemeClr val="lt1"/>
+          </a:fillRef>
+          <a:effectRef idx="0">
+            <a:schemeClr val="accent2"/>
+          </a:effectRef>
+          <a:fontRef idx="minor">
+            <a:schemeClr val="dk1"/>
+          </a:fontRef>
+        </p:style>
+        <p:txBody>
+          <a:bodyPr lIns="90000" tIns="72000" rIns="90000" bIns="72000" rtlCol="0" anchor="ctr"/>
+          <a:lstStyle/>
+          <a:p>
+            <a:pPr marR="0" algn="ctr" defTabSz="914400" eaLnBrk="1" fontAlgn="base" latinLnBrk="0" hangingPunct="1">
+              <a:lnSpc>
+                <a:spcPct val="100000"/>
+              </a:lnSpc>
+              <a:spcBef>
+                <a:spcPct val="50000"/>
+              </a:spcBef>
+              <a:spcAft>
+                <a:spcPct val="0"/>
+              </a:spcAft>
+              <a:buClr>
+                <a:srgbClr val="F0AB00"/>
+              </a:buClr>
+              <a:buSzPct val="80000"/>
+              <a:tabLst/>
+            </a:pPr>
+            <a:r>
+              <a:rPr lang="de-DE" sz="1800" kern="0" dirty="0" err="1">
+                <a:ea typeface="Arial Unicode MS" pitchFamily="34" charset="-128"/>
+                <a:cs typeface="Arial Unicode MS" pitchFamily="34" charset="-128"/>
+              </a:rPr>
+              <a:t>app</a:t>
+            </a:r>
+            <a:r>
+              <a:rPr lang="de-DE" sz="1800" kern="0" dirty="0">
+                <a:ea typeface="Arial Unicode MS" pitchFamily="34" charset="-128"/>
+                <a:cs typeface="Arial Unicode MS" pitchFamily="34" charset="-128"/>
+              </a:rPr>
+              <a:t>: </a:t>
+            </a:r>
+            <a:r>
+              <a:rPr lang="de-DE" sz="1800" kern="0" dirty="0" err="1">
+                <a:ea typeface="Arial Unicode MS" pitchFamily="34" charset="-128"/>
+                <a:cs typeface="Arial Unicode MS" pitchFamily="34" charset="-128"/>
+              </a:rPr>
+              <a:t>nginx</a:t>
+            </a:r>
+            <a:endParaRPr kumimoji="0" lang="de-DE" sz="1800" b="0" i="0" u="none" strike="noStrike" kern="0" cap="none" spc="0" normalizeH="0" baseline="0" noProof="0" dirty="0">
+              <a:ln>
+                <a:noFill/>
+              </a:ln>
+              <a:effectLst/>
+              <a:uLnTx/>
+              <a:uFillTx/>
+              <a:ea typeface="Arial Unicode MS" pitchFamily="34" charset="-128"/>
+              <a:cs typeface="Arial Unicode MS" pitchFamily="34" charset="-128"/>
+            </a:endParaRPr>
+          </a:p>
+        </p:txBody>
+      </p:sp>
+      <p:sp>
+        <p:nvSpPr>
+          <p:cNvPr id="50" name="Flowchart: Document 49"/>
+          <p:cNvSpPr/>
+          <p:nvPr/>
+        </p:nvSpPr>
+        <p:spPr bwMode="gray">
+          <a:xfrm>
+            <a:off x="5986539" y="4718721"/>
+            <a:ext cx="1506583" cy="766354"/>
+          </a:xfrm>
+          <a:prstGeom prst="flowChartDocument">
+            <a:avLst/>
+          </a:prstGeom>
+          <a:ln>
+            <a:headEnd/>
+            <a:tailEnd/>
+          </a:ln>
+        </p:spPr>
+        <p:style>
+          <a:lnRef idx="2">
+            <a:schemeClr val="accent5"/>
+          </a:lnRef>
+          <a:fillRef idx="1">
+            <a:schemeClr val="lt1"/>
+          </a:fillRef>
+          <a:effectRef idx="0">
+            <a:schemeClr val="accent5"/>
+          </a:effectRef>
+          <a:fontRef idx="minor">
+            <a:schemeClr val="dk1"/>
+          </a:fontRef>
+        </p:style>
+        <p:txBody>
+          <a:bodyPr lIns="90000" tIns="72000" rIns="90000" bIns="72000" rtlCol="0" anchor="ctr"/>
+          <a:lstStyle/>
+          <a:p>
+            <a:pPr algn="ctr" defTabSz="914400" fontAlgn="base">
+              <a:spcBef>
+                <a:spcPct val="50000"/>
+              </a:spcBef>
+              <a:spcAft>
+                <a:spcPct val="0"/>
+              </a:spcAft>
+              <a:buClr>
+                <a:srgbClr val="F0AB00"/>
+              </a:buClr>
+              <a:buSzPct val="80000"/>
+            </a:pPr>
+            <a:r>
+              <a:rPr lang="en-US" sz="1800" kern="0" dirty="0">
+                <a:ea typeface="Arial Unicode MS" pitchFamily="34" charset="-128"/>
+                <a:cs typeface="Arial Unicode MS" pitchFamily="34" charset="-128"/>
+              </a:rPr>
+              <a:t>Selector: access: ok</a:t>
+            </a:r>
+          </a:p>
+        </p:txBody>
+      </p:sp>
+      <p:sp>
+        <p:nvSpPr>
+          <p:cNvPr id="51" name="Rectangle 50"/>
+          <p:cNvSpPr/>
+          <p:nvPr/>
+        </p:nvSpPr>
+        <p:spPr bwMode="gray">
+          <a:xfrm>
+            <a:off x="2229377" y="2574739"/>
+            <a:ext cx="1645920" cy="365760"/>
+          </a:xfrm>
+          <a:prstGeom prst="rect">
+            <a:avLst/>
+          </a:prstGeom>
+          <a:ln>
+            <a:headEnd/>
+            <a:tailEnd/>
+          </a:ln>
+        </p:spPr>
+        <p:style>
+          <a:lnRef idx="2">
+            <a:schemeClr val="accent2"/>
+          </a:lnRef>
+          <a:fillRef idx="1">
+            <a:schemeClr val="lt1"/>
+          </a:fillRef>
+          <a:effectRef idx="0">
+            <a:schemeClr val="accent2"/>
+          </a:effectRef>
+          <a:fontRef idx="minor">
+            <a:schemeClr val="dk1"/>
+          </a:fontRef>
+        </p:style>
+        <p:txBody>
+          <a:bodyPr lIns="90000" tIns="72000" rIns="90000" bIns="72000" rtlCol="0" anchor="ctr"/>
+          <a:lstStyle/>
+          <a:p>
+            <a:pPr marR="0" algn="ctr" defTabSz="914400" eaLnBrk="1" fontAlgn="base" latinLnBrk="0" hangingPunct="1">
+              <a:lnSpc>
+                <a:spcPct val="100000"/>
+              </a:lnSpc>
+              <a:spcBef>
+                <a:spcPct val="50000"/>
+              </a:spcBef>
+              <a:spcAft>
+                <a:spcPct val="0"/>
+              </a:spcAft>
+              <a:buClr>
+                <a:srgbClr val="F0AB00"/>
+              </a:buClr>
+              <a:buSzPct val="80000"/>
+              <a:tabLst/>
+            </a:pPr>
+            <a:r>
+              <a:rPr lang="de-DE" sz="1800" kern="0" dirty="0" err="1">
+                <a:ea typeface="Arial Unicode MS" pitchFamily="34" charset="-128"/>
+                <a:cs typeface="Arial Unicode MS" pitchFamily="34" charset="-128"/>
+              </a:rPr>
+              <a:t>access</a:t>
+            </a:r>
+            <a:r>
+              <a:rPr lang="de-DE" sz="1800" kern="0" dirty="0">
+                <a:ea typeface="Arial Unicode MS" pitchFamily="34" charset="-128"/>
+                <a:cs typeface="Arial Unicode MS" pitchFamily="34" charset="-128"/>
+              </a:rPr>
+              <a:t>: ok</a:t>
+            </a:r>
+            <a:endParaRPr kumimoji="0" lang="de-DE" sz="1800" b="0" i="0" u="none" strike="noStrike" kern="0" cap="none" spc="0" normalizeH="0" baseline="0" noProof="0" dirty="0">
+              <a:ln>
+                <a:noFill/>
+              </a:ln>
+              <a:effectLst/>
+              <a:uLnTx/>
+              <a:uFillTx/>
+              <a:ea typeface="Arial Unicode MS" pitchFamily="34" charset="-128"/>
+              <a:cs typeface="Arial Unicode MS" pitchFamily="34" charset="-128"/>
+            </a:endParaRPr>
+          </a:p>
+        </p:txBody>
+      </p:sp>
+      <p:sp>
+        <p:nvSpPr>
+          <p:cNvPr id="52" name="Rectangle 51"/>
+          <p:cNvSpPr/>
+          <p:nvPr/>
+        </p:nvSpPr>
+        <p:spPr bwMode="gray">
+          <a:xfrm>
+            <a:off x="2351297" y="5119315"/>
+            <a:ext cx="1645920" cy="365760"/>
+          </a:xfrm>
+          <a:prstGeom prst="rect">
+            <a:avLst/>
+          </a:prstGeom>
+          <a:ln>
+            <a:headEnd/>
+            <a:tailEnd/>
+          </a:ln>
+        </p:spPr>
+        <p:style>
+          <a:lnRef idx="2">
+            <a:schemeClr val="accent2"/>
+          </a:lnRef>
+          <a:fillRef idx="1">
+            <a:schemeClr val="lt1"/>
+          </a:fillRef>
+          <a:effectRef idx="0">
+            <a:schemeClr val="accent2"/>
+          </a:effectRef>
+          <a:fontRef idx="minor">
+            <a:schemeClr val="dk1"/>
+          </a:fontRef>
+        </p:style>
+        <p:txBody>
+          <a:bodyPr lIns="90000" tIns="72000" rIns="90000" bIns="72000" rtlCol="0" anchor="ctr"/>
+          <a:lstStyle/>
+          <a:p>
+            <a:pPr marR="0" algn="ctr" defTabSz="914400" eaLnBrk="1" fontAlgn="base" latinLnBrk="0" hangingPunct="1">
+              <a:lnSpc>
+                <a:spcPct val="100000"/>
+              </a:lnSpc>
+              <a:spcBef>
+                <a:spcPct val="50000"/>
+              </a:spcBef>
+              <a:spcAft>
+                <a:spcPct val="0"/>
+              </a:spcAft>
+              <a:buClr>
+                <a:srgbClr val="F0AB00"/>
+              </a:buClr>
+              <a:buSzPct val="80000"/>
+              <a:tabLst/>
+            </a:pPr>
+            <a:r>
+              <a:rPr lang="de-DE" sz="1800" kern="0" dirty="0" err="1">
+                <a:ea typeface="Arial Unicode MS" pitchFamily="34" charset="-128"/>
+                <a:cs typeface="Arial Unicode MS" pitchFamily="34" charset="-128"/>
+              </a:rPr>
+              <a:t>access</a:t>
+            </a:r>
+            <a:r>
+              <a:rPr lang="de-DE" sz="1800" kern="0" dirty="0">
+                <a:ea typeface="Arial Unicode MS" pitchFamily="34" charset="-128"/>
+                <a:cs typeface="Arial Unicode MS" pitchFamily="34" charset="-128"/>
+              </a:rPr>
+              <a:t>: not ok</a:t>
+            </a:r>
+            <a:endParaRPr kumimoji="0" lang="de-DE" sz="1800" b="0" i="0" u="none" strike="noStrike" kern="0" cap="none" spc="0" normalizeH="0" baseline="0" noProof="0" dirty="0">
+              <a:ln>
+                <a:noFill/>
+              </a:ln>
+              <a:effectLst/>
+              <a:uLnTx/>
+              <a:uFillTx/>
+              <a:ea typeface="Arial Unicode MS" pitchFamily="34" charset="-128"/>
+              <a:cs typeface="Arial Unicode MS" pitchFamily="34" charset="-128"/>
+            </a:endParaRPr>
+          </a:p>
+        </p:txBody>
+      </p:sp>
+    </p:spTree>
+    <p:extLst>
+      <p:ext uri="{BB962C8B-B14F-4D97-AF65-F5344CB8AC3E}">
+        <p14:creationId xmlns:p14="http://schemas.microsoft.com/office/powerpoint/2010/main" val="4084543091"/>
+      </p:ext>
+    </p:extLst>
+  </p:cSld>
+  <p:clrMapOvr>
+    <a:masterClrMapping/>
+  </p:clrMapOvr>
+</p:sld>
+</file>
+
+<file path=ppt/slides/slide11.xml><?xml version="1.0" encoding="utf-8"?>
 <p:sld xmlns:a="http://schemas.openxmlformats.org/drawingml/2006/main" xmlns:r="http://schemas.openxmlformats.org/officeDocument/2006/relationships" xmlns:p="http://schemas.openxmlformats.org/presentationml/2006/main" show="0">
   <p:cSld>
     <p:spTree>
@@ -15062,7 +16270,7 @@
 </p:sld>
 </file>
 
-<file path=ppt/slides/slide11.xml><?xml version="1.0" encoding="utf-8"?>
+<file path=ppt/slides/slide12.xml><?xml version="1.0" encoding="utf-8"?>
 <p:sld xmlns:a="http://schemas.openxmlformats.org/drawingml/2006/main" xmlns:r="http://schemas.openxmlformats.org/officeDocument/2006/relationships" xmlns:p="http://schemas.openxmlformats.org/presentationml/2006/main">
   <p:cSld>
     <p:spTree>
@@ -16282,7 +17490,7 @@
 </p:sld>
 </file>
 
-<file path=ppt/slides/slide12.xml><?xml version="1.0" encoding="utf-8"?>
+<file path=ppt/slides/slide13.xml><?xml version="1.0" encoding="utf-8"?>
 <p:sld xmlns:a="http://schemas.openxmlformats.org/drawingml/2006/main" xmlns:r="http://schemas.openxmlformats.org/officeDocument/2006/relationships" xmlns:p="http://schemas.openxmlformats.org/presentationml/2006/main">
   <p:cSld>
     <p:spTree>
@@ -17387,7 +18595,7 @@
 </p:sld>
 </file>
 
-<file path=ppt/slides/slide13.xml><?xml version="1.0" encoding="utf-8"?>
+<file path=ppt/slides/slide14.xml><?xml version="1.0" encoding="utf-8"?>
 <p:sld xmlns:a="http://schemas.openxmlformats.org/drawingml/2006/main" xmlns:r="http://schemas.openxmlformats.org/officeDocument/2006/relationships" xmlns:p="http://schemas.openxmlformats.org/presentationml/2006/main">
   <p:cSld>
     <p:spTree>
@@ -17959,7 +19167,7 @@
 </p:sld>
 </file>
 
-<file path=ppt/slides/slide14.xml><?xml version="1.0" encoding="utf-8"?>
+<file path=ppt/slides/slide15.xml><?xml version="1.0" encoding="utf-8"?>
 <p:sld xmlns:a="http://schemas.openxmlformats.org/drawingml/2006/main" xmlns:r="http://schemas.openxmlformats.org/officeDocument/2006/relationships" xmlns:p="http://schemas.openxmlformats.org/presentationml/2006/main" show="0">
   <p:cSld>
     <p:spTree>
@@ -19683,6 +20891,1339 @@
           <a:p>
             <a:r>
               <a:rPr lang="en-US" dirty="0"/>
+              <a:t>Image Pulling</a:t>
+            </a:r>
+          </a:p>
+        </p:txBody>
+      </p:sp>
+      <p:grpSp>
+        <p:nvGrpSpPr>
+          <p:cNvPr id="13" name="Group 12"/>
+          <p:cNvGrpSpPr/>
+          <p:nvPr/>
+        </p:nvGrpSpPr>
+        <p:grpSpPr>
+          <a:xfrm>
+            <a:off x="4245927" y="1893570"/>
+            <a:ext cx="3703320" cy="3070860"/>
+            <a:chOff x="4359564" y="2183247"/>
+            <a:chExt cx="3703320" cy="3070860"/>
+          </a:xfrm>
+        </p:grpSpPr>
+        <p:sp>
+          <p:nvSpPr>
+            <p:cNvPr id="4" name="Rectangle 3"/>
+            <p:cNvSpPr/>
+            <p:nvPr/>
+          </p:nvSpPr>
+          <p:spPr bwMode="gray">
+            <a:xfrm>
+              <a:off x="4359564" y="2183247"/>
+              <a:ext cx="3703320" cy="3070860"/>
+            </a:xfrm>
+            <a:prstGeom prst="rect">
+              <a:avLst/>
+            </a:prstGeom>
+            <a:ln>
+              <a:headEnd/>
+              <a:tailEnd/>
+            </a:ln>
+          </p:spPr>
+          <p:style>
+            <a:lnRef idx="1">
+              <a:schemeClr val="accent2"/>
+            </a:lnRef>
+            <a:fillRef idx="2">
+              <a:schemeClr val="accent2"/>
+            </a:fillRef>
+            <a:effectRef idx="1">
+              <a:schemeClr val="accent2"/>
+            </a:effectRef>
+            <a:fontRef idx="minor">
+              <a:schemeClr val="dk1"/>
+            </a:fontRef>
+          </p:style>
+          <p:txBody>
+            <a:bodyPr lIns="90000" tIns="72000" rIns="90000" bIns="72000" rtlCol="0" anchor="t"/>
+            <a:lstStyle/>
+            <a:p>
+              <a:pPr algn="ctr" defTabSz="914400" fontAlgn="base">
+                <a:spcBef>
+                  <a:spcPct val="50000"/>
+                </a:spcBef>
+                <a:spcAft>
+                  <a:spcPct val="0"/>
+                </a:spcAft>
+                <a:buClr>
+                  <a:srgbClr val="F0AB00"/>
+                </a:buClr>
+                <a:buSzPct val="80000"/>
+              </a:pPr>
+              <a:r>
+                <a:rPr lang="de-DE" sz="2400" b="1" kern="0" dirty="0">
+                  <a:ea typeface="Arial Unicode MS" pitchFamily="34" charset="-128"/>
+                  <a:cs typeface="Arial Unicode MS" pitchFamily="34" charset="-128"/>
+                </a:rPr>
+                <a:t>Worker</a:t>
+              </a:r>
+            </a:p>
+          </p:txBody>
+        </p:sp>
+        <p:sp>
+          <p:nvSpPr>
+            <p:cNvPr id="5" name="Rectangle 4"/>
+            <p:cNvSpPr/>
+            <p:nvPr/>
+          </p:nvSpPr>
+          <p:spPr bwMode="gray">
+            <a:xfrm>
+              <a:off x="4489104" y="3428273"/>
+              <a:ext cx="3467358" cy="1653431"/>
+            </a:xfrm>
+            <a:prstGeom prst="rect">
+              <a:avLst/>
+            </a:prstGeom>
+            <a:solidFill>
+              <a:schemeClr val="accent1">
+                <a:lumMod val="60000"/>
+                <a:lumOff val="40000"/>
+              </a:schemeClr>
+            </a:solidFill>
+            <a:ln>
+              <a:headEnd/>
+              <a:tailEnd/>
+            </a:ln>
+          </p:spPr>
+          <p:style>
+            <a:lnRef idx="1">
+              <a:schemeClr val="accent1"/>
+            </a:lnRef>
+            <a:fillRef idx="2">
+              <a:schemeClr val="accent1"/>
+            </a:fillRef>
+            <a:effectRef idx="1">
+              <a:schemeClr val="accent1"/>
+            </a:effectRef>
+            <a:fontRef idx="minor">
+              <a:schemeClr val="dk1"/>
+            </a:fontRef>
+          </p:style>
+          <p:txBody>
+            <a:bodyPr lIns="90000" tIns="72000" rIns="90000" bIns="72000" rtlCol="0" anchor="b"/>
+            <a:lstStyle/>
+            <a:p>
+              <a:pPr marR="0" defTabSz="914400" eaLnBrk="1" fontAlgn="base" latinLnBrk="0" hangingPunct="1">
+                <a:lnSpc>
+                  <a:spcPct val="100000"/>
+                </a:lnSpc>
+                <a:spcBef>
+                  <a:spcPct val="50000"/>
+                </a:spcBef>
+                <a:spcAft>
+                  <a:spcPct val="0"/>
+                </a:spcAft>
+                <a:buClr>
+                  <a:srgbClr val="F0AB00"/>
+                </a:buClr>
+                <a:buSzPct val="80000"/>
+                <a:tabLst/>
+              </a:pPr>
+              <a:r>
+                <a:rPr lang="de-DE" sz="2000" b="1" kern="0" noProof="0" dirty="0">
+                  <a:ea typeface="Arial Unicode MS" pitchFamily="34" charset="-128"/>
+                  <a:cs typeface="Arial Unicode MS" pitchFamily="34" charset="-128"/>
+                </a:rPr>
+                <a:t>D</a:t>
+              </a:r>
+              <a:r>
+                <a:rPr kumimoji="0" lang="de-DE" sz="2000" b="1" i="0" strike="noStrike" kern="0" cap="none" spc="0" normalizeH="0" baseline="0" noProof="0" dirty="0">
+                  <a:ln>
+                    <a:noFill/>
+                  </a:ln>
+                  <a:effectLst/>
+                  <a:uLnTx/>
+                  <a:uFillTx/>
+                  <a:ea typeface="Arial Unicode MS" pitchFamily="34" charset="-128"/>
+                  <a:cs typeface="Arial Unicode MS" pitchFamily="34" charset="-128"/>
+                </a:rPr>
+                <a:t>ocker</a:t>
+              </a:r>
+              <a:endParaRPr kumimoji="0" lang="de-DE" sz="2400" b="1" i="0" strike="noStrike" kern="0" cap="none" spc="0" normalizeH="0" baseline="0" noProof="0" dirty="0">
+                <a:ln>
+                  <a:noFill/>
+                </a:ln>
+                <a:effectLst/>
+                <a:uLnTx/>
+                <a:uFillTx/>
+                <a:ea typeface="Arial Unicode MS" pitchFamily="34" charset="-128"/>
+                <a:cs typeface="Arial Unicode MS" pitchFamily="34" charset="-128"/>
+              </a:endParaRPr>
+            </a:p>
+          </p:txBody>
+        </p:sp>
+        <p:sp>
+          <p:nvSpPr>
+            <p:cNvPr id="6" name="Rectangle 5"/>
+            <p:cNvSpPr/>
+            <p:nvPr/>
+          </p:nvSpPr>
+          <p:spPr bwMode="gray">
+            <a:xfrm>
+              <a:off x="4900686" y="3874409"/>
+              <a:ext cx="1208595" cy="773906"/>
+            </a:xfrm>
+            <a:prstGeom prst="rect">
+              <a:avLst/>
+            </a:prstGeom>
+            <a:ln>
+              <a:headEnd/>
+              <a:tailEnd/>
+            </a:ln>
+          </p:spPr>
+          <p:style>
+            <a:lnRef idx="2">
+              <a:schemeClr val="accent2">
+                <a:shade val="50000"/>
+              </a:schemeClr>
+            </a:lnRef>
+            <a:fillRef idx="1">
+              <a:schemeClr val="accent2"/>
+            </a:fillRef>
+            <a:effectRef idx="0">
+              <a:schemeClr val="accent2"/>
+            </a:effectRef>
+            <a:fontRef idx="minor">
+              <a:schemeClr val="lt1"/>
+            </a:fontRef>
+          </p:style>
+          <p:txBody>
+            <a:bodyPr lIns="90000" tIns="72000" rIns="90000" bIns="72000" rtlCol="0" anchor="ctr"/>
+            <a:lstStyle/>
+            <a:p>
+              <a:pPr marR="0" algn="ctr" defTabSz="914400" eaLnBrk="1" fontAlgn="base" latinLnBrk="0" hangingPunct="1">
+                <a:lnSpc>
+                  <a:spcPct val="100000"/>
+                </a:lnSpc>
+                <a:spcBef>
+                  <a:spcPct val="50000"/>
+                </a:spcBef>
+                <a:spcAft>
+                  <a:spcPct val="0"/>
+                </a:spcAft>
+                <a:buClr>
+                  <a:srgbClr val="F0AB00"/>
+                </a:buClr>
+                <a:buSzPct val="80000"/>
+                <a:tabLst/>
+              </a:pPr>
+              <a:r>
+                <a:rPr lang="de-DE" sz="1600" b="1" kern="0" noProof="0" dirty="0" err="1">
+                  <a:ea typeface="Arial Unicode MS" pitchFamily="34" charset="-128"/>
+                  <a:cs typeface="Arial Unicode MS" pitchFamily="34" charset="-128"/>
+                </a:rPr>
+                <a:t>Pod</a:t>
+              </a:r>
+              <a:endParaRPr kumimoji="0" lang="de-DE" sz="1600" b="1" i="0" u="none" strike="noStrike" kern="0" cap="none" spc="0" normalizeH="0" baseline="0" noProof="0" dirty="0">
+                <a:ln>
+                  <a:noFill/>
+                </a:ln>
+                <a:effectLst/>
+                <a:uLnTx/>
+                <a:uFillTx/>
+                <a:ea typeface="Arial Unicode MS" pitchFamily="34" charset="-128"/>
+                <a:cs typeface="Arial Unicode MS" pitchFamily="34" charset="-128"/>
+              </a:endParaRPr>
+            </a:p>
+          </p:txBody>
+        </p:sp>
+        <p:sp>
+          <p:nvSpPr>
+            <p:cNvPr id="7" name="Rectangle 6"/>
+            <p:cNvSpPr/>
+            <p:nvPr/>
+          </p:nvSpPr>
+          <p:spPr bwMode="gray">
+            <a:xfrm>
+              <a:off x="6418302" y="3874409"/>
+              <a:ext cx="1208595" cy="773906"/>
+            </a:xfrm>
+            <a:prstGeom prst="rect">
+              <a:avLst/>
+            </a:prstGeom>
+            <a:ln>
+              <a:headEnd/>
+              <a:tailEnd/>
+            </a:ln>
+          </p:spPr>
+          <p:style>
+            <a:lnRef idx="2">
+              <a:schemeClr val="accent2">
+                <a:shade val="50000"/>
+              </a:schemeClr>
+            </a:lnRef>
+            <a:fillRef idx="1">
+              <a:schemeClr val="accent2"/>
+            </a:fillRef>
+            <a:effectRef idx="0">
+              <a:schemeClr val="accent2"/>
+            </a:effectRef>
+            <a:fontRef idx="minor">
+              <a:schemeClr val="lt1"/>
+            </a:fontRef>
+          </p:style>
+          <p:txBody>
+            <a:bodyPr lIns="90000" tIns="72000" rIns="90000" bIns="72000" rtlCol="0" anchor="ctr"/>
+            <a:lstStyle/>
+            <a:p>
+              <a:pPr marR="0" algn="ctr" defTabSz="914400" eaLnBrk="1" fontAlgn="base" latinLnBrk="0" hangingPunct="1">
+                <a:lnSpc>
+                  <a:spcPct val="100000"/>
+                </a:lnSpc>
+                <a:spcBef>
+                  <a:spcPct val="50000"/>
+                </a:spcBef>
+                <a:spcAft>
+                  <a:spcPct val="0"/>
+                </a:spcAft>
+                <a:buClr>
+                  <a:srgbClr val="F0AB00"/>
+                </a:buClr>
+                <a:buSzPct val="80000"/>
+                <a:tabLst/>
+              </a:pPr>
+              <a:r>
+                <a:rPr lang="de-DE" sz="1600" b="1" kern="0" noProof="0" dirty="0" err="1">
+                  <a:ea typeface="Arial Unicode MS" pitchFamily="34" charset="-128"/>
+                  <a:cs typeface="Arial Unicode MS" pitchFamily="34" charset="-128"/>
+                </a:rPr>
+                <a:t>Pod</a:t>
+              </a:r>
+              <a:endParaRPr kumimoji="0" lang="de-DE" sz="1600" b="1" i="0" u="none" strike="noStrike" kern="0" cap="none" spc="0" normalizeH="0" baseline="0" noProof="0" dirty="0">
+                <a:ln>
+                  <a:noFill/>
+                </a:ln>
+                <a:effectLst/>
+                <a:uLnTx/>
+                <a:uFillTx/>
+                <a:ea typeface="Arial Unicode MS" pitchFamily="34" charset="-128"/>
+                <a:cs typeface="Arial Unicode MS" pitchFamily="34" charset="-128"/>
+              </a:endParaRPr>
+            </a:p>
+          </p:txBody>
+        </p:sp>
+      </p:grpSp>
+      <p:sp>
+        <p:nvSpPr>
+          <p:cNvPr id="14" name="Rectangle 13"/>
+          <p:cNvSpPr/>
+          <p:nvPr/>
+        </p:nvSpPr>
+        <p:spPr bwMode="gray">
+          <a:xfrm>
+            <a:off x="3450210" y="1509330"/>
+            <a:ext cx="6938127" cy="4420130"/>
+          </a:xfrm>
+          <a:prstGeom prst="rect">
+            <a:avLst/>
+          </a:prstGeom>
+          <a:solidFill>
+            <a:schemeClr val="accent1">
+              <a:lumMod val="60000"/>
+              <a:lumOff val="40000"/>
+            </a:schemeClr>
+          </a:solidFill>
+          <a:ln>
+            <a:headEnd/>
+            <a:tailEnd/>
+          </a:ln>
+        </p:spPr>
+        <p:style>
+          <a:lnRef idx="1">
+            <a:schemeClr val="accent1"/>
+          </a:lnRef>
+          <a:fillRef idx="2">
+            <a:schemeClr val="accent1"/>
+          </a:fillRef>
+          <a:effectRef idx="1">
+            <a:schemeClr val="accent1"/>
+          </a:effectRef>
+          <a:fontRef idx="minor">
+            <a:schemeClr val="dk1"/>
+          </a:fontRef>
+        </p:style>
+        <p:txBody>
+          <a:bodyPr lIns="90000" tIns="72000" rIns="90000" bIns="72000" rtlCol="0" anchor="b"/>
+          <a:lstStyle/>
+          <a:p>
+            <a:pPr marR="0" defTabSz="914400" eaLnBrk="1" fontAlgn="base" latinLnBrk="0" hangingPunct="1">
+              <a:lnSpc>
+                <a:spcPct val="100000"/>
+              </a:lnSpc>
+              <a:spcBef>
+                <a:spcPct val="50000"/>
+              </a:spcBef>
+              <a:spcAft>
+                <a:spcPct val="0"/>
+              </a:spcAft>
+              <a:buClr>
+                <a:srgbClr val="F0AB00"/>
+              </a:buClr>
+              <a:buSzPct val="80000"/>
+              <a:tabLst/>
+            </a:pPr>
+            <a:r>
+              <a:rPr lang="de-DE" sz="2000" b="1" kern="0" noProof="0" dirty="0">
+                <a:ea typeface="Arial Unicode MS" pitchFamily="34" charset="-128"/>
+                <a:cs typeface="Arial Unicode MS" pitchFamily="34" charset="-128"/>
+              </a:rPr>
+              <a:t>D</a:t>
+            </a:r>
+            <a:r>
+              <a:rPr kumimoji="0" lang="de-DE" sz="2000" b="1" i="0" strike="noStrike" kern="0" cap="none" spc="0" normalizeH="0" baseline="0" noProof="0" dirty="0">
+                <a:ln>
+                  <a:noFill/>
+                </a:ln>
+                <a:effectLst/>
+                <a:uLnTx/>
+                <a:uFillTx/>
+                <a:ea typeface="Arial Unicode MS" pitchFamily="34" charset="-128"/>
+                <a:cs typeface="Arial Unicode MS" pitchFamily="34" charset="-128"/>
+              </a:rPr>
+              <a:t>ocker</a:t>
+            </a:r>
+            <a:endParaRPr kumimoji="0" lang="de-DE" sz="2400" b="1" i="0" strike="noStrike" kern="0" cap="none" spc="0" normalizeH="0" baseline="0" noProof="0" dirty="0">
+              <a:ln>
+                <a:noFill/>
+              </a:ln>
+              <a:effectLst/>
+              <a:uLnTx/>
+              <a:uFillTx/>
+              <a:ea typeface="Arial Unicode MS" pitchFamily="34" charset="-128"/>
+              <a:cs typeface="Arial Unicode MS" pitchFamily="34" charset="-128"/>
+            </a:endParaRPr>
+          </a:p>
+        </p:txBody>
+      </p:sp>
+      <p:sp>
+        <p:nvSpPr>
+          <p:cNvPr id="17" name="Hexagon 16"/>
+          <p:cNvSpPr/>
+          <p:nvPr/>
+        </p:nvSpPr>
+        <p:spPr bwMode="gray">
+          <a:xfrm>
+            <a:off x="3847013" y="1739036"/>
+            <a:ext cx="1880071" cy="1399560"/>
+          </a:xfrm>
+          <a:prstGeom prst="hexagon">
+            <a:avLst/>
+          </a:prstGeom>
+          <a:ln>
+            <a:headEnd/>
+            <a:tailEnd/>
+          </a:ln>
+        </p:spPr>
+        <p:style>
+          <a:lnRef idx="1">
+            <a:schemeClr val="accent2"/>
+          </a:lnRef>
+          <a:fillRef idx="2">
+            <a:schemeClr val="accent2"/>
+          </a:fillRef>
+          <a:effectRef idx="1">
+            <a:schemeClr val="accent2"/>
+          </a:effectRef>
+          <a:fontRef idx="minor">
+            <a:schemeClr val="dk1"/>
+          </a:fontRef>
+        </p:style>
+        <p:txBody>
+          <a:bodyPr lIns="90000" tIns="72000" rIns="90000" bIns="72000" rtlCol="0" anchor="ctr"/>
+          <a:lstStyle/>
+          <a:p>
+            <a:pPr marR="0" algn="ctr" defTabSz="914400" eaLnBrk="1" fontAlgn="base" latinLnBrk="0" hangingPunct="1">
+              <a:lnSpc>
+                <a:spcPct val="100000"/>
+              </a:lnSpc>
+              <a:spcBef>
+                <a:spcPct val="50000"/>
+              </a:spcBef>
+              <a:spcAft>
+                <a:spcPct val="0"/>
+              </a:spcAft>
+              <a:buClr>
+                <a:srgbClr val="F0AB00"/>
+              </a:buClr>
+              <a:buSzPct val="80000"/>
+              <a:tabLst/>
+            </a:pPr>
+            <a:r>
+              <a:rPr kumimoji="0" lang="en-US" sz="1800" b="1" i="0" u="none" strike="noStrike" kern="0" cap="none" spc="0" normalizeH="0" baseline="0" noProof="0" dirty="0">
+                <a:ln>
+                  <a:noFill/>
+                </a:ln>
+                <a:effectLst/>
+                <a:uLnTx/>
+                <a:uFillTx/>
+                <a:ea typeface="Arial Unicode MS" pitchFamily="34" charset="-128"/>
+                <a:cs typeface="Arial Unicode MS" pitchFamily="34" charset="-128"/>
+              </a:rPr>
+              <a:t>Image present already?</a:t>
+            </a:r>
+          </a:p>
+        </p:txBody>
+      </p:sp>
+      <p:sp>
+        <p:nvSpPr>
+          <p:cNvPr id="18" name="Flowchart: Alternate Process 17"/>
+          <p:cNvSpPr/>
+          <p:nvPr/>
+        </p:nvSpPr>
+        <p:spPr bwMode="gray">
+          <a:xfrm>
+            <a:off x="684814" y="1739036"/>
+            <a:ext cx="1880071" cy="1399560"/>
+          </a:xfrm>
+          <a:prstGeom prst="flowChartAlternateProcess">
+            <a:avLst/>
+          </a:prstGeom>
+          <a:ln>
+            <a:headEnd/>
+            <a:tailEnd/>
+          </a:ln>
+        </p:spPr>
+        <p:style>
+          <a:lnRef idx="1">
+            <a:schemeClr val="accent2"/>
+          </a:lnRef>
+          <a:fillRef idx="2">
+            <a:schemeClr val="accent2"/>
+          </a:fillRef>
+          <a:effectRef idx="1">
+            <a:schemeClr val="accent2"/>
+          </a:effectRef>
+          <a:fontRef idx="minor">
+            <a:schemeClr val="dk1"/>
+          </a:fontRef>
+        </p:style>
+        <p:txBody>
+          <a:bodyPr lIns="90000" tIns="72000" rIns="90000" bIns="72000" rtlCol="0" anchor="ctr"/>
+          <a:lstStyle/>
+          <a:p>
+            <a:pPr marR="0" algn="ctr" defTabSz="914400" eaLnBrk="1" fontAlgn="base" latinLnBrk="0" hangingPunct="1">
+              <a:lnSpc>
+                <a:spcPct val="100000"/>
+              </a:lnSpc>
+              <a:spcBef>
+                <a:spcPct val="50000"/>
+              </a:spcBef>
+              <a:spcAft>
+                <a:spcPct val="0"/>
+              </a:spcAft>
+              <a:buClr>
+                <a:srgbClr val="F0AB00"/>
+              </a:buClr>
+              <a:buSzPct val="80000"/>
+              <a:tabLst/>
+            </a:pPr>
+            <a:r>
+              <a:rPr kumimoji="0" lang="en-US" sz="1800" b="1" i="0" u="none" strike="noStrike" kern="0" cap="none" spc="0" normalizeH="0" baseline="0" noProof="0" dirty="0">
+                <a:ln>
+                  <a:noFill/>
+                </a:ln>
+                <a:effectLst/>
+                <a:uLnTx/>
+                <a:uFillTx/>
+                <a:ea typeface="Arial Unicode MS" pitchFamily="34" charset="-128"/>
+                <a:cs typeface="Arial Unicode MS" pitchFamily="34" charset="-128"/>
+              </a:rPr>
+              <a:t>Start Pod </a:t>
+            </a:r>
+            <a:r>
+              <a:rPr lang="en-US" sz="1800" b="1" kern="0" dirty="0">
+                <a:ea typeface="Arial Unicode MS" pitchFamily="34" charset="-128"/>
+                <a:cs typeface="Arial Unicode MS" pitchFamily="34" charset="-128"/>
+              </a:rPr>
+              <a:t>with image &lt;&gt;</a:t>
+            </a:r>
+            <a:endParaRPr kumimoji="0" lang="en-US" sz="1800" b="1" i="0" u="none" strike="noStrike" kern="0" cap="none" spc="0" normalizeH="0" baseline="0" noProof="0" dirty="0">
+              <a:ln>
+                <a:noFill/>
+              </a:ln>
+              <a:effectLst/>
+              <a:uLnTx/>
+              <a:uFillTx/>
+              <a:ea typeface="Arial Unicode MS" pitchFamily="34" charset="-128"/>
+              <a:cs typeface="Arial Unicode MS" pitchFamily="34" charset="-128"/>
+            </a:endParaRPr>
+          </a:p>
+        </p:txBody>
+      </p:sp>
+      <p:cxnSp>
+        <p:nvCxnSpPr>
+          <p:cNvPr id="19" name="Straight Arrow Connector 18"/>
+          <p:cNvCxnSpPr>
+            <a:stCxn id="18" idx="3"/>
+            <a:endCxn id="17" idx="3"/>
+          </p:cNvCxnSpPr>
+          <p:nvPr/>
+        </p:nvCxnSpPr>
+        <p:spPr>
+          <a:xfrm>
+            <a:off x="2564885" y="2438816"/>
+            <a:ext cx="1282128" cy="0"/>
+          </a:xfrm>
+          <a:prstGeom prst="straightConnector1">
+            <a:avLst/>
+          </a:prstGeom>
+          <a:ln w="57150">
+            <a:solidFill>
+              <a:schemeClr val="tx2">
+                <a:lumMod val="60000"/>
+                <a:lumOff val="40000"/>
+              </a:schemeClr>
+            </a:solidFill>
+            <a:headEnd type="none" w="med" len="med"/>
+            <a:tailEnd type="triangle" w="med" len="med"/>
+          </a:ln>
+        </p:spPr>
+        <p:style>
+          <a:lnRef idx="1">
+            <a:schemeClr val="accent1"/>
+          </a:lnRef>
+          <a:fillRef idx="0">
+            <a:schemeClr val="accent1"/>
+          </a:fillRef>
+          <a:effectRef idx="0">
+            <a:schemeClr val="accent1"/>
+          </a:effectRef>
+          <a:fontRef idx="minor">
+            <a:schemeClr val="tx1"/>
+          </a:fontRef>
+        </p:style>
+      </p:cxnSp>
+      <p:sp>
+        <p:nvSpPr>
+          <p:cNvPr id="23" name="Flowchart: Alternate Process 22"/>
+          <p:cNvSpPr/>
+          <p:nvPr/>
+        </p:nvSpPr>
+        <p:spPr bwMode="gray">
+          <a:xfrm>
+            <a:off x="8078787" y="3762312"/>
+            <a:ext cx="1880071" cy="1399560"/>
+          </a:xfrm>
+          <a:prstGeom prst="flowChartAlternateProcess">
+            <a:avLst/>
+          </a:prstGeom>
+          <a:ln>
+            <a:headEnd/>
+            <a:tailEnd/>
+          </a:ln>
+        </p:spPr>
+        <p:style>
+          <a:lnRef idx="1">
+            <a:schemeClr val="accent2"/>
+          </a:lnRef>
+          <a:fillRef idx="2">
+            <a:schemeClr val="accent2"/>
+          </a:fillRef>
+          <a:effectRef idx="1">
+            <a:schemeClr val="accent2"/>
+          </a:effectRef>
+          <a:fontRef idx="minor">
+            <a:schemeClr val="dk1"/>
+          </a:fontRef>
+        </p:style>
+        <p:txBody>
+          <a:bodyPr lIns="90000" tIns="72000" rIns="90000" bIns="72000" rtlCol="0" anchor="ctr"/>
+          <a:lstStyle/>
+          <a:p>
+            <a:pPr marR="0" algn="ctr" defTabSz="914400" eaLnBrk="1" fontAlgn="base" latinLnBrk="0" hangingPunct="1">
+              <a:lnSpc>
+                <a:spcPct val="100000"/>
+              </a:lnSpc>
+              <a:spcBef>
+                <a:spcPct val="50000"/>
+              </a:spcBef>
+              <a:spcAft>
+                <a:spcPct val="0"/>
+              </a:spcAft>
+              <a:buClr>
+                <a:srgbClr val="F0AB00"/>
+              </a:buClr>
+              <a:buSzPct val="80000"/>
+              <a:tabLst/>
+            </a:pPr>
+            <a:r>
+              <a:rPr kumimoji="0" lang="en-US" sz="1800" b="1" i="0" u="none" strike="noStrike" kern="0" cap="none" spc="0" normalizeH="0" baseline="0" noProof="0" dirty="0">
+                <a:ln>
+                  <a:noFill/>
+                </a:ln>
+                <a:effectLst/>
+                <a:uLnTx/>
+                <a:uFillTx/>
+                <a:ea typeface="Arial Unicode MS" pitchFamily="34" charset="-128"/>
+                <a:cs typeface="Arial Unicode MS" pitchFamily="34" charset="-128"/>
+              </a:rPr>
+              <a:t>Start Pod </a:t>
+            </a:r>
+            <a:r>
+              <a:rPr lang="en-US" sz="1800" b="1" kern="0" dirty="0">
+                <a:ea typeface="Arial Unicode MS" pitchFamily="34" charset="-128"/>
+                <a:cs typeface="Arial Unicode MS" pitchFamily="34" charset="-128"/>
+              </a:rPr>
+              <a:t>with image &lt;&gt;</a:t>
+            </a:r>
+            <a:endParaRPr kumimoji="0" lang="en-US" sz="1800" b="1" i="0" u="none" strike="noStrike" kern="0" cap="none" spc="0" normalizeH="0" baseline="0" noProof="0" dirty="0">
+              <a:ln>
+                <a:noFill/>
+              </a:ln>
+              <a:effectLst/>
+              <a:uLnTx/>
+              <a:uFillTx/>
+              <a:ea typeface="Arial Unicode MS" pitchFamily="34" charset="-128"/>
+              <a:cs typeface="Arial Unicode MS" pitchFamily="34" charset="-128"/>
+            </a:endParaRPr>
+          </a:p>
+        </p:txBody>
+      </p:sp>
+      <p:cxnSp>
+        <p:nvCxnSpPr>
+          <p:cNvPr id="24" name="Straight Arrow Connector 23"/>
+          <p:cNvCxnSpPr>
+            <a:endCxn id="28" idx="0"/>
+          </p:cNvCxnSpPr>
+          <p:nvPr/>
+        </p:nvCxnSpPr>
+        <p:spPr>
+          <a:xfrm>
+            <a:off x="4824462" y="3151343"/>
+            <a:ext cx="1" cy="623251"/>
+          </a:xfrm>
+          <a:prstGeom prst="straightConnector1">
+            <a:avLst/>
+          </a:prstGeom>
+          <a:ln w="57150">
+            <a:solidFill>
+              <a:schemeClr val="tx2">
+                <a:lumMod val="60000"/>
+                <a:lumOff val="40000"/>
+              </a:schemeClr>
+            </a:solidFill>
+            <a:headEnd type="none" w="med" len="med"/>
+            <a:tailEnd type="triangle" w="med" len="med"/>
+          </a:ln>
+        </p:spPr>
+        <p:style>
+          <a:lnRef idx="1">
+            <a:schemeClr val="accent1"/>
+          </a:lnRef>
+          <a:fillRef idx="0">
+            <a:schemeClr val="accent1"/>
+          </a:fillRef>
+          <a:effectRef idx="0">
+            <a:schemeClr val="accent1"/>
+          </a:effectRef>
+          <a:fontRef idx="minor">
+            <a:schemeClr val="tx1"/>
+          </a:fontRef>
+        </p:style>
+      </p:cxnSp>
+      <p:cxnSp>
+        <p:nvCxnSpPr>
+          <p:cNvPr id="26" name="Connector: Elbow 25"/>
+          <p:cNvCxnSpPr>
+            <a:stCxn id="17" idx="0"/>
+            <a:endCxn id="23" idx="0"/>
+          </p:cNvCxnSpPr>
+          <p:nvPr/>
+        </p:nvCxnSpPr>
+        <p:spPr>
+          <a:xfrm>
+            <a:off x="5727084" y="2438816"/>
+            <a:ext cx="3291739" cy="1323496"/>
+          </a:xfrm>
+          <a:prstGeom prst="bentConnector2">
+            <a:avLst/>
+          </a:prstGeom>
+          <a:ln w="57150">
+            <a:solidFill>
+              <a:schemeClr val="tx2">
+                <a:lumMod val="60000"/>
+                <a:lumOff val="40000"/>
+              </a:schemeClr>
+            </a:solidFill>
+            <a:headEnd type="none" w="med" len="med"/>
+            <a:tailEnd type="triangle" w="med" len="med"/>
+          </a:ln>
+        </p:spPr>
+        <p:style>
+          <a:lnRef idx="1">
+            <a:schemeClr val="accent1"/>
+          </a:lnRef>
+          <a:fillRef idx="0">
+            <a:schemeClr val="accent1"/>
+          </a:fillRef>
+          <a:effectRef idx="0">
+            <a:schemeClr val="accent1"/>
+          </a:effectRef>
+          <a:fontRef idx="minor">
+            <a:schemeClr val="tx1"/>
+          </a:fontRef>
+        </p:style>
+      </p:cxnSp>
+      <p:sp>
+        <p:nvSpPr>
+          <p:cNvPr id="28" name="Flowchart: Alternate Process 27"/>
+          <p:cNvSpPr/>
+          <p:nvPr/>
+        </p:nvSpPr>
+        <p:spPr bwMode="gray">
+          <a:xfrm>
+            <a:off x="3884427" y="3774594"/>
+            <a:ext cx="1880071" cy="1399560"/>
+          </a:xfrm>
+          <a:prstGeom prst="flowChartAlternateProcess">
+            <a:avLst/>
+          </a:prstGeom>
+          <a:ln>
+            <a:headEnd/>
+            <a:tailEnd/>
+          </a:ln>
+        </p:spPr>
+        <p:style>
+          <a:lnRef idx="1">
+            <a:schemeClr val="accent2"/>
+          </a:lnRef>
+          <a:fillRef idx="2">
+            <a:schemeClr val="accent2"/>
+          </a:fillRef>
+          <a:effectRef idx="1">
+            <a:schemeClr val="accent2"/>
+          </a:effectRef>
+          <a:fontRef idx="minor">
+            <a:schemeClr val="dk1"/>
+          </a:fontRef>
+        </p:style>
+        <p:txBody>
+          <a:bodyPr lIns="90000" tIns="72000" rIns="90000" bIns="72000" rtlCol="0" anchor="ctr"/>
+          <a:lstStyle/>
+          <a:p>
+            <a:pPr marR="0" algn="ctr" defTabSz="914400" eaLnBrk="1" fontAlgn="base" latinLnBrk="0" hangingPunct="1">
+              <a:lnSpc>
+                <a:spcPct val="100000"/>
+              </a:lnSpc>
+              <a:spcBef>
+                <a:spcPct val="50000"/>
+              </a:spcBef>
+              <a:spcAft>
+                <a:spcPct val="0"/>
+              </a:spcAft>
+              <a:buClr>
+                <a:srgbClr val="F0AB00"/>
+              </a:buClr>
+              <a:buSzPct val="80000"/>
+              <a:tabLst/>
+            </a:pPr>
+            <a:r>
+              <a:rPr lang="en-US" sz="1800" b="1" kern="0" dirty="0">
+                <a:ea typeface="Arial Unicode MS" pitchFamily="34" charset="-128"/>
+                <a:cs typeface="Arial Unicode MS" pitchFamily="34" charset="-128"/>
+              </a:rPr>
+              <a:t>Docker pull image</a:t>
+            </a:r>
+            <a:endParaRPr kumimoji="0" lang="en-US" sz="1800" b="1" i="0" u="none" strike="noStrike" kern="0" cap="none" spc="0" normalizeH="0" baseline="0" noProof="0" dirty="0">
+              <a:ln>
+                <a:noFill/>
+              </a:ln>
+              <a:effectLst/>
+              <a:uLnTx/>
+              <a:uFillTx/>
+              <a:ea typeface="Arial Unicode MS" pitchFamily="34" charset="-128"/>
+              <a:cs typeface="Arial Unicode MS" pitchFamily="34" charset="-128"/>
+            </a:endParaRPr>
+          </a:p>
+        </p:txBody>
+      </p:sp>
+      <p:cxnSp>
+        <p:nvCxnSpPr>
+          <p:cNvPr id="32" name="Straight Arrow Connector 31"/>
+          <p:cNvCxnSpPr>
+            <a:stCxn id="28" idx="3"/>
+            <a:endCxn id="23" idx="1"/>
+          </p:cNvCxnSpPr>
+          <p:nvPr/>
+        </p:nvCxnSpPr>
+        <p:spPr>
+          <a:xfrm flipV="1">
+            <a:off x="5764498" y="4462092"/>
+            <a:ext cx="2314289" cy="12282"/>
+          </a:xfrm>
+          <a:prstGeom prst="straightConnector1">
+            <a:avLst/>
+          </a:prstGeom>
+          <a:ln w="57150">
+            <a:solidFill>
+              <a:schemeClr val="tx2">
+                <a:lumMod val="60000"/>
+                <a:lumOff val="40000"/>
+              </a:schemeClr>
+            </a:solidFill>
+            <a:headEnd type="none" w="med" len="med"/>
+            <a:tailEnd type="triangle" w="med" len="med"/>
+          </a:ln>
+        </p:spPr>
+        <p:style>
+          <a:lnRef idx="1">
+            <a:schemeClr val="accent1"/>
+          </a:lnRef>
+          <a:fillRef idx="0">
+            <a:schemeClr val="accent1"/>
+          </a:fillRef>
+          <a:effectRef idx="0">
+            <a:schemeClr val="accent1"/>
+          </a:effectRef>
+          <a:fontRef idx="minor">
+            <a:schemeClr val="tx1"/>
+          </a:fontRef>
+        </p:style>
+      </p:cxnSp>
+    </p:spTree>
+    <p:extLst>
+      <p:ext uri="{BB962C8B-B14F-4D97-AF65-F5344CB8AC3E}">
+        <p14:creationId xmlns:p14="http://schemas.microsoft.com/office/powerpoint/2010/main" val="120034596"/>
+      </p:ext>
+    </p:extLst>
+  </p:cSld>
+  <p:clrMapOvr>
+    <a:masterClrMapping/>
+  </p:clrMapOvr>
+  <p:timing>
+    <p:tnLst>
+      <p:par>
+        <p:cTn id="1" dur="indefinite" restart="never" nodeType="tmRoot">
+          <p:childTnLst>
+            <p:seq concurrent="1" nextAc="seek">
+              <p:cTn id="2" dur="indefinite" nodeType="mainSeq">
+                <p:childTnLst>
+                  <p:par>
+                    <p:cTn id="3" fill="hold">
+                      <p:stCondLst>
+                        <p:cond delay="indefinite"/>
+                      </p:stCondLst>
+                      <p:childTnLst>
+                        <p:par>
+                          <p:cTn id="4" fill="hold">
+                            <p:stCondLst>
+                              <p:cond delay="0"/>
+                            </p:stCondLst>
+                            <p:childTnLst>
+                              <p:par>
+                                <p:cTn id="5" presetID="1" presetClass="exit" presetSubtype="0" fill="hold" nodeType="clickEffect">
+                                  <p:stCondLst>
+                                    <p:cond delay="0"/>
+                                  </p:stCondLst>
+                                  <p:childTnLst>
+                                    <p:set>
+                                      <p:cBhvr>
+                                        <p:cTn id="6" dur="1" fill="hold">
+                                          <p:stCondLst>
+                                            <p:cond delay="0"/>
+                                          </p:stCondLst>
+                                        </p:cTn>
+                                        <p:tgtEl>
+                                          <p:spTgt spid="13"/>
+                                        </p:tgtEl>
+                                        <p:attrNameLst>
+                                          <p:attrName>style.visibility</p:attrName>
+                                        </p:attrNameLst>
+                                      </p:cBhvr>
+                                      <p:to>
+                                        <p:strVal val="hidden"/>
+                                      </p:to>
+                                    </p:set>
+                                  </p:childTnLst>
+                                </p:cTn>
+                              </p:par>
+                            </p:childTnLst>
+                          </p:cTn>
+                        </p:par>
+                        <p:par>
+                          <p:cTn id="7" fill="hold">
+                            <p:stCondLst>
+                              <p:cond delay="0"/>
+                            </p:stCondLst>
+                            <p:childTnLst>
+                              <p:par>
+                                <p:cTn id="8" presetID="1" presetClass="entr" presetSubtype="0" fill="hold" grpId="0" nodeType="afterEffect">
+                                  <p:stCondLst>
+                                    <p:cond delay="0"/>
+                                  </p:stCondLst>
+                                  <p:childTnLst>
+                                    <p:set>
+                                      <p:cBhvr>
+                                        <p:cTn id="9" dur="1" fill="hold">
+                                          <p:stCondLst>
+                                            <p:cond delay="0"/>
+                                          </p:stCondLst>
+                                        </p:cTn>
+                                        <p:tgtEl>
+                                          <p:spTgt spid="14"/>
+                                        </p:tgtEl>
+                                        <p:attrNameLst>
+                                          <p:attrName>style.visibility</p:attrName>
+                                        </p:attrNameLst>
+                                      </p:cBhvr>
+                                      <p:to>
+                                        <p:strVal val="visible"/>
+                                      </p:to>
+                                    </p:set>
+                                  </p:childTnLst>
+                                </p:cTn>
+                              </p:par>
+                              <p:par>
+                                <p:cTn id="10" presetID="1" presetClass="entr" presetSubtype="0" fill="hold" grpId="0" nodeType="withEffect">
+                                  <p:stCondLst>
+                                    <p:cond delay="0"/>
+                                  </p:stCondLst>
+                                  <p:childTnLst>
+                                    <p:set>
+                                      <p:cBhvr>
+                                        <p:cTn id="11" dur="1" fill="hold">
+                                          <p:stCondLst>
+                                            <p:cond delay="0"/>
+                                          </p:stCondLst>
+                                        </p:cTn>
+                                        <p:tgtEl>
+                                          <p:spTgt spid="18"/>
+                                        </p:tgtEl>
+                                        <p:attrNameLst>
+                                          <p:attrName>style.visibility</p:attrName>
+                                        </p:attrNameLst>
+                                      </p:cBhvr>
+                                      <p:to>
+                                        <p:strVal val="visible"/>
+                                      </p:to>
+                                    </p:set>
+                                  </p:childTnLst>
+                                </p:cTn>
+                              </p:par>
+                            </p:childTnLst>
+                          </p:cTn>
+                        </p:par>
+                      </p:childTnLst>
+                    </p:cTn>
+                  </p:par>
+                  <p:par>
+                    <p:cTn id="12" fill="hold">
+                      <p:stCondLst>
+                        <p:cond delay="indefinite"/>
+                      </p:stCondLst>
+                      <p:childTnLst>
+                        <p:par>
+                          <p:cTn id="13" fill="hold">
+                            <p:stCondLst>
+                              <p:cond delay="0"/>
+                            </p:stCondLst>
+                            <p:childTnLst>
+                              <p:par>
+                                <p:cTn id="14" presetID="1" presetClass="entr" presetSubtype="0" fill="hold" nodeType="clickEffect">
+                                  <p:stCondLst>
+                                    <p:cond delay="0"/>
+                                  </p:stCondLst>
+                                  <p:childTnLst>
+                                    <p:set>
+                                      <p:cBhvr>
+                                        <p:cTn id="15" dur="1" fill="hold">
+                                          <p:stCondLst>
+                                            <p:cond delay="0"/>
+                                          </p:stCondLst>
+                                        </p:cTn>
+                                        <p:tgtEl>
+                                          <p:spTgt spid="19"/>
+                                        </p:tgtEl>
+                                        <p:attrNameLst>
+                                          <p:attrName>style.visibility</p:attrName>
+                                        </p:attrNameLst>
+                                      </p:cBhvr>
+                                      <p:to>
+                                        <p:strVal val="visible"/>
+                                      </p:to>
+                                    </p:set>
+                                  </p:childTnLst>
+                                </p:cTn>
+                              </p:par>
+                              <p:par>
+                                <p:cTn id="16" presetID="1" presetClass="entr" presetSubtype="0" fill="hold" grpId="0" nodeType="withEffect">
+                                  <p:stCondLst>
+                                    <p:cond delay="0"/>
+                                  </p:stCondLst>
+                                  <p:childTnLst>
+                                    <p:set>
+                                      <p:cBhvr>
+                                        <p:cTn id="17" dur="1" fill="hold">
+                                          <p:stCondLst>
+                                            <p:cond delay="0"/>
+                                          </p:stCondLst>
+                                        </p:cTn>
+                                        <p:tgtEl>
+                                          <p:spTgt spid="17"/>
+                                        </p:tgtEl>
+                                        <p:attrNameLst>
+                                          <p:attrName>style.visibility</p:attrName>
+                                        </p:attrNameLst>
+                                      </p:cBhvr>
+                                      <p:to>
+                                        <p:strVal val="visible"/>
+                                      </p:to>
+                                    </p:set>
+                                  </p:childTnLst>
+                                </p:cTn>
+                              </p:par>
+                            </p:childTnLst>
+                          </p:cTn>
+                        </p:par>
+                      </p:childTnLst>
+                    </p:cTn>
+                  </p:par>
+                  <p:par>
+                    <p:cTn id="18" fill="hold">
+                      <p:stCondLst>
+                        <p:cond delay="indefinite"/>
+                      </p:stCondLst>
+                      <p:childTnLst>
+                        <p:par>
+                          <p:cTn id="19" fill="hold">
+                            <p:stCondLst>
+                              <p:cond delay="0"/>
+                            </p:stCondLst>
+                            <p:childTnLst>
+                              <p:par>
+                                <p:cTn id="20" presetID="1" presetClass="entr" presetSubtype="0" fill="hold" grpId="0" nodeType="clickEffect">
+                                  <p:stCondLst>
+                                    <p:cond delay="0"/>
+                                  </p:stCondLst>
+                                  <p:childTnLst>
+                                    <p:set>
+                                      <p:cBhvr>
+                                        <p:cTn id="21" dur="1" fill="hold">
+                                          <p:stCondLst>
+                                            <p:cond delay="0"/>
+                                          </p:stCondLst>
+                                        </p:cTn>
+                                        <p:tgtEl>
+                                          <p:spTgt spid="23"/>
+                                        </p:tgtEl>
+                                        <p:attrNameLst>
+                                          <p:attrName>style.visibility</p:attrName>
+                                        </p:attrNameLst>
+                                      </p:cBhvr>
+                                      <p:to>
+                                        <p:strVal val="visible"/>
+                                      </p:to>
+                                    </p:set>
+                                  </p:childTnLst>
+                                </p:cTn>
+                              </p:par>
+                              <p:par>
+                                <p:cTn id="22" presetID="1" presetClass="entr" presetSubtype="0" fill="hold" nodeType="withEffect">
+                                  <p:stCondLst>
+                                    <p:cond delay="0"/>
+                                  </p:stCondLst>
+                                  <p:childTnLst>
+                                    <p:set>
+                                      <p:cBhvr>
+                                        <p:cTn id="23" dur="1" fill="hold">
+                                          <p:stCondLst>
+                                            <p:cond delay="0"/>
+                                          </p:stCondLst>
+                                        </p:cTn>
+                                        <p:tgtEl>
+                                          <p:spTgt spid="26"/>
+                                        </p:tgtEl>
+                                        <p:attrNameLst>
+                                          <p:attrName>style.visibility</p:attrName>
+                                        </p:attrNameLst>
+                                      </p:cBhvr>
+                                      <p:to>
+                                        <p:strVal val="visible"/>
+                                      </p:to>
+                                    </p:set>
+                                  </p:childTnLst>
+                                </p:cTn>
+                              </p:par>
+                            </p:childTnLst>
+                          </p:cTn>
+                        </p:par>
+                      </p:childTnLst>
+                    </p:cTn>
+                  </p:par>
+                  <p:par>
+                    <p:cTn id="24" fill="hold">
+                      <p:stCondLst>
+                        <p:cond delay="indefinite"/>
+                      </p:stCondLst>
+                      <p:childTnLst>
+                        <p:par>
+                          <p:cTn id="25" fill="hold">
+                            <p:stCondLst>
+                              <p:cond delay="0"/>
+                            </p:stCondLst>
+                            <p:childTnLst>
+                              <p:par>
+                                <p:cTn id="26" presetID="1" presetClass="entr" presetSubtype="0" fill="hold" nodeType="clickEffect">
+                                  <p:stCondLst>
+                                    <p:cond delay="0"/>
+                                  </p:stCondLst>
+                                  <p:childTnLst>
+                                    <p:set>
+                                      <p:cBhvr>
+                                        <p:cTn id="27" dur="1" fill="hold">
+                                          <p:stCondLst>
+                                            <p:cond delay="0"/>
+                                          </p:stCondLst>
+                                        </p:cTn>
+                                        <p:tgtEl>
+                                          <p:spTgt spid="24"/>
+                                        </p:tgtEl>
+                                        <p:attrNameLst>
+                                          <p:attrName>style.visibility</p:attrName>
+                                        </p:attrNameLst>
+                                      </p:cBhvr>
+                                      <p:to>
+                                        <p:strVal val="visible"/>
+                                      </p:to>
+                                    </p:set>
+                                  </p:childTnLst>
+                                </p:cTn>
+                              </p:par>
+                              <p:par>
+                                <p:cTn id="28" presetID="1" presetClass="entr" presetSubtype="0" fill="hold" grpId="0" nodeType="withEffect">
+                                  <p:stCondLst>
+                                    <p:cond delay="0"/>
+                                  </p:stCondLst>
+                                  <p:childTnLst>
+                                    <p:set>
+                                      <p:cBhvr>
+                                        <p:cTn id="29" dur="1" fill="hold">
+                                          <p:stCondLst>
+                                            <p:cond delay="0"/>
+                                          </p:stCondLst>
+                                        </p:cTn>
+                                        <p:tgtEl>
+                                          <p:spTgt spid="28"/>
+                                        </p:tgtEl>
+                                        <p:attrNameLst>
+                                          <p:attrName>style.visibility</p:attrName>
+                                        </p:attrNameLst>
+                                      </p:cBhvr>
+                                      <p:to>
+                                        <p:strVal val="visible"/>
+                                      </p:to>
+                                    </p:set>
+                                  </p:childTnLst>
+                                </p:cTn>
+                              </p:par>
+                              <p:par>
+                                <p:cTn id="30" presetID="1" presetClass="entr" presetSubtype="0" fill="hold" nodeType="withEffect">
+                                  <p:stCondLst>
+                                    <p:cond delay="0"/>
+                                  </p:stCondLst>
+                                  <p:childTnLst>
+                                    <p:set>
+                                      <p:cBhvr>
+                                        <p:cTn id="31" dur="1" fill="hold">
+                                          <p:stCondLst>
+                                            <p:cond delay="0"/>
+                                          </p:stCondLst>
+                                        </p:cTn>
+                                        <p:tgtEl>
+                                          <p:spTgt spid="32"/>
+                                        </p:tgtEl>
+                                        <p:attrNameLst>
+                                          <p:attrName>style.visibility</p:attrName>
+                                        </p:attrNameLst>
+                                      </p:cBhvr>
+                                      <p:to>
+                                        <p:strVal val="visible"/>
+                                      </p:to>
+                                    </p:set>
+                                  </p:childTnLst>
+                                </p:cTn>
+                              </p:par>
+                            </p:childTnLst>
+                          </p:cTn>
+                        </p:par>
+                      </p:childTnLst>
+                    </p:cTn>
+                  </p:par>
+                </p:childTnLst>
+              </p:cTn>
+              <p:prevCondLst>
+                <p:cond evt="onPrev" delay="0">
+                  <p:tgtEl>
+                    <p:sldTgt/>
+                  </p:tgtEl>
+                </p:cond>
+              </p:prevCondLst>
+              <p:nextCondLst>
+                <p:cond evt="onNext" delay="0">
+                  <p:tgtEl>
+                    <p:sldTgt/>
+                  </p:tgtEl>
+                </p:cond>
+              </p:nextCondLst>
+            </p:seq>
+          </p:childTnLst>
+        </p:cTn>
+      </p:par>
+    </p:tnLst>
+    <p:bldLst>
+      <p:bldP spid="14" grpId="0" animBg="1"/>
+      <p:bldP spid="17" grpId="0" animBg="1"/>
+      <p:bldP spid="18" grpId="0" animBg="1"/>
+      <p:bldP spid="23" grpId="0" animBg="1"/>
+      <p:bldP spid="28" grpId="0" animBg="1"/>
+    </p:bldLst>
+  </p:timing>
+</p:sld>
+</file>
+
+<file path=ppt/slides/slide6.xml><?xml version="1.0" encoding="utf-8"?>
+<p:sld xmlns:a="http://schemas.openxmlformats.org/drawingml/2006/main" xmlns:r="http://schemas.openxmlformats.org/officeDocument/2006/relationships" xmlns:p="http://schemas.openxmlformats.org/presentationml/2006/main">
+  <p:cSld>
+    <p:spTree>
+      <p:nvGrpSpPr>
+        <p:cNvPr id="1" name=""/>
+        <p:cNvGrpSpPr/>
+        <p:nvPr/>
+      </p:nvGrpSpPr>
+      <p:grpSpPr>
+        <a:xfrm>
+          <a:off x="0" y="0"/>
+          <a:ext cx="0" cy="0"/>
+          <a:chOff x="0" y="0"/>
+          <a:chExt cx="0" cy="0"/>
+        </a:xfrm>
+      </p:grpSpPr>
+      <p:sp>
+        <p:nvSpPr>
+          <p:cNvPr id="3" name="Title 2"/>
+          <p:cNvSpPr>
+            <a:spLocks noGrp="1"/>
+          </p:cNvSpPr>
+          <p:nvPr>
+            <p:ph type="title"/>
+          </p:nvPr>
+        </p:nvSpPr>
+        <p:spPr/>
+        <p:txBody>
+          <a:bodyPr/>
+          <a:lstStyle/>
+          <a:p>
+            <a:r>
+              <a:rPr lang="en-US" dirty="0"/>
               <a:t>Using Images from a private registry</a:t>
             </a:r>
           </a:p>
@@ -19768,13 +22309,13 @@
           </a:ln>
         </p:spPr>
         <p:style>
-          <a:lnRef idx="2">
+          <a:lnRef idx="1">
             <a:schemeClr val="accent2"/>
           </a:lnRef>
-          <a:fillRef idx="1">
-            <a:schemeClr val="lt1"/>
+          <a:fillRef idx="2">
+            <a:schemeClr val="accent2"/>
           </a:fillRef>
-          <a:effectRef idx="0">
+          <a:effectRef idx="1">
             <a:schemeClr val="accent2"/>
           </a:effectRef>
           <a:fontRef idx="minor">
@@ -19785,10 +22326,7 @@
           <a:bodyPr lIns="90000" tIns="72000" rIns="90000" bIns="72000" rtlCol="0" anchor="t"/>
           <a:lstStyle/>
           <a:p>
-            <a:pPr marR="0" algn="ctr" defTabSz="914400" eaLnBrk="1" fontAlgn="base" latinLnBrk="0" hangingPunct="1">
-              <a:lnSpc>
-                <a:spcPct val="100000"/>
-              </a:lnSpc>
+            <a:pPr algn="ctr" defTabSz="914400" fontAlgn="base">
               <a:spcBef>
                 <a:spcPct val="50000"/>
               </a:spcBef>
@@ -19799,25 +22337,14 @@
                 <a:srgbClr val="F0AB00"/>
               </a:buClr>
               <a:buSzPct val="80000"/>
-              <a:tabLst/>
             </a:pPr>
             <a:r>
-              <a:rPr lang="en-US" sz="1600" b="1" kern="0" dirty="0">
+              <a:rPr lang="en-US" sz="2400" b="1" kern="0" dirty="0">
                 <a:ea typeface="Arial Unicode MS" pitchFamily="34" charset="-128"/>
                 <a:cs typeface="Arial Unicode MS" pitchFamily="34" charset="-128"/>
               </a:rPr>
               <a:t>Kubernetes</a:t>
             </a:r>
-            <a:endParaRPr kumimoji="0" lang="en-US" sz="1600" b="1" i="0" u="none" strike="noStrike" kern="0" cap="none" spc="0" normalizeH="0" baseline="0" noProof="0" dirty="0">
-              <a:ln>
-                <a:noFill/>
-              </a:ln>
-              <a:effectLst/>
-              <a:uLnTx/>
-              <a:uFillTx/>
-              <a:ea typeface="Arial Unicode MS" pitchFamily="34" charset="-128"/>
-              <a:cs typeface="Arial Unicode MS" pitchFamily="34" charset="-128"/>
-            </a:endParaRPr>
           </a:p>
         </p:txBody>
       </p:sp>
@@ -19983,7 +22510,7 @@
         </p:blipFill>
         <p:spPr>
           <a:xfrm>
-            <a:off x="2527220" y="3041882"/>
+            <a:off x="3151912" y="3004175"/>
             <a:ext cx="1419591" cy="1419591"/>
           </a:xfrm>
           <a:prstGeom prst="rect">
@@ -19991,74 +22518,6 @@
           </a:prstGeom>
         </p:spPr>
       </p:pic>
-      <p:sp>
-        <p:nvSpPr>
-          <p:cNvPr id="27" name="Lightning Bolt 26"/>
-          <p:cNvSpPr/>
-          <p:nvPr/>
-        </p:nvSpPr>
-        <p:spPr bwMode="gray">
-          <a:xfrm>
-            <a:off x="4074009" y="2957355"/>
-            <a:ext cx="436108" cy="877969"/>
-          </a:xfrm>
-          <a:prstGeom prst="lightningBolt">
-            <a:avLst/>
-          </a:prstGeom>
-          <a:ln>
-            <a:headEnd/>
-            <a:tailEnd/>
-          </a:ln>
-        </p:spPr>
-        <p:style>
-          <a:lnRef idx="2">
-            <a:schemeClr val="accent5">
-              <a:shade val="50000"/>
-            </a:schemeClr>
-          </a:lnRef>
-          <a:fillRef idx="1">
-            <a:schemeClr val="accent5"/>
-          </a:fillRef>
-          <a:effectRef idx="0">
-            <a:schemeClr val="accent5"/>
-          </a:effectRef>
-          <a:fontRef idx="minor">
-            <a:schemeClr val="lt1"/>
-          </a:fontRef>
-        </p:style>
-        <p:txBody>
-          <a:bodyPr lIns="90000" tIns="72000" rIns="90000" bIns="72000" rtlCol="0" anchor="ctr"/>
-          <a:lstStyle/>
-          <a:p>
-            <a:pPr marR="0" algn="ctr" defTabSz="914400" eaLnBrk="1" fontAlgn="base" latinLnBrk="0" hangingPunct="1">
-              <a:lnSpc>
-                <a:spcPct val="100000"/>
-              </a:lnSpc>
-              <a:spcBef>
-                <a:spcPct val="50000"/>
-              </a:spcBef>
-              <a:spcAft>
-                <a:spcPct val="0"/>
-              </a:spcAft>
-              <a:buClr>
-                <a:srgbClr val="F0AB00"/>
-              </a:buClr>
-              <a:buSzPct val="80000"/>
-              <a:tabLst/>
-            </a:pPr>
-            <a:endParaRPr kumimoji="0" lang="en-US" sz="1800" b="0" i="0" u="none" strike="noStrike" kern="0" cap="none" spc="0" normalizeH="0" baseline="0" noProof="0" dirty="0" err="1">
-              <a:ln>
-                <a:noFill/>
-              </a:ln>
-              <a:effectLst/>
-              <a:uLnTx/>
-              <a:uFillTx/>
-              <a:ea typeface="Arial Unicode MS" pitchFamily="34" charset="-128"/>
-              <a:cs typeface="Arial Unicode MS" pitchFamily="34" charset="-128"/>
-            </a:endParaRPr>
-          </a:p>
-        </p:txBody>
-      </p:sp>
     </p:spTree>
     <p:extLst>
       <p:ext uri="{BB962C8B-B14F-4D97-AF65-F5344CB8AC3E}">
@@ -20072,7 +22531,7 @@
 </p:sld>
 </file>
 
-<file path=ppt/slides/slide6.xml><?xml version="1.0" encoding="utf-8"?>
+<file path=ppt/slides/slide7.xml><?xml version="1.0" encoding="utf-8"?>
 <p:sld xmlns:a="http://schemas.openxmlformats.org/drawingml/2006/main" xmlns:r="http://schemas.openxmlformats.org/officeDocument/2006/relationships" xmlns:p="http://schemas.openxmlformats.org/presentationml/2006/main">
   <p:cSld>
     <p:spTree>
@@ -20109,13 +22568,13 @@
           </a:ln>
         </p:spPr>
         <p:style>
-          <a:lnRef idx="2">
+          <a:lnRef idx="1">
             <a:schemeClr val="accent2"/>
           </a:lnRef>
-          <a:fillRef idx="1">
-            <a:schemeClr val="lt1"/>
+          <a:fillRef idx="2">
+            <a:schemeClr val="accent2"/>
           </a:fillRef>
-          <a:effectRef idx="0">
+          <a:effectRef idx="1">
             <a:schemeClr val="accent2"/>
           </a:effectRef>
           <a:fontRef idx="minor">
@@ -20126,10 +22585,7 @@
           <a:bodyPr lIns="90000" tIns="72000" rIns="90000" bIns="72000" rtlCol="0" anchor="t"/>
           <a:lstStyle/>
           <a:p>
-            <a:pPr marR="0" algn="ctr" defTabSz="914400" eaLnBrk="1" fontAlgn="base" latinLnBrk="0" hangingPunct="1">
-              <a:lnSpc>
-                <a:spcPct val="100000"/>
-              </a:lnSpc>
+            <a:pPr algn="ctr" defTabSz="914400" fontAlgn="base">
               <a:spcBef>
                 <a:spcPct val="50000"/>
               </a:spcBef>
@@ -20140,25 +22596,14 @@
                 <a:srgbClr val="F0AB00"/>
               </a:buClr>
               <a:buSzPct val="80000"/>
-              <a:tabLst/>
             </a:pPr>
             <a:r>
-              <a:rPr lang="en-US" sz="1600" b="1" kern="0" dirty="0">
+              <a:rPr lang="en-US" sz="2400" b="1" kern="0" dirty="0">
                 <a:ea typeface="Arial Unicode MS" pitchFamily="34" charset="-128"/>
                 <a:cs typeface="Arial Unicode MS" pitchFamily="34" charset="-128"/>
               </a:rPr>
               <a:t>Kubernetes</a:t>
             </a:r>
-            <a:endParaRPr kumimoji="0" lang="en-US" sz="1600" b="1" i="0" u="none" strike="noStrike" kern="0" cap="none" spc="0" normalizeH="0" baseline="0" noProof="0" dirty="0">
-              <a:ln>
-                <a:noFill/>
-              </a:ln>
-              <a:effectLst/>
-              <a:uLnTx/>
-              <a:uFillTx/>
-              <a:ea typeface="Arial Unicode MS" pitchFamily="34" charset="-128"/>
-              <a:cs typeface="Arial Unicode MS" pitchFamily="34" charset="-128"/>
-            </a:endParaRPr>
           </a:p>
         </p:txBody>
       </p:sp>
@@ -20378,7 +22823,7 @@
         </p:blipFill>
         <p:spPr>
           <a:xfrm>
-            <a:off x="2751621" y="2369079"/>
+            <a:off x="3266129" y="2348274"/>
             <a:ext cx="1542129" cy="1542129"/>
           </a:xfrm>
           <a:prstGeom prst="rect">
@@ -20814,7 +23259,7 @@
 </p:sld>
 </file>
 
-<file path=ppt/slides/slide7.xml><?xml version="1.0" encoding="utf-8"?>
+<file path=ppt/slides/slide8.xml><?xml version="1.0" encoding="utf-8"?>
 <p:sld xmlns:a="http://schemas.openxmlformats.org/drawingml/2006/main" xmlns:r="http://schemas.openxmlformats.org/officeDocument/2006/relationships" xmlns:p="http://schemas.openxmlformats.org/presentationml/2006/main">
   <p:cSld>
     <p:spTree>
@@ -20851,13 +23296,13 @@
           </a:ln>
         </p:spPr>
         <p:style>
-          <a:lnRef idx="2">
+          <a:lnRef idx="1">
             <a:schemeClr val="accent2"/>
           </a:lnRef>
-          <a:fillRef idx="1">
-            <a:schemeClr val="lt1"/>
+          <a:fillRef idx="2">
+            <a:schemeClr val="accent2"/>
           </a:fillRef>
-          <a:effectRef idx="0">
+          <a:effectRef idx="1">
             <a:schemeClr val="accent2"/>
           </a:effectRef>
           <a:fontRef idx="minor">
@@ -20868,10 +23313,7 @@
           <a:bodyPr lIns="90000" tIns="72000" rIns="90000" bIns="72000" rtlCol="0" anchor="t"/>
           <a:lstStyle/>
           <a:p>
-            <a:pPr marR="0" algn="ctr" defTabSz="914400" eaLnBrk="1" fontAlgn="base" latinLnBrk="0" hangingPunct="1">
-              <a:lnSpc>
-                <a:spcPct val="100000"/>
-              </a:lnSpc>
+            <a:pPr algn="ctr" defTabSz="914400" fontAlgn="base">
               <a:spcBef>
                 <a:spcPct val="50000"/>
               </a:spcBef>
@@ -20882,25 +23324,14 @@
                 <a:srgbClr val="F0AB00"/>
               </a:buClr>
               <a:buSzPct val="80000"/>
-              <a:tabLst/>
             </a:pPr>
             <a:r>
-              <a:rPr lang="en-US" sz="1600" b="1" kern="0" dirty="0">
+              <a:rPr lang="en-US" sz="2400" b="1" kern="0" dirty="0">
                 <a:ea typeface="Arial Unicode MS" pitchFamily="34" charset="-128"/>
                 <a:cs typeface="Arial Unicode MS" pitchFamily="34" charset="-128"/>
               </a:rPr>
               <a:t>Kubernetes</a:t>
             </a:r>
-            <a:endParaRPr kumimoji="0" lang="en-US" sz="1600" b="1" i="0" u="none" strike="noStrike" kern="0" cap="none" spc="0" normalizeH="0" baseline="0" noProof="0" dirty="0">
-              <a:ln>
-                <a:noFill/>
-              </a:ln>
-              <a:effectLst/>
-              <a:uLnTx/>
-              <a:uFillTx/>
-              <a:ea typeface="Arial Unicode MS" pitchFamily="34" charset="-128"/>
-              <a:cs typeface="Arial Unicode MS" pitchFamily="34" charset="-128"/>
-            </a:endParaRPr>
           </a:p>
         </p:txBody>
       </p:sp>
@@ -21390,7 +23821,7 @@
       </p:cxnSp>
       <p:pic>
         <p:nvPicPr>
-          <p:cNvPr id="27" name="Picture 26"/>
+          <p:cNvPr id="29" name="Picture 28"/>
           <p:cNvPicPr>
             <a:picLocks noChangeAspect="1"/>
           </p:cNvPicPr>
@@ -21403,9 +23834,9 @@
           </a:stretch>
         </p:blipFill>
         <p:spPr>
-          <a:xfrm>
-            <a:off x="2751621" y="2369079"/>
-            <a:ext cx="1542129" cy="1542129"/>
+          <a:xfrm rot="4927815" flipH="1">
+            <a:off x="8802247" y="3991716"/>
+            <a:ext cx="757761" cy="757761"/>
           </a:xfrm>
           <a:prstGeom prst="rect">
             <a:avLst/>
@@ -21414,7 +23845,7 @@
       </p:pic>
       <p:pic>
         <p:nvPicPr>
-          <p:cNvPr id="29" name="Picture 28"/>
+          <p:cNvPr id="27" name="Picture 26"/>
           <p:cNvPicPr>
             <a:picLocks noChangeAspect="1"/>
           </p:cNvPicPr>
@@ -21427,9 +23858,9 @@
           </a:stretch>
         </p:blipFill>
         <p:spPr>
-          <a:xfrm rot="4927815" flipH="1">
-            <a:off x="8802247" y="3991716"/>
-            <a:ext cx="757761" cy="757761"/>
+          <a:xfrm>
+            <a:off x="3265865" y="2355160"/>
+            <a:ext cx="1542129" cy="1542129"/>
           </a:xfrm>
           <a:prstGeom prst="rect">
             <a:avLst/>
@@ -21449,7 +23880,7 @@
 </p:sld>
 </file>
 
-<file path=ppt/slides/slide8.xml><?xml version="1.0" encoding="utf-8"?>
+<file path=ppt/slides/slide9.xml><?xml version="1.0" encoding="utf-8"?>
 <p:sld xmlns:a="http://schemas.openxmlformats.org/drawingml/2006/main" xmlns:r="http://schemas.openxmlformats.org/officeDocument/2006/relationships" xmlns:p="http://schemas.openxmlformats.org/presentationml/2006/main">
   <p:cSld>
     <p:spTree>
@@ -22257,1109 +24688,6 @@
     <p:extLst>
       <p:ext uri="{BB962C8B-B14F-4D97-AF65-F5344CB8AC3E}">
         <p14:creationId xmlns:p14="http://schemas.microsoft.com/office/powerpoint/2010/main" val="4252572192"/>
-      </p:ext>
-    </p:extLst>
-  </p:cSld>
-  <p:clrMapOvr>
-    <a:masterClrMapping/>
-  </p:clrMapOvr>
-</p:sld>
-</file>
-
-<file path=ppt/slides/slide9.xml><?xml version="1.0" encoding="utf-8"?>
-<p:sld xmlns:a="http://schemas.openxmlformats.org/drawingml/2006/main" xmlns:r="http://schemas.openxmlformats.org/officeDocument/2006/relationships" xmlns:p="http://schemas.openxmlformats.org/presentationml/2006/main">
-  <p:cSld>
-    <p:spTree>
-      <p:nvGrpSpPr>
-        <p:cNvPr id="1" name=""/>
-        <p:cNvGrpSpPr/>
-        <p:nvPr/>
-      </p:nvGrpSpPr>
-      <p:grpSpPr>
-        <a:xfrm>
-          <a:off x="0" y="0"/>
-          <a:ext cx="0" cy="0"/>
-          <a:chOff x="0" y="0"/>
-          <a:chExt cx="0" cy="0"/>
-        </a:xfrm>
-      </p:grpSpPr>
-      <p:sp>
-        <p:nvSpPr>
-          <p:cNvPr id="2" name="Title 1"/>
-          <p:cNvSpPr>
-            <a:spLocks noGrp="1"/>
-          </p:cNvSpPr>
-          <p:nvPr>
-            <p:ph type="title"/>
-          </p:nvPr>
-        </p:nvSpPr>
-        <p:spPr/>
-        <p:txBody>
-          <a:bodyPr/>
-          <a:lstStyle/>
-          <a:p>
-            <a:r>
-              <a:rPr lang="en-US" dirty="0" err="1"/>
-              <a:t>NetworkPolicy</a:t>
-            </a:r>
-            <a:endParaRPr lang="en-US" dirty="0"/>
-          </a:p>
-        </p:txBody>
-      </p:sp>
-      <p:sp>
-        <p:nvSpPr>
-          <p:cNvPr id="8" name="Rectangle 7"/>
-          <p:cNvSpPr/>
-          <p:nvPr/>
-        </p:nvSpPr>
-        <p:spPr>
-          <a:xfrm>
-            <a:off x="504000" y="1223190"/>
-            <a:ext cx="10918380" cy="1061829"/>
-          </a:xfrm>
-          <a:prstGeom prst="rect">
-            <a:avLst/>
-          </a:prstGeom>
-        </p:spPr>
-        <p:txBody>
-          <a:bodyPr wrap="square">
-            <a:spAutoFit/>
-          </a:bodyPr>
-          <a:lstStyle/>
-          <a:p>
-            <a:pPr marL="342900" indent="-342900">
-              <a:buFont typeface="Wingdings" panose="05000000000000000000" pitchFamily="2" charset="2"/>
-              <a:buChar char="§"/>
-            </a:pPr>
-            <a:r>
-              <a:rPr lang="en-US" dirty="0"/>
-              <a:t>“Firewall”-like restrictions</a:t>
-            </a:r>
-          </a:p>
-          <a:p>
-            <a:pPr marL="342900" indent="-342900">
-              <a:buFont typeface="Wingdings" panose="05000000000000000000" pitchFamily="2" charset="2"/>
-              <a:buChar char="§"/>
-            </a:pPr>
-            <a:r>
-              <a:rPr lang="en-US" dirty="0"/>
-              <a:t>Define egress and ingress rules for a service</a:t>
-            </a:r>
-          </a:p>
-          <a:p>
-            <a:pPr marL="342900" indent="-342900">
-              <a:buFont typeface="Wingdings" panose="05000000000000000000" pitchFamily="2" charset="2"/>
-              <a:buChar char="§"/>
-            </a:pPr>
-            <a:r>
-              <a:rPr lang="en-US" dirty="0"/>
-              <a:t>Requires support by overlay network plugin</a:t>
-            </a:r>
-          </a:p>
-        </p:txBody>
-      </p:sp>
-      <p:sp>
-        <p:nvSpPr>
-          <p:cNvPr id="7" name="Rectangle 6"/>
-          <p:cNvSpPr/>
-          <p:nvPr/>
-        </p:nvSpPr>
-        <p:spPr bwMode="gray">
-          <a:xfrm>
-            <a:off x="4479700" y="3598223"/>
-            <a:ext cx="1315448" cy="774112"/>
-          </a:xfrm>
-          <a:prstGeom prst="rect">
-            <a:avLst/>
-          </a:prstGeom>
-          <a:ln>
-            <a:headEnd/>
-            <a:tailEnd/>
-          </a:ln>
-        </p:spPr>
-        <p:style>
-          <a:lnRef idx="2">
-            <a:schemeClr val="accent2"/>
-          </a:lnRef>
-          <a:fillRef idx="1">
-            <a:schemeClr val="lt1"/>
-          </a:fillRef>
-          <a:effectRef idx="0">
-            <a:schemeClr val="accent2"/>
-          </a:effectRef>
-          <a:fontRef idx="minor">
-            <a:schemeClr val="dk1"/>
-          </a:fontRef>
-        </p:style>
-        <p:txBody>
-          <a:bodyPr lIns="90000" tIns="72000" rIns="90000" bIns="72000" rtlCol="0" anchor="ctr"/>
-          <a:lstStyle/>
-          <a:p>
-            <a:pPr marR="0" algn="ctr" defTabSz="914400" eaLnBrk="1" fontAlgn="base" latinLnBrk="0" hangingPunct="1">
-              <a:lnSpc>
-                <a:spcPct val="100000"/>
-              </a:lnSpc>
-              <a:spcBef>
-                <a:spcPct val="50000"/>
-              </a:spcBef>
-              <a:spcAft>
-                <a:spcPct val="0"/>
-              </a:spcAft>
-              <a:buClr>
-                <a:srgbClr val="F0AB00"/>
-              </a:buClr>
-              <a:buSzPct val="80000"/>
-              <a:tabLst/>
-            </a:pPr>
-            <a:r>
-              <a:rPr lang="en-US" sz="1800" kern="0" dirty="0">
-                <a:ea typeface="Arial Unicode MS" pitchFamily="34" charset="-128"/>
-                <a:cs typeface="Arial Unicode MS" pitchFamily="34" charset="-128"/>
-              </a:rPr>
-              <a:t>Service</a:t>
-            </a:r>
-            <a:endParaRPr kumimoji="0" lang="en-US" sz="1800" b="0" i="0" u="none" strike="noStrike" kern="0" cap="none" spc="0" normalizeH="0" baseline="0" noProof="0" dirty="0">
-              <a:ln>
-                <a:noFill/>
-              </a:ln>
-              <a:effectLst/>
-              <a:uLnTx/>
-              <a:uFillTx/>
-              <a:ea typeface="Arial Unicode MS" pitchFamily="34" charset="-128"/>
-              <a:cs typeface="Arial Unicode MS" pitchFamily="34" charset="-128"/>
-            </a:endParaRPr>
-          </a:p>
-        </p:txBody>
-      </p:sp>
-      <p:sp>
-        <p:nvSpPr>
-          <p:cNvPr id="12" name="Rectangle 11"/>
-          <p:cNvSpPr/>
-          <p:nvPr/>
-        </p:nvSpPr>
-        <p:spPr bwMode="gray">
-          <a:xfrm>
-            <a:off x="9108965" y="3567880"/>
-            <a:ext cx="1062486" cy="806724"/>
-          </a:xfrm>
-          <a:prstGeom prst="rect">
-            <a:avLst/>
-          </a:prstGeom>
-          <a:ln>
-            <a:headEnd/>
-            <a:tailEnd/>
-          </a:ln>
-        </p:spPr>
-        <p:style>
-          <a:lnRef idx="2">
-            <a:schemeClr val="accent2"/>
-          </a:lnRef>
-          <a:fillRef idx="1">
-            <a:schemeClr val="lt1"/>
-          </a:fillRef>
-          <a:effectRef idx="0">
-            <a:schemeClr val="accent2"/>
-          </a:effectRef>
-          <a:fontRef idx="minor">
-            <a:schemeClr val="dk1"/>
-          </a:fontRef>
-        </p:style>
-        <p:txBody>
-          <a:bodyPr lIns="90000" tIns="72000" rIns="90000" bIns="72000" rtlCol="0" anchor="ctr"/>
-          <a:lstStyle/>
-          <a:p>
-            <a:pPr marR="0" algn="ctr" defTabSz="914400" eaLnBrk="1" fontAlgn="base" latinLnBrk="0" hangingPunct="1">
-              <a:lnSpc>
-                <a:spcPct val="100000"/>
-              </a:lnSpc>
-              <a:spcBef>
-                <a:spcPct val="50000"/>
-              </a:spcBef>
-              <a:spcAft>
-                <a:spcPct val="0"/>
-              </a:spcAft>
-              <a:buClr>
-                <a:srgbClr val="F0AB00"/>
-              </a:buClr>
-              <a:buSzPct val="80000"/>
-              <a:tabLst/>
-            </a:pPr>
-            <a:r>
-              <a:rPr lang="en-US" sz="1800" kern="0" noProof="0" dirty="0">
-                <a:ea typeface="Arial Unicode MS" pitchFamily="34" charset="-128"/>
-                <a:cs typeface="Arial Unicode MS" pitchFamily="34" charset="-128"/>
-              </a:rPr>
-              <a:t>Pod</a:t>
-            </a:r>
-            <a:r>
-              <a:rPr lang="en-US" sz="1800" kern="0" dirty="0">
-                <a:ea typeface="Arial Unicode MS" pitchFamily="34" charset="-128"/>
-                <a:cs typeface="Arial Unicode MS" pitchFamily="34" charset="-128"/>
-              </a:rPr>
-              <a:t> A</a:t>
-            </a:r>
-            <a:endParaRPr kumimoji="0" lang="en-US" sz="1800" b="0" i="0" u="none" strike="noStrike" kern="0" cap="none" spc="0" normalizeH="0" baseline="0" noProof="0" dirty="0">
-              <a:ln>
-                <a:noFill/>
-              </a:ln>
-              <a:effectLst/>
-              <a:uLnTx/>
-              <a:uFillTx/>
-              <a:ea typeface="Arial Unicode MS" pitchFamily="34" charset="-128"/>
-              <a:cs typeface="Arial Unicode MS" pitchFamily="34" charset="-128"/>
-            </a:endParaRPr>
-          </a:p>
-        </p:txBody>
-      </p:sp>
-      <p:cxnSp>
-        <p:nvCxnSpPr>
-          <p:cNvPr id="16" name="Straight Arrow Connector 15"/>
-          <p:cNvCxnSpPr>
-            <a:stCxn id="28" idx="3"/>
-            <a:endCxn id="7" idx="1"/>
-          </p:cNvCxnSpPr>
-          <p:nvPr/>
-        </p:nvCxnSpPr>
-        <p:spPr>
-          <a:xfrm>
-            <a:off x="2760620" y="3228936"/>
-            <a:ext cx="1719080" cy="756343"/>
-          </a:xfrm>
-          <a:prstGeom prst="straightConnector1">
-            <a:avLst/>
-          </a:prstGeom>
-          <a:ln w="38100">
-            <a:solidFill>
-              <a:schemeClr val="tx2">
-                <a:lumMod val="60000"/>
-                <a:lumOff val="40000"/>
-              </a:schemeClr>
-            </a:solidFill>
-            <a:headEnd type="none" w="med" len="med"/>
-            <a:tailEnd type="triangle"/>
-          </a:ln>
-        </p:spPr>
-        <p:style>
-          <a:lnRef idx="1">
-            <a:schemeClr val="accent1"/>
-          </a:lnRef>
-          <a:fillRef idx="0">
-            <a:schemeClr val="accent1"/>
-          </a:fillRef>
-          <a:effectRef idx="0">
-            <a:schemeClr val="accent1"/>
-          </a:effectRef>
-          <a:fontRef idx="minor">
-            <a:schemeClr val="tx1"/>
-          </a:fontRef>
-        </p:style>
-      </p:cxnSp>
-      <p:sp>
-        <p:nvSpPr>
-          <p:cNvPr id="22" name="Rectangle: Single Corner Snipped 21"/>
-          <p:cNvSpPr/>
-          <p:nvPr/>
-        </p:nvSpPr>
-        <p:spPr bwMode="gray">
-          <a:xfrm>
-            <a:off x="6667860" y="5016889"/>
-            <a:ext cx="2322768" cy="1438976"/>
-          </a:xfrm>
-          <a:prstGeom prst="snip1Rect">
-            <a:avLst/>
-          </a:prstGeom>
-          <a:ln>
-            <a:headEnd/>
-            <a:tailEnd/>
-          </a:ln>
-        </p:spPr>
-        <p:style>
-          <a:lnRef idx="2">
-            <a:schemeClr val="accent2"/>
-          </a:lnRef>
-          <a:fillRef idx="1">
-            <a:schemeClr val="lt1"/>
-          </a:fillRef>
-          <a:effectRef idx="0">
-            <a:schemeClr val="accent2"/>
-          </a:effectRef>
-          <a:fontRef idx="minor">
-            <a:schemeClr val="dk1"/>
-          </a:fontRef>
-        </p:style>
-        <p:txBody>
-          <a:bodyPr lIns="90000" tIns="72000" rIns="90000" bIns="72000" rtlCol="0" anchor="ctr"/>
-          <a:lstStyle/>
-          <a:p>
-            <a:pPr marR="0" algn="ctr" defTabSz="914400" eaLnBrk="1" fontAlgn="base" latinLnBrk="0" hangingPunct="1">
-              <a:lnSpc>
-                <a:spcPct val="100000"/>
-              </a:lnSpc>
-              <a:spcBef>
-                <a:spcPct val="50000"/>
-              </a:spcBef>
-              <a:spcAft>
-                <a:spcPct val="0"/>
-              </a:spcAft>
-              <a:buClr>
-                <a:srgbClr val="F0AB00"/>
-              </a:buClr>
-              <a:buSzPct val="80000"/>
-              <a:tabLst/>
-            </a:pPr>
-            <a:r>
-              <a:rPr lang="en-US" sz="1800" kern="0" dirty="0">
-                <a:ea typeface="Arial Unicode MS" pitchFamily="34" charset="-128"/>
-                <a:cs typeface="Arial Unicode MS" pitchFamily="34" charset="-128"/>
-              </a:rPr>
-              <a:t>Network Policy</a:t>
-            </a:r>
-            <a:endParaRPr kumimoji="0" lang="en-US" sz="1800" b="0" i="0" u="none" strike="noStrike" kern="0" cap="none" spc="0" normalizeH="0" baseline="0" noProof="0" dirty="0">
-              <a:ln>
-                <a:noFill/>
-              </a:ln>
-              <a:effectLst/>
-              <a:uLnTx/>
-              <a:uFillTx/>
-              <a:ea typeface="Arial Unicode MS" pitchFamily="34" charset="-128"/>
-              <a:cs typeface="Arial Unicode MS" pitchFamily="34" charset="-128"/>
-            </a:endParaRPr>
-          </a:p>
-        </p:txBody>
-      </p:sp>
-      <p:cxnSp>
-        <p:nvCxnSpPr>
-          <p:cNvPr id="24" name="Straight Arrow Connector 23"/>
-          <p:cNvCxnSpPr>
-            <a:stCxn id="22" idx="3"/>
-          </p:cNvCxnSpPr>
-          <p:nvPr/>
-        </p:nvCxnSpPr>
-        <p:spPr>
-          <a:xfrm flipV="1">
-            <a:off x="7829244" y="4071790"/>
-            <a:ext cx="0" cy="945099"/>
-          </a:xfrm>
-          <a:prstGeom prst="straightConnector1">
-            <a:avLst/>
-          </a:prstGeom>
-          <a:ln w="38100">
-            <a:solidFill>
-              <a:schemeClr val="tx2">
-                <a:lumMod val="60000"/>
-                <a:lumOff val="40000"/>
-              </a:schemeClr>
-            </a:solidFill>
-            <a:headEnd type="none" w="med" len="med"/>
-            <a:tailEnd type="triangle"/>
-          </a:ln>
-        </p:spPr>
-        <p:style>
-          <a:lnRef idx="1">
-            <a:schemeClr val="accent1"/>
-          </a:lnRef>
-          <a:fillRef idx="0">
-            <a:schemeClr val="accent1"/>
-          </a:fillRef>
-          <a:effectRef idx="0">
-            <a:schemeClr val="accent1"/>
-          </a:effectRef>
-          <a:fontRef idx="minor">
-            <a:schemeClr val="tx1"/>
-          </a:fontRef>
-        </p:style>
-      </p:cxnSp>
-      <p:cxnSp>
-        <p:nvCxnSpPr>
-          <p:cNvPr id="27" name="Straight Arrow Connector 26"/>
-          <p:cNvCxnSpPr>
-            <a:stCxn id="7" idx="3"/>
-            <a:endCxn id="12" idx="1"/>
-          </p:cNvCxnSpPr>
-          <p:nvPr/>
-        </p:nvCxnSpPr>
-        <p:spPr>
-          <a:xfrm flipV="1">
-            <a:off x="5795148" y="3971242"/>
-            <a:ext cx="3313817" cy="14037"/>
-          </a:xfrm>
-          <a:prstGeom prst="straightConnector1">
-            <a:avLst/>
-          </a:prstGeom>
-          <a:ln w="38100">
-            <a:solidFill>
-              <a:schemeClr val="tx2">
-                <a:lumMod val="60000"/>
-                <a:lumOff val="40000"/>
-              </a:schemeClr>
-            </a:solidFill>
-            <a:headEnd type="none" w="med" len="med"/>
-            <a:tailEnd type="triangle"/>
-          </a:ln>
-        </p:spPr>
-        <p:style>
-          <a:lnRef idx="1">
-            <a:schemeClr val="accent1"/>
-          </a:lnRef>
-          <a:fillRef idx="0">
-            <a:schemeClr val="accent1"/>
-          </a:fillRef>
-          <a:effectRef idx="0">
-            <a:schemeClr val="accent1"/>
-          </a:effectRef>
-          <a:fontRef idx="minor">
-            <a:schemeClr val="tx1"/>
-          </a:fontRef>
-        </p:style>
-      </p:cxnSp>
-      <p:sp>
-        <p:nvSpPr>
-          <p:cNvPr id="36" name="Lightning Bolt 35"/>
-          <p:cNvSpPr/>
-          <p:nvPr/>
-        </p:nvSpPr>
-        <p:spPr bwMode="gray">
-          <a:xfrm>
-            <a:off x="7381964" y="4071790"/>
-            <a:ext cx="303473" cy="499599"/>
-          </a:xfrm>
-          <a:prstGeom prst="lightningBolt">
-            <a:avLst/>
-          </a:prstGeom>
-          <a:ln>
-            <a:headEnd/>
-            <a:tailEnd/>
-          </a:ln>
-        </p:spPr>
-        <p:style>
-          <a:lnRef idx="2">
-            <a:schemeClr val="accent5">
-              <a:shade val="50000"/>
-            </a:schemeClr>
-          </a:lnRef>
-          <a:fillRef idx="1">
-            <a:schemeClr val="accent5"/>
-          </a:fillRef>
-          <a:effectRef idx="0">
-            <a:schemeClr val="accent5"/>
-          </a:effectRef>
-          <a:fontRef idx="minor">
-            <a:schemeClr val="lt1"/>
-          </a:fontRef>
-        </p:style>
-        <p:txBody>
-          <a:bodyPr lIns="90000" tIns="72000" rIns="90000" bIns="72000" rtlCol="0" anchor="ctr"/>
-          <a:lstStyle/>
-          <a:p>
-            <a:pPr marR="0" algn="ctr" defTabSz="914400" eaLnBrk="1" fontAlgn="base" latinLnBrk="0" hangingPunct="1">
-              <a:lnSpc>
-                <a:spcPct val="100000"/>
-              </a:lnSpc>
-              <a:spcBef>
-                <a:spcPct val="50000"/>
-              </a:spcBef>
-              <a:spcAft>
-                <a:spcPct val="0"/>
-              </a:spcAft>
-              <a:buClr>
-                <a:srgbClr val="F0AB00"/>
-              </a:buClr>
-              <a:buSzPct val="80000"/>
-              <a:tabLst/>
-            </a:pPr>
-            <a:endParaRPr kumimoji="0" lang="en-US" sz="1800" b="0" i="0" u="none" strike="noStrike" kern="0" cap="none" spc="0" normalizeH="0" baseline="0" noProof="0" dirty="0" err="1">
-              <a:ln>
-                <a:noFill/>
-              </a:ln>
-              <a:effectLst/>
-              <a:uLnTx/>
-              <a:uFillTx/>
-              <a:ea typeface="Arial Unicode MS" pitchFamily="34" charset="-128"/>
-              <a:cs typeface="Arial Unicode MS" pitchFamily="34" charset="-128"/>
-            </a:endParaRPr>
-          </a:p>
-        </p:txBody>
-      </p:sp>
-      <p:sp>
-        <p:nvSpPr>
-          <p:cNvPr id="28" name="Rectangle 27"/>
-          <p:cNvSpPr/>
-          <p:nvPr/>
-        </p:nvSpPr>
-        <p:spPr bwMode="gray">
-          <a:xfrm>
-            <a:off x="1698134" y="2825574"/>
-            <a:ext cx="1062486" cy="806724"/>
-          </a:xfrm>
-          <a:prstGeom prst="rect">
-            <a:avLst/>
-          </a:prstGeom>
-          <a:ln>
-            <a:headEnd/>
-            <a:tailEnd/>
-          </a:ln>
-        </p:spPr>
-        <p:style>
-          <a:lnRef idx="2">
-            <a:schemeClr val="accent2"/>
-          </a:lnRef>
-          <a:fillRef idx="1">
-            <a:schemeClr val="lt1"/>
-          </a:fillRef>
-          <a:effectRef idx="0">
-            <a:schemeClr val="accent2"/>
-          </a:effectRef>
-          <a:fontRef idx="minor">
-            <a:schemeClr val="dk1"/>
-          </a:fontRef>
-        </p:style>
-        <p:txBody>
-          <a:bodyPr lIns="90000" tIns="72000" rIns="90000" bIns="72000" rtlCol="0" anchor="ctr"/>
-          <a:lstStyle/>
-          <a:p>
-            <a:pPr marR="0" algn="ctr" defTabSz="914400" eaLnBrk="1" fontAlgn="base" latinLnBrk="0" hangingPunct="1">
-              <a:lnSpc>
-                <a:spcPct val="100000"/>
-              </a:lnSpc>
-              <a:spcBef>
-                <a:spcPct val="50000"/>
-              </a:spcBef>
-              <a:spcAft>
-                <a:spcPct val="0"/>
-              </a:spcAft>
-              <a:buClr>
-                <a:srgbClr val="F0AB00"/>
-              </a:buClr>
-              <a:buSzPct val="80000"/>
-              <a:tabLst/>
-            </a:pPr>
-            <a:r>
-              <a:rPr lang="en-US" sz="1800" kern="0" noProof="0" dirty="0">
-                <a:ea typeface="Arial Unicode MS" pitchFamily="34" charset="-128"/>
-                <a:cs typeface="Arial Unicode MS" pitchFamily="34" charset="-128"/>
-              </a:rPr>
-              <a:t>Pod</a:t>
-            </a:r>
-            <a:r>
-              <a:rPr lang="en-US" sz="1800" kern="0" dirty="0">
-                <a:ea typeface="Arial Unicode MS" pitchFamily="34" charset="-128"/>
-                <a:cs typeface="Arial Unicode MS" pitchFamily="34" charset="-128"/>
-              </a:rPr>
-              <a:t> A</a:t>
-            </a:r>
-            <a:endParaRPr kumimoji="0" lang="en-US" sz="1800" b="0" i="0" u="none" strike="noStrike" kern="0" cap="none" spc="0" normalizeH="0" baseline="0" noProof="0" dirty="0">
-              <a:ln>
-                <a:noFill/>
-              </a:ln>
-              <a:effectLst/>
-              <a:uLnTx/>
-              <a:uFillTx/>
-              <a:ea typeface="Arial Unicode MS" pitchFamily="34" charset="-128"/>
-              <a:cs typeface="Arial Unicode MS" pitchFamily="34" charset="-128"/>
-            </a:endParaRPr>
-          </a:p>
-        </p:txBody>
-      </p:sp>
-      <p:sp>
-        <p:nvSpPr>
-          <p:cNvPr id="29" name="Rectangle 28"/>
-          <p:cNvSpPr/>
-          <p:nvPr/>
-        </p:nvSpPr>
-        <p:spPr bwMode="gray">
-          <a:xfrm>
-            <a:off x="1698134" y="4488940"/>
-            <a:ext cx="1062486" cy="806724"/>
-          </a:xfrm>
-          <a:prstGeom prst="rect">
-            <a:avLst/>
-          </a:prstGeom>
-          <a:ln>
-            <a:headEnd/>
-            <a:tailEnd/>
-          </a:ln>
-        </p:spPr>
-        <p:style>
-          <a:lnRef idx="2">
-            <a:schemeClr val="accent2"/>
-          </a:lnRef>
-          <a:fillRef idx="1">
-            <a:schemeClr val="lt1"/>
-          </a:fillRef>
-          <a:effectRef idx="0">
-            <a:schemeClr val="accent2"/>
-          </a:effectRef>
-          <a:fontRef idx="minor">
-            <a:schemeClr val="dk1"/>
-          </a:fontRef>
-        </p:style>
-        <p:txBody>
-          <a:bodyPr lIns="90000" tIns="72000" rIns="90000" bIns="72000" rtlCol="0" anchor="ctr"/>
-          <a:lstStyle/>
-          <a:p>
-            <a:pPr marR="0" algn="ctr" defTabSz="914400" eaLnBrk="1" fontAlgn="base" latinLnBrk="0" hangingPunct="1">
-              <a:lnSpc>
-                <a:spcPct val="100000"/>
-              </a:lnSpc>
-              <a:spcBef>
-                <a:spcPct val="50000"/>
-              </a:spcBef>
-              <a:spcAft>
-                <a:spcPct val="0"/>
-              </a:spcAft>
-              <a:buClr>
-                <a:srgbClr val="F0AB00"/>
-              </a:buClr>
-              <a:buSzPct val="80000"/>
-              <a:tabLst/>
-            </a:pPr>
-            <a:r>
-              <a:rPr lang="en-US" sz="1800" kern="0" noProof="0" dirty="0">
-                <a:ea typeface="Arial Unicode MS" pitchFamily="34" charset="-128"/>
-                <a:cs typeface="Arial Unicode MS" pitchFamily="34" charset="-128"/>
-              </a:rPr>
-              <a:t>Pod</a:t>
-            </a:r>
-            <a:r>
-              <a:rPr lang="en-US" sz="1800" kern="0" dirty="0">
-                <a:ea typeface="Arial Unicode MS" pitchFamily="34" charset="-128"/>
-                <a:cs typeface="Arial Unicode MS" pitchFamily="34" charset="-128"/>
-              </a:rPr>
-              <a:t> A</a:t>
-            </a:r>
-            <a:endParaRPr kumimoji="0" lang="en-US" sz="1800" b="0" i="0" u="none" strike="noStrike" kern="0" cap="none" spc="0" normalizeH="0" baseline="0" noProof="0" dirty="0">
-              <a:ln>
-                <a:noFill/>
-              </a:ln>
-              <a:effectLst/>
-              <a:uLnTx/>
-              <a:uFillTx/>
-              <a:ea typeface="Arial Unicode MS" pitchFamily="34" charset="-128"/>
-              <a:cs typeface="Arial Unicode MS" pitchFamily="34" charset="-128"/>
-            </a:endParaRPr>
-          </a:p>
-        </p:txBody>
-      </p:sp>
-      <p:cxnSp>
-        <p:nvCxnSpPr>
-          <p:cNvPr id="30" name="Straight Arrow Connector 29"/>
-          <p:cNvCxnSpPr>
-            <a:stCxn id="29" idx="3"/>
-            <a:endCxn id="7" idx="1"/>
-          </p:cNvCxnSpPr>
-          <p:nvPr/>
-        </p:nvCxnSpPr>
-        <p:spPr>
-          <a:xfrm flipV="1">
-            <a:off x="2760620" y="3985279"/>
-            <a:ext cx="1719080" cy="907023"/>
-          </a:xfrm>
-          <a:prstGeom prst="straightConnector1">
-            <a:avLst/>
-          </a:prstGeom>
-          <a:ln w="38100">
-            <a:solidFill>
-              <a:schemeClr val="accent5"/>
-            </a:solidFill>
-            <a:headEnd type="none" w="med" len="med"/>
-            <a:tailEnd type="triangle"/>
-          </a:ln>
-        </p:spPr>
-        <p:style>
-          <a:lnRef idx="1">
-            <a:schemeClr val="accent1"/>
-          </a:lnRef>
-          <a:fillRef idx="0">
-            <a:schemeClr val="accent1"/>
-          </a:fillRef>
-          <a:effectRef idx="0">
-            <a:schemeClr val="accent1"/>
-          </a:effectRef>
-          <a:fontRef idx="minor">
-            <a:schemeClr val="tx1"/>
-          </a:fontRef>
-        </p:style>
-      </p:cxnSp>
-      <p:sp>
-        <p:nvSpPr>
-          <p:cNvPr id="39" name="Flowchart: Document 38"/>
-          <p:cNvSpPr/>
-          <p:nvPr/>
-        </p:nvSpPr>
-        <p:spPr bwMode="gray">
-          <a:xfrm>
-            <a:off x="8133625" y="4782370"/>
-            <a:ext cx="1506583" cy="766354"/>
-          </a:xfrm>
-          <a:prstGeom prst="flowChartDocument">
-            <a:avLst/>
-          </a:prstGeom>
-          <a:ln>
-            <a:headEnd/>
-            <a:tailEnd/>
-          </a:ln>
-        </p:spPr>
-        <p:style>
-          <a:lnRef idx="2">
-            <a:schemeClr val="accent5"/>
-          </a:lnRef>
-          <a:fillRef idx="1">
-            <a:schemeClr val="lt1"/>
-          </a:fillRef>
-          <a:effectRef idx="0">
-            <a:schemeClr val="accent5"/>
-          </a:effectRef>
-          <a:fontRef idx="minor">
-            <a:schemeClr val="dk1"/>
-          </a:fontRef>
-        </p:style>
-        <p:txBody>
-          <a:bodyPr lIns="90000" tIns="72000" rIns="90000" bIns="72000" rtlCol="0" anchor="ctr"/>
-          <a:lstStyle/>
-          <a:p>
-            <a:pPr algn="ctr" defTabSz="914400" fontAlgn="base">
-              <a:spcBef>
-                <a:spcPct val="50000"/>
-              </a:spcBef>
-              <a:spcAft>
-                <a:spcPct val="0"/>
-              </a:spcAft>
-              <a:buClr>
-                <a:srgbClr val="F0AB00"/>
-              </a:buClr>
-              <a:buSzPct val="80000"/>
-            </a:pPr>
-            <a:r>
-              <a:rPr lang="en-US" sz="1800" kern="0" dirty="0">
-                <a:ea typeface="Arial Unicode MS" pitchFamily="34" charset="-128"/>
-                <a:cs typeface="Arial Unicode MS" pitchFamily="34" charset="-128"/>
-              </a:rPr>
-              <a:t>Selector: app: </a:t>
-            </a:r>
-            <a:r>
-              <a:rPr lang="en-US" sz="1800" kern="0" dirty="0" err="1">
-                <a:ea typeface="Arial Unicode MS" pitchFamily="34" charset="-128"/>
-                <a:cs typeface="Arial Unicode MS" pitchFamily="34" charset="-128"/>
-              </a:rPr>
-              <a:t>nginx</a:t>
-            </a:r>
-            <a:endParaRPr lang="en-US" sz="1800" kern="0" dirty="0">
-              <a:ea typeface="Arial Unicode MS" pitchFamily="34" charset="-128"/>
-              <a:cs typeface="Arial Unicode MS" pitchFamily="34" charset="-128"/>
-            </a:endParaRPr>
-          </a:p>
-        </p:txBody>
-      </p:sp>
-      <p:sp>
-        <p:nvSpPr>
-          <p:cNvPr id="49" name="Rectangle 48"/>
-          <p:cNvSpPr/>
-          <p:nvPr/>
-        </p:nvSpPr>
-        <p:spPr bwMode="gray">
-          <a:xfrm>
-            <a:off x="9522959" y="3385000"/>
-            <a:ext cx="1645920" cy="365760"/>
-          </a:xfrm>
-          <a:prstGeom prst="rect">
-            <a:avLst/>
-          </a:prstGeom>
-          <a:ln>
-            <a:headEnd/>
-            <a:tailEnd/>
-          </a:ln>
-        </p:spPr>
-        <p:style>
-          <a:lnRef idx="2">
-            <a:schemeClr val="accent2"/>
-          </a:lnRef>
-          <a:fillRef idx="1">
-            <a:schemeClr val="lt1"/>
-          </a:fillRef>
-          <a:effectRef idx="0">
-            <a:schemeClr val="accent2"/>
-          </a:effectRef>
-          <a:fontRef idx="minor">
-            <a:schemeClr val="dk1"/>
-          </a:fontRef>
-        </p:style>
-        <p:txBody>
-          <a:bodyPr lIns="90000" tIns="72000" rIns="90000" bIns="72000" rtlCol="0" anchor="ctr"/>
-          <a:lstStyle/>
-          <a:p>
-            <a:pPr marR="0" algn="ctr" defTabSz="914400" eaLnBrk="1" fontAlgn="base" latinLnBrk="0" hangingPunct="1">
-              <a:lnSpc>
-                <a:spcPct val="100000"/>
-              </a:lnSpc>
-              <a:spcBef>
-                <a:spcPct val="50000"/>
-              </a:spcBef>
-              <a:spcAft>
-                <a:spcPct val="0"/>
-              </a:spcAft>
-              <a:buClr>
-                <a:srgbClr val="F0AB00"/>
-              </a:buClr>
-              <a:buSzPct val="80000"/>
-              <a:tabLst/>
-            </a:pPr>
-            <a:r>
-              <a:rPr lang="de-DE" sz="1800" kern="0" dirty="0" err="1">
-                <a:ea typeface="Arial Unicode MS" pitchFamily="34" charset="-128"/>
-                <a:cs typeface="Arial Unicode MS" pitchFamily="34" charset="-128"/>
-              </a:rPr>
-              <a:t>app</a:t>
-            </a:r>
-            <a:r>
-              <a:rPr lang="de-DE" sz="1800" kern="0" dirty="0">
-                <a:ea typeface="Arial Unicode MS" pitchFamily="34" charset="-128"/>
-                <a:cs typeface="Arial Unicode MS" pitchFamily="34" charset="-128"/>
-              </a:rPr>
-              <a:t>: </a:t>
-            </a:r>
-            <a:r>
-              <a:rPr lang="de-DE" sz="1800" kern="0" dirty="0" err="1">
-                <a:ea typeface="Arial Unicode MS" pitchFamily="34" charset="-128"/>
-                <a:cs typeface="Arial Unicode MS" pitchFamily="34" charset="-128"/>
-              </a:rPr>
-              <a:t>nginx</a:t>
-            </a:r>
-            <a:endParaRPr kumimoji="0" lang="de-DE" sz="1800" b="0" i="0" u="none" strike="noStrike" kern="0" cap="none" spc="0" normalizeH="0" baseline="0" noProof="0" dirty="0">
-              <a:ln>
-                <a:noFill/>
-              </a:ln>
-              <a:effectLst/>
-              <a:uLnTx/>
-              <a:uFillTx/>
-              <a:ea typeface="Arial Unicode MS" pitchFamily="34" charset="-128"/>
-              <a:cs typeface="Arial Unicode MS" pitchFamily="34" charset="-128"/>
-            </a:endParaRPr>
-          </a:p>
-        </p:txBody>
-      </p:sp>
-      <p:sp>
-        <p:nvSpPr>
-          <p:cNvPr id="50" name="Flowchart: Document 49"/>
-          <p:cNvSpPr/>
-          <p:nvPr/>
-        </p:nvSpPr>
-        <p:spPr bwMode="gray">
-          <a:xfrm>
-            <a:off x="5986539" y="4718721"/>
-            <a:ext cx="1506583" cy="766354"/>
-          </a:xfrm>
-          <a:prstGeom prst="flowChartDocument">
-            <a:avLst/>
-          </a:prstGeom>
-          <a:ln>
-            <a:headEnd/>
-            <a:tailEnd/>
-          </a:ln>
-        </p:spPr>
-        <p:style>
-          <a:lnRef idx="2">
-            <a:schemeClr val="accent5"/>
-          </a:lnRef>
-          <a:fillRef idx="1">
-            <a:schemeClr val="lt1"/>
-          </a:fillRef>
-          <a:effectRef idx="0">
-            <a:schemeClr val="accent5"/>
-          </a:effectRef>
-          <a:fontRef idx="minor">
-            <a:schemeClr val="dk1"/>
-          </a:fontRef>
-        </p:style>
-        <p:txBody>
-          <a:bodyPr lIns="90000" tIns="72000" rIns="90000" bIns="72000" rtlCol="0" anchor="ctr"/>
-          <a:lstStyle/>
-          <a:p>
-            <a:pPr algn="ctr" defTabSz="914400" fontAlgn="base">
-              <a:spcBef>
-                <a:spcPct val="50000"/>
-              </a:spcBef>
-              <a:spcAft>
-                <a:spcPct val="0"/>
-              </a:spcAft>
-              <a:buClr>
-                <a:srgbClr val="F0AB00"/>
-              </a:buClr>
-              <a:buSzPct val="80000"/>
-            </a:pPr>
-            <a:r>
-              <a:rPr lang="en-US" sz="1800" kern="0" dirty="0">
-                <a:ea typeface="Arial Unicode MS" pitchFamily="34" charset="-128"/>
-                <a:cs typeface="Arial Unicode MS" pitchFamily="34" charset="-128"/>
-              </a:rPr>
-              <a:t>Selector: access: ok</a:t>
-            </a:r>
-          </a:p>
-        </p:txBody>
-      </p:sp>
-      <p:sp>
-        <p:nvSpPr>
-          <p:cNvPr id="51" name="Rectangle 50"/>
-          <p:cNvSpPr/>
-          <p:nvPr/>
-        </p:nvSpPr>
-        <p:spPr bwMode="gray">
-          <a:xfrm>
-            <a:off x="2229377" y="2574739"/>
-            <a:ext cx="1645920" cy="365760"/>
-          </a:xfrm>
-          <a:prstGeom prst="rect">
-            <a:avLst/>
-          </a:prstGeom>
-          <a:ln>
-            <a:headEnd/>
-            <a:tailEnd/>
-          </a:ln>
-        </p:spPr>
-        <p:style>
-          <a:lnRef idx="2">
-            <a:schemeClr val="accent2"/>
-          </a:lnRef>
-          <a:fillRef idx="1">
-            <a:schemeClr val="lt1"/>
-          </a:fillRef>
-          <a:effectRef idx="0">
-            <a:schemeClr val="accent2"/>
-          </a:effectRef>
-          <a:fontRef idx="minor">
-            <a:schemeClr val="dk1"/>
-          </a:fontRef>
-        </p:style>
-        <p:txBody>
-          <a:bodyPr lIns="90000" tIns="72000" rIns="90000" bIns="72000" rtlCol="0" anchor="ctr"/>
-          <a:lstStyle/>
-          <a:p>
-            <a:pPr marR="0" algn="ctr" defTabSz="914400" eaLnBrk="1" fontAlgn="base" latinLnBrk="0" hangingPunct="1">
-              <a:lnSpc>
-                <a:spcPct val="100000"/>
-              </a:lnSpc>
-              <a:spcBef>
-                <a:spcPct val="50000"/>
-              </a:spcBef>
-              <a:spcAft>
-                <a:spcPct val="0"/>
-              </a:spcAft>
-              <a:buClr>
-                <a:srgbClr val="F0AB00"/>
-              </a:buClr>
-              <a:buSzPct val="80000"/>
-              <a:tabLst/>
-            </a:pPr>
-            <a:r>
-              <a:rPr lang="de-DE" sz="1800" kern="0" dirty="0" err="1">
-                <a:ea typeface="Arial Unicode MS" pitchFamily="34" charset="-128"/>
-                <a:cs typeface="Arial Unicode MS" pitchFamily="34" charset="-128"/>
-              </a:rPr>
-              <a:t>access</a:t>
-            </a:r>
-            <a:r>
-              <a:rPr lang="de-DE" sz="1800" kern="0" dirty="0">
-                <a:ea typeface="Arial Unicode MS" pitchFamily="34" charset="-128"/>
-                <a:cs typeface="Arial Unicode MS" pitchFamily="34" charset="-128"/>
-              </a:rPr>
-              <a:t>: ok</a:t>
-            </a:r>
-            <a:endParaRPr kumimoji="0" lang="de-DE" sz="1800" b="0" i="0" u="none" strike="noStrike" kern="0" cap="none" spc="0" normalizeH="0" baseline="0" noProof="0" dirty="0">
-              <a:ln>
-                <a:noFill/>
-              </a:ln>
-              <a:effectLst/>
-              <a:uLnTx/>
-              <a:uFillTx/>
-              <a:ea typeface="Arial Unicode MS" pitchFamily="34" charset="-128"/>
-              <a:cs typeface="Arial Unicode MS" pitchFamily="34" charset="-128"/>
-            </a:endParaRPr>
-          </a:p>
-        </p:txBody>
-      </p:sp>
-      <p:sp>
-        <p:nvSpPr>
-          <p:cNvPr id="52" name="Rectangle 51"/>
-          <p:cNvSpPr/>
-          <p:nvPr/>
-        </p:nvSpPr>
-        <p:spPr bwMode="gray">
-          <a:xfrm>
-            <a:off x="2351297" y="5119315"/>
-            <a:ext cx="1645920" cy="365760"/>
-          </a:xfrm>
-          <a:prstGeom prst="rect">
-            <a:avLst/>
-          </a:prstGeom>
-          <a:ln>
-            <a:headEnd/>
-            <a:tailEnd/>
-          </a:ln>
-        </p:spPr>
-        <p:style>
-          <a:lnRef idx="2">
-            <a:schemeClr val="accent2"/>
-          </a:lnRef>
-          <a:fillRef idx="1">
-            <a:schemeClr val="lt1"/>
-          </a:fillRef>
-          <a:effectRef idx="0">
-            <a:schemeClr val="accent2"/>
-          </a:effectRef>
-          <a:fontRef idx="minor">
-            <a:schemeClr val="dk1"/>
-          </a:fontRef>
-        </p:style>
-        <p:txBody>
-          <a:bodyPr lIns="90000" tIns="72000" rIns="90000" bIns="72000" rtlCol="0" anchor="ctr"/>
-          <a:lstStyle/>
-          <a:p>
-            <a:pPr marR="0" algn="ctr" defTabSz="914400" eaLnBrk="1" fontAlgn="base" latinLnBrk="0" hangingPunct="1">
-              <a:lnSpc>
-                <a:spcPct val="100000"/>
-              </a:lnSpc>
-              <a:spcBef>
-                <a:spcPct val="50000"/>
-              </a:spcBef>
-              <a:spcAft>
-                <a:spcPct val="0"/>
-              </a:spcAft>
-              <a:buClr>
-                <a:srgbClr val="F0AB00"/>
-              </a:buClr>
-              <a:buSzPct val="80000"/>
-              <a:tabLst/>
-            </a:pPr>
-            <a:r>
-              <a:rPr lang="de-DE" sz="1800" kern="0" dirty="0" err="1">
-                <a:ea typeface="Arial Unicode MS" pitchFamily="34" charset="-128"/>
-                <a:cs typeface="Arial Unicode MS" pitchFamily="34" charset="-128"/>
-              </a:rPr>
-              <a:t>access</a:t>
-            </a:r>
-            <a:r>
-              <a:rPr lang="de-DE" sz="1800" kern="0" dirty="0">
-                <a:ea typeface="Arial Unicode MS" pitchFamily="34" charset="-128"/>
-                <a:cs typeface="Arial Unicode MS" pitchFamily="34" charset="-128"/>
-              </a:rPr>
-              <a:t>: not ok</a:t>
-            </a:r>
-            <a:endParaRPr kumimoji="0" lang="de-DE" sz="1800" b="0" i="0" u="none" strike="noStrike" kern="0" cap="none" spc="0" normalizeH="0" baseline="0" noProof="0" dirty="0">
-              <a:ln>
-                <a:noFill/>
-              </a:ln>
-              <a:effectLst/>
-              <a:uLnTx/>
-              <a:uFillTx/>
-              <a:ea typeface="Arial Unicode MS" pitchFamily="34" charset="-128"/>
-              <a:cs typeface="Arial Unicode MS" pitchFamily="34" charset="-128"/>
-            </a:endParaRPr>
-          </a:p>
-        </p:txBody>
-      </p:sp>
-    </p:spTree>
-    <p:extLst>
-      <p:ext uri="{BB962C8B-B14F-4D97-AF65-F5344CB8AC3E}">
-        <p14:creationId xmlns:p14="http://schemas.microsoft.com/office/powerpoint/2010/main" val="4084543091"/>
       </p:ext>
     </p:extLst>
   </p:cSld>

</xml_diff>

<commit_message>
added "big picture" for exercise
</commit_message>
<xml_diff>
--- a/kubernetes/08_administration.pptx
+++ b/kubernetes/08_administration.pptx
@@ -5,10 +5,10 @@
     <p:sldMasterId id="2147483733" r:id="rId1"/>
   </p:sldMasterIdLst>
   <p:notesMasterIdLst>
-    <p:notesMasterId r:id="rId18"/>
+    <p:notesMasterId r:id="rId19"/>
   </p:notesMasterIdLst>
   <p:handoutMasterIdLst>
-    <p:handoutMasterId r:id="rId19"/>
+    <p:handoutMasterId r:id="rId20"/>
   </p:handoutMasterIdLst>
   <p:sldIdLst>
     <p:sldId id="433" r:id="rId2"/>
@@ -21,12 +21,13 @@
     <p:sldId id="453" r:id="rId9"/>
     <p:sldId id="454" r:id="rId10"/>
     <p:sldId id="446" r:id="rId11"/>
-    <p:sldId id="445" r:id="rId12"/>
-    <p:sldId id="450" r:id="rId13"/>
-    <p:sldId id="457" r:id="rId14"/>
-    <p:sldId id="456" r:id="rId15"/>
-    <p:sldId id="449" r:id="rId16"/>
-    <p:sldId id="265" r:id="rId17"/>
+    <p:sldId id="458" r:id="rId12"/>
+    <p:sldId id="445" r:id="rId13"/>
+    <p:sldId id="450" r:id="rId14"/>
+    <p:sldId id="457" r:id="rId15"/>
+    <p:sldId id="456" r:id="rId16"/>
+    <p:sldId id="449" r:id="rId17"/>
+    <p:sldId id="265" r:id="rId18"/>
   </p:sldIdLst>
   <p:sldSz cx="12195175" cy="6858000"/>
   <p:notesSz cx="6858000" cy="9144000"/>
@@ -202,6 +203,10 @@
 </p:presentation>
 </file>
 
+<file path=ppt/revisionInfo.xml><?xml version="1.0" encoding="utf-8"?>
+<p1510:revInfo xmlns:a="http://schemas.openxmlformats.org/drawingml/2006/main" xmlns:r="http://schemas.openxmlformats.org/officeDocument/2006/relationships" xmlns:p1510="http://schemas.microsoft.com/office/powerpoint/2015/10/main"/>
+</file>
+
 <file path=ppt/handoutMasters/handoutMaster1.xml><?xml version="1.0" encoding="utf-8"?>
 <p:handoutMaster xmlns:a="http://schemas.openxmlformats.org/drawingml/2006/main" xmlns:r="http://schemas.openxmlformats.org/officeDocument/2006/relationships" xmlns:p="http://schemas.openxmlformats.org/presentationml/2006/main">
   <p:cSld>
@@ -697,7 +702,7 @@
             <a:fld id="{7D8C2C35-2B8A-446E-BEC0-FD36716C29AC}" type="slidenum">
               <a:rPr lang="de-DE" smtClean="0"/>
               <a:pPr/>
-              <a:t>11</a:t>
+              <a:t>12</a:t>
             </a:fld>
             <a:endParaRPr lang="de-DE" dirty="0"/>
           </a:p>
@@ -782,7 +787,7 @@
             <a:fld id="{7D8C2C35-2B8A-446E-BEC0-FD36716C29AC}" type="slidenum">
               <a:rPr lang="de-DE" smtClean="0"/>
               <a:pPr/>
-              <a:t>13</a:t>
+              <a:t>14</a:t>
             </a:fld>
             <a:endParaRPr lang="de-DE" dirty="0"/>
           </a:p>
@@ -944,7 +949,7 @@
             <a:fld id="{7D8C2C35-2B8A-446E-BEC0-FD36716C29AC}" type="slidenum">
               <a:rPr lang="de-DE" smtClean="0"/>
               <a:pPr/>
-              <a:t>14</a:t>
+              <a:t>15</a:t>
             </a:fld>
             <a:endParaRPr lang="de-DE" dirty="0"/>
           </a:p>
@@ -998,7 +1003,7 @@
             <a:fld id="{7D8C2C35-2B8A-446E-BEC0-FD36716C29AC}" type="slidenum">
               <a:rPr lang="en-US" smtClean="0"/>
               <a:pPr/>
-              <a:t>16</a:t>
+              <a:t>17</a:t>
             </a:fld>
             <a:endParaRPr lang="en-US" dirty="0"/>
           </a:p>
@@ -16573,6 +16578,1229 @@
           <a:p>
             <a:r>
               <a:rPr lang="en-US" dirty="0"/>
+              <a:t>Desired target state</a:t>
+            </a:r>
+          </a:p>
+        </p:txBody>
+      </p:sp>
+      <p:grpSp>
+        <p:nvGrpSpPr>
+          <p:cNvPr id="13" name="Group 12"/>
+          <p:cNvGrpSpPr/>
+          <p:nvPr/>
+        </p:nvGrpSpPr>
+        <p:grpSpPr>
+          <a:xfrm>
+            <a:off x="2674620" y="3124200"/>
+            <a:ext cx="6187440" cy="1752600"/>
+            <a:chOff x="2697480" y="2743200"/>
+            <a:chExt cx="6187440" cy="2034540"/>
+          </a:xfrm>
+        </p:grpSpPr>
+        <p:sp>
+          <p:nvSpPr>
+            <p:cNvPr id="12" name="Rectangle: Rounded Corners 11"/>
+            <p:cNvSpPr/>
+            <p:nvPr/>
+          </p:nvSpPr>
+          <p:spPr bwMode="gray">
+            <a:xfrm>
+              <a:off x="2697480" y="2743200"/>
+              <a:ext cx="6187440" cy="2034540"/>
+            </a:xfrm>
+            <a:prstGeom prst="roundRect">
+              <a:avLst/>
+            </a:prstGeom>
+            <a:ln>
+              <a:headEnd/>
+              <a:tailEnd/>
+            </a:ln>
+          </p:spPr>
+          <p:style>
+            <a:lnRef idx="2">
+              <a:schemeClr val="accent4"/>
+            </a:lnRef>
+            <a:fillRef idx="1">
+              <a:schemeClr val="lt1"/>
+            </a:fillRef>
+            <a:effectRef idx="0">
+              <a:schemeClr val="accent4"/>
+            </a:effectRef>
+            <a:fontRef idx="minor">
+              <a:schemeClr val="dk1"/>
+            </a:fontRef>
+          </p:style>
+          <p:txBody>
+            <a:bodyPr lIns="90000" tIns="72000" rIns="90000" bIns="72000" rtlCol="0" anchor="ctr"/>
+            <a:lstStyle/>
+            <a:p>
+              <a:pPr marR="0" algn="ctr" defTabSz="914400" eaLnBrk="1" fontAlgn="base" latinLnBrk="0" hangingPunct="1">
+                <a:lnSpc>
+                  <a:spcPct val="100000"/>
+                </a:lnSpc>
+                <a:spcBef>
+                  <a:spcPct val="50000"/>
+                </a:spcBef>
+                <a:spcAft>
+                  <a:spcPct val="0"/>
+                </a:spcAft>
+                <a:buClr>
+                  <a:srgbClr val="F0AB00"/>
+                </a:buClr>
+                <a:buSzPct val="80000"/>
+                <a:tabLst/>
+              </a:pPr>
+              <a:endParaRPr kumimoji="0" lang="en-US" sz="1800" b="0" i="0" u="none" strike="noStrike" kern="0" cap="none" spc="0" normalizeH="0" baseline="0" noProof="0" dirty="0" err="1">
+                <a:ln>
+                  <a:noFill/>
+                </a:ln>
+                <a:effectLst/>
+                <a:uLnTx/>
+                <a:uFillTx/>
+                <a:ea typeface="Arial Unicode MS" pitchFamily="34" charset="-128"/>
+                <a:cs typeface="Arial Unicode MS" pitchFamily="34" charset="-128"/>
+              </a:endParaRPr>
+            </a:p>
+          </p:txBody>
+        </p:sp>
+        <p:sp>
+          <p:nvSpPr>
+            <p:cNvPr id="4" name="Rectangle 3"/>
+            <p:cNvSpPr/>
+            <p:nvPr/>
+          </p:nvSpPr>
+          <p:spPr bwMode="gray">
+            <a:xfrm>
+              <a:off x="2989653" y="3164976"/>
+              <a:ext cx="1627931" cy="1156258"/>
+            </a:xfrm>
+            <a:prstGeom prst="rect">
+              <a:avLst/>
+            </a:prstGeom>
+            <a:ln>
+              <a:headEnd/>
+              <a:tailEnd/>
+            </a:ln>
+          </p:spPr>
+          <p:style>
+            <a:lnRef idx="2">
+              <a:schemeClr val="accent4"/>
+            </a:lnRef>
+            <a:fillRef idx="1">
+              <a:schemeClr val="lt1"/>
+            </a:fillRef>
+            <a:effectRef idx="0">
+              <a:schemeClr val="accent4"/>
+            </a:effectRef>
+            <a:fontRef idx="minor">
+              <a:schemeClr val="dk1"/>
+            </a:fontRef>
+          </p:style>
+          <p:txBody>
+            <a:bodyPr lIns="90000" tIns="72000" rIns="90000" bIns="72000" rtlCol="0" anchor="ctr"/>
+            <a:lstStyle/>
+            <a:p>
+              <a:pPr marR="0" algn="ctr" defTabSz="914400" eaLnBrk="1" fontAlgn="base" latinLnBrk="0" hangingPunct="1">
+                <a:lnSpc>
+                  <a:spcPct val="100000"/>
+                </a:lnSpc>
+                <a:spcBef>
+                  <a:spcPct val="50000"/>
+                </a:spcBef>
+                <a:spcAft>
+                  <a:spcPct val="0"/>
+                </a:spcAft>
+                <a:buClr>
+                  <a:srgbClr val="F0AB00"/>
+                </a:buClr>
+                <a:buSzPct val="80000"/>
+                <a:tabLst/>
+              </a:pPr>
+              <a:r>
+                <a:rPr lang="de-DE" sz="1800" kern="0" dirty="0" err="1">
+                  <a:ea typeface="Arial Unicode MS" pitchFamily="34" charset="-128"/>
+                  <a:cs typeface="Arial Unicode MS" pitchFamily="34" charset="-128"/>
+                </a:rPr>
+                <a:t>nginx</a:t>
+              </a:r>
+              <a:endParaRPr kumimoji="0" lang="de-DE" sz="1800" b="0" i="0" u="none" strike="noStrike" kern="0" cap="none" spc="0" normalizeH="0" baseline="0" noProof="0" dirty="0">
+                <a:ln>
+                  <a:noFill/>
+                </a:ln>
+                <a:effectLst/>
+                <a:uLnTx/>
+                <a:uFillTx/>
+                <a:ea typeface="Arial Unicode MS" pitchFamily="34" charset="-128"/>
+                <a:cs typeface="Arial Unicode MS" pitchFamily="34" charset="-128"/>
+              </a:endParaRPr>
+            </a:p>
+          </p:txBody>
+        </p:sp>
+        <p:sp>
+          <p:nvSpPr>
+            <p:cNvPr id="6" name="Rectangle 5"/>
+            <p:cNvSpPr/>
+            <p:nvPr/>
+          </p:nvSpPr>
+          <p:spPr bwMode="gray">
+            <a:xfrm>
+              <a:off x="6855115" y="3164976"/>
+              <a:ext cx="1627931" cy="1156258"/>
+            </a:xfrm>
+            <a:prstGeom prst="rect">
+              <a:avLst/>
+            </a:prstGeom>
+            <a:ln>
+              <a:headEnd/>
+              <a:tailEnd/>
+            </a:ln>
+          </p:spPr>
+          <p:style>
+            <a:lnRef idx="2">
+              <a:schemeClr val="accent4"/>
+            </a:lnRef>
+            <a:fillRef idx="1">
+              <a:schemeClr val="lt1"/>
+            </a:fillRef>
+            <a:effectRef idx="0">
+              <a:schemeClr val="accent4"/>
+            </a:effectRef>
+            <a:fontRef idx="minor">
+              <a:schemeClr val="dk1"/>
+            </a:fontRef>
+          </p:style>
+          <p:txBody>
+            <a:bodyPr lIns="90000" tIns="72000" rIns="90000" bIns="72000" rtlCol="0" anchor="ctr"/>
+            <a:lstStyle/>
+            <a:p>
+              <a:pPr marR="0" algn="ctr" defTabSz="914400" eaLnBrk="1" fontAlgn="base" latinLnBrk="0" hangingPunct="1">
+                <a:lnSpc>
+                  <a:spcPct val="100000"/>
+                </a:lnSpc>
+                <a:spcBef>
+                  <a:spcPct val="50000"/>
+                </a:spcBef>
+                <a:spcAft>
+                  <a:spcPct val="0"/>
+                </a:spcAft>
+                <a:buClr>
+                  <a:srgbClr val="F0AB00"/>
+                </a:buClr>
+                <a:buSzPct val="80000"/>
+                <a:tabLst/>
+              </a:pPr>
+              <a:r>
+                <a:rPr lang="de-DE" sz="1800" kern="0" dirty="0" err="1">
+                  <a:ea typeface="Arial Unicode MS" pitchFamily="34" charset="-128"/>
+                  <a:cs typeface="Arial Unicode MS" pitchFamily="34" charset="-128"/>
+                </a:rPr>
+                <a:t>nginx</a:t>
+              </a:r>
+              <a:endParaRPr kumimoji="0" lang="de-DE" sz="1800" b="0" i="0" u="none" strike="noStrike" kern="0" cap="none" spc="0" normalizeH="0" baseline="0" noProof="0" dirty="0">
+                <a:ln>
+                  <a:noFill/>
+                </a:ln>
+                <a:effectLst/>
+                <a:uLnTx/>
+                <a:uFillTx/>
+                <a:ea typeface="Arial Unicode MS" pitchFamily="34" charset="-128"/>
+                <a:cs typeface="Arial Unicode MS" pitchFamily="34" charset="-128"/>
+              </a:endParaRPr>
+            </a:p>
+          </p:txBody>
+        </p:sp>
+        <p:sp>
+          <p:nvSpPr>
+            <p:cNvPr id="7" name="Rectangle 6"/>
+            <p:cNvSpPr/>
+            <p:nvPr/>
+          </p:nvSpPr>
+          <p:spPr bwMode="gray">
+            <a:xfrm>
+              <a:off x="4922384" y="3164976"/>
+              <a:ext cx="1627931" cy="1156258"/>
+            </a:xfrm>
+            <a:prstGeom prst="rect">
+              <a:avLst/>
+            </a:prstGeom>
+            <a:ln>
+              <a:headEnd/>
+              <a:tailEnd/>
+            </a:ln>
+          </p:spPr>
+          <p:style>
+            <a:lnRef idx="2">
+              <a:schemeClr val="accent4"/>
+            </a:lnRef>
+            <a:fillRef idx="1">
+              <a:schemeClr val="lt1"/>
+            </a:fillRef>
+            <a:effectRef idx="0">
+              <a:schemeClr val="accent4"/>
+            </a:effectRef>
+            <a:fontRef idx="minor">
+              <a:schemeClr val="dk1"/>
+            </a:fontRef>
+          </p:style>
+          <p:txBody>
+            <a:bodyPr lIns="90000" tIns="72000" rIns="90000" bIns="72000" rtlCol="0" anchor="ctr"/>
+            <a:lstStyle/>
+            <a:p>
+              <a:pPr marR="0" algn="ctr" defTabSz="914400" eaLnBrk="1" fontAlgn="base" latinLnBrk="0" hangingPunct="1">
+                <a:lnSpc>
+                  <a:spcPct val="100000"/>
+                </a:lnSpc>
+                <a:spcBef>
+                  <a:spcPct val="50000"/>
+                </a:spcBef>
+                <a:spcAft>
+                  <a:spcPct val="0"/>
+                </a:spcAft>
+                <a:buClr>
+                  <a:srgbClr val="F0AB00"/>
+                </a:buClr>
+                <a:buSzPct val="80000"/>
+                <a:tabLst/>
+              </a:pPr>
+              <a:r>
+                <a:rPr lang="de-DE" sz="1800" kern="0" dirty="0" err="1">
+                  <a:ea typeface="Arial Unicode MS" pitchFamily="34" charset="-128"/>
+                  <a:cs typeface="Arial Unicode MS" pitchFamily="34" charset="-128"/>
+                </a:rPr>
+                <a:t>nginx</a:t>
+              </a:r>
+              <a:endParaRPr kumimoji="0" lang="de-DE" sz="1800" b="0" i="0" u="none" strike="noStrike" kern="0" cap="none" spc="0" normalizeH="0" baseline="0" noProof="0" dirty="0">
+                <a:ln>
+                  <a:noFill/>
+                </a:ln>
+                <a:effectLst/>
+                <a:uLnTx/>
+                <a:uFillTx/>
+                <a:ea typeface="Arial Unicode MS" pitchFamily="34" charset="-128"/>
+                <a:cs typeface="Arial Unicode MS" pitchFamily="34" charset="-128"/>
+              </a:endParaRPr>
+            </a:p>
+          </p:txBody>
+        </p:sp>
+      </p:grpSp>
+      <p:grpSp>
+        <p:nvGrpSpPr>
+          <p:cNvPr id="15" name="Group 14"/>
+          <p:cNvGrpSpPr/>
+          <p:nvPr/>
+        </p:nvGrpSpPr>
+        <p:grpSpPr>
+          <a:xfrm>
+            <a:off x="3482340" y="5191896"/>
+            <a:ext cx="4572000" cy="1363980"/>
+            <a:chOff x="3421380" y="5067300"/>
+            <a:chExt cx="4572000" cy="1363980"/>
+          </a:xfrm>
+        </p:grpSpPr>
+        <p:sp>
+          <p:nvSpPr>
+            <p:cNvPr id="14" name="Rectangle: Rounded Corners 13"/>
+            <p:cNvSpPr/>
+            <p:nvPr/>
+          </p:nvSpPr>
+          <p:spPr bwMode="gray">
+            <a:xfrm>
+              <a:off x="3421380" y="5067300"/>
+              <a:ext cx="4572000" cy="1363980"/>
+            </a:xfrm>
+            <a:prstGeom prst="roundRect">
+              <a:avLst/>
+            </a:prstGeom>
+            <a:ln>
+              <a:headEnd/>
+              <a:tailEnd/>
+            </a:ln>
+          </p:spPr>
+          <p:style>
+            <a:lnRef idx="2">
+              <a:schemeClr val="accent4"/>
+            </a:lnRef>
+            <a:fillRef idx="1">
+              <a:schemeClr val="lt1"/>
+            </a:fillRef>
+            <a:effectRef idx="0">
+              <a:schemeClr val="accent4"/>
+            </a:effectRef>
+            <a:fontRef idx="minor">
+              <a:schemeClr val="dk1"/>
+            </a:fontRef>
+          </p:style>
+          <p:txBody>
+            <a:bodyPr lIns="90000" tIns="72000" rIns="90000" bIns="72000" rtlCol="0" anchor="ctr"/>
+            <a:lstStyle/>
+            <a:p>
+              <a:pPr marR="0" algn="ctr" defTabSz="914400" eaLnBrk="1" fontAlgn="base" latinLnBrk="0" hangingPunct="1">
+                <a:lnSpc>
+                  <a:spcPct val="100000"/>
+                </a:lnSpc>
+                <a:spcBef>
+                  <a:spcPct val="50000"/>
+                </a:spcBef>
+                <a:spcAft>
+                  <a:spcPct val="0"/>
+                </a:spcAft>
+                <a:buClr>
+                  <a:srgbClr val="F0AB00"/>
+                </a:buClr>
+                <a:buSzPct val="80000"/>
+                <a:tabLst/>
+              </a:pPr>
+              <a:endParaRPr kumimoji="0" lang="en-US" sz="1800" b="0" i="0" u="none" strike="noStrike" kern="0" cap="none" spc="0" normalizeH="0" baseline="0" noProof="0" dirty="0" err="1">
+                <a:ln>
+                  <a:noFill/>
+                </a:ln>
+                <a:effectLst/>
+                <a:uLnTx/>
+                <a:uFillTx/>
+                <a:ea typeface="Arial Unicode MS" pitchFamily="34" charset="-128"/>
+                <a:cs typeface="Arial Unicode MS" pitchFamily="34" charset="-128"/>
+              </a:endParaRPr>
+            </a:p>
+          </p:txBody>
+        </p:sp>
+        <p:sp>
+          <p:nvSpPr>
+            <p:cNvPr id="8" name="Cylinder 7"/>
+            <p:cNvSpPr/>
+            <p:nvPr/>
+          </p:nvSpPr>
+          <p:spPr bwMode="gray">
+            <a:xfrm>
+              <a:off x="3946888" y="5248563"/>
+              <a:ext cx="998220" cy="1004248"/>
+            </a:xfrm>
+            <a:prstGeom prst="can">
+              <a:avLst/>
+            </a:prstGeom>
+            <a:ln>
+              <a:headEnd/>
+              <a:tailEnd/>
+            </a:ln>
+          </p:spPr>
+          <p:style>
+            <a:lnRef idx="2">
+              <a:schemeClr val="accent4"/>
+            </a:lnRef>
+            <a:fillRef idx="1">
+              <a:schemeClr val="lt1"/>
+            </a:fillRef>
+            <a:effectRef idx="0">
+              <a:schemeClr val="accent4"/>
+            </a:effectRef>
+            <a:fontRef idx="minor">
+              <a:schemeClr val="dk1"/>
+            </a:fontRef>
+          </p:style>
+          <p:txBody>
+            <a:bodyPr lIns="90000" tIns="72000" rIns="90000" bIns="72000" rtlCol="0" anchor="ctr"/>
+            <a:lstStyle/>
+            <a:p>
+              <a:pPr marR="0" algn="ctr" defTabSz="914400" eaLnBrk="1" fontAlgn="base" latinLnBrk="0" hangingPunct="1">
+                <a:lnSpc>
+                  <a:spcPct val="100000"/>
+                </a:lnSpc>
+                <a:spcBef>
+                  <a:spcPct val="50000"/>
+                </a:spcBef>
+                <a:spcAft>
+                  <a:spcPct val="0"/>
+                </a:spcAft>
+                <a:buClr>
+                  <a:srgbClr val="F0AB00"/>
+                </a:buClr>
+                <a:buSzPct val="80000"/>
+                <a:tabLst/>
+              </a:pPr>
+              <a:r>
+                <a:rPr lang="de-DE" sz="1800" kern="0" dirty="0" err="1">
+                  <a:ea typeface="Arial Unicode MS" pitchFamily="34" charset="-128"/>
+                  <a:cs typeface="Arial Unicode MS" pitchFamily="34" charset="-128"/>
+                </a:rPr>
+                <a:t>custom</a:t>
+              </a:r>
+              <a:r>
+                <a:rPr lang="de-DE" sz="1800" kern="0" dirty="0">
+                  <a:ea typeface="Arial Unicode MS" pitchFamily="34" charset="-128"/>
+                  <a:cs typeface="Arial Unicode MS" pitchFamily="34" charset="-128"/>
+                </a:rPr>
+                <a:t> </a:t>
+              </a:r>
+              <a:r>
+                <a:rPr kumimoji="0" lang="de-DE" sz="1800" b="0" i="0" u="none" strike="noStrike" kern="0" cap="none" spc="0" normalizeH="0" baseline="0" noProof="0" dirty="0" err="1">
+                  <a:ln>
+                    <a:noFill/>
+                  </a:ln>
+                  <a:effectLst/>
+                  <a:uLnTx/>
+                  <a:uFillTx/>
+                  <a:ea typeface="Arial Unicode MS" pitchFamily="34" charset="-128"/>
+                  <a:cs typeface="Arial Unicode MS" pitchFamily="34" charset="-128"/>
+                </a:rPr>
+                <a:t>content</a:t>
+              </a:r>
+              <a:endParaRPr kumimoji="0" lang="de-DE" sz="1800" b="0" i="0" u="none" strike="noStrike" kern="0" cap="none" spc="0" normalizeH="0" baseline="0" noProof="0" dirty="0">
+                <a:ln>
+                  <a:noFill/>
+                </a:ln>
+                <a:effectLst/>
+                <a:uLnTx/>
+                <a:uFillTx/>
+                <a:ea typeface="Arial Unicode MS" pitchFamily="34" charset="-128"/>
+                <a:cs typeface="Arial Unicode MS" pitchFamily="34" charset="-128"/>
+              </a:endParaRPr>
+            </a:p>
+          </p:txBody>
+        </p:sp>
+        <p:sp>
+          <p:nvSpPr>
+            <p:cNvPr id="9" name="Cylinder 8"/>
+            <p:cNvSpPr/>
+            <p:nvPr/>
+          </p:nvSpPr>
+          <p:spPr bwMode="gray">
+            <a:xfrm>
+              <a:off x="5214379" y="5248563"/>
+              <a:ext cx="998220" cy="1004248"/>
+            </a:xfrm>
+            <a:prstGeom prst="can">
+              <a:avLst/>
+            </a:prstGeom>
+            <a:ln>
+              <a:headEnd/>
+              <a:tailEnd/>
+            </a:ln>
+          </p:spPr>
+          <p:style>
+            <a:lnRef idx="2">
+              <a:schemeClr val="accent4"/>
+            </a:lnRef>
+            <a:fillRef idx="1">
+              <a:schemeClr val="lt1"/>
+            </a:fillRef>
+            <a:effectRef idx="0">
+              <a:schemeClr val="accent4"/>
+            </a:effectRef>
+            <a:fontRef idx="minor">
+              <a:schemeClr val="dk1"/>
+            </a:fontRef>
+          </p:style>
+          <p:txBody>
+            <a:bodyPr lIns="90000" tIns="72000" rIns="90000" bIns="72000" rtlCol="0" anchor="ctr"/>
+            <a:lstStyle/>
+            <a:p>
+              <a:pPr marR="0" algn="ctr" defTabSz="914400" eaLnBrk="1" fontAlgn="base" latinLnBrk="0" hangingPunct="1">
+                <a:lnSpc>
+                  <a:spcPct val="100000"/>
+                </a:lnSpc>
+                <a:spcBef>
+                  <a:spcPct val="50000"/>
+                </a:spcBef>
+                <a:spcAft>
+                  <a:spcPct val="0"/>
+                </a:spcAft>
+                <a:buClr>
+                  <a:srgbClr val="F0AB00"/>
+                </a:buClr>
+                <a:buSzPct val="80000"/>
+                <a:tabLst/>
+              </a:pPr>
+              <a:r>
+                <a:rPr kumimoji="0" lang="de-DE" sz="1800" b="0" i="0" u="none" strike="noStrike" kern="0" cap="none" spc="0" normalizeH="0" baseline="0" noProof="0" dirty="0" err="1">
+                  <a:ln>
+                    <a:noFill/>
+                  </a:ln>
+                  <a:effectLst/>
+                  <a:uLnTx/>
+                  <a:uFillTx/>
+                  <a:ea typeface="Arial Unicode MS" pitchFamily="34" charset="-128"/>
+                  <a:cs typeface="Arial Unicode MS" pitchFamily="34" charset="-128"/>
+                </a:rPr>
+                <a:t>config</a:t>
+              </a:r>
+              <a:endParaRPr kumimoji="0" lang="de-DE" sz="1800" b="0" i="0" u="none" strike="noStrike" kern="0" cap="none" spc="0" normalizeH="0" baseline="0" noProof="0" dirty="0">
+                <a:ln>
+                  <a:noFill/>
+                </a:ln>
+                <a:effectLst/>
+                <a:uLnTx/>
+                <a:uFillTx/>
+                <a:ea typeface="Arial Unicode MS" pitchFamily="34" charset="-128"/>
+                <a:cs typeface="Arial Unicode MS" pitchFamily="34" charset="-128"/>
+              </a:endParaRPr>
+            </a:p>
+          </p:txBody>
+        </p:sp>
+        <p:sp>
+          <p:nvSpPr>
+            <p:cNvPr id="10" name="Cylinder 9"/>
+            <p:cNvSpPr/>
+            <p:nvPr/>
+          </p:nvSpPr>
+          <p:spPr bwMode="gray">
+            <a:xfrm>
+              <a:off x="6481870" y="5248563"/>
+              <a:ext cx="998220" cy="1004248"/>
+            </a:xfrm>
+            <a:prstGeom prst="can">
+              <a:avLst/>
+            </a:prstGeom>
+            <a:ln>
+              <a:headEnd/>
+              <a:tailEnd/>
+            </a:ln>
+          </p:spPr>
+          <p:style>
+            <a:lnRef idx="2">
+              <a:schemeClr val="accent4"/>
+            </a:lnRef>
+            <a:fillRef idx="1">
+              <a:schemeClr val="lt1"/>
+            </a:fillRef>
+            <a:effectRef idx="0">
+              <a:schemeClr val="accent4"/>
+            </a:effectRef>
+            <a:fontRef idx="minor">
+              <a:schemeClr val="dk1"/>
+            </a:fontRef>
+          </p:style>
+          <p:txBody>
+            <a:bodyPr lIns="90000" tIns="72000" rIns="90000" bIns="72000" rtlCol="0" anchor="ctr"/>
+            <a:lstStyle/>
+            <a:p>
+              <a:pPr marR="0" algn="ctr" defTabSz="914400" eaLnBrk="1" fontAlgn="base" latinLnBrk="0" hangingPunct="1">
+                <a:lnSpc>
+                  <a:spcPct val="100000"/>
+                </a:lnSpc>
+                <a:spcBef>
+                  <a:spcPct val="50000"/>
+                </a:spcBef>
+                <a:spcAft>
+                  <a:spcPct val="0"/>
+                </a:spcAft>
+                <a:buClr>
+                  <a:srgbClr val="F0AB00"/>
+                </a:buClr>
+                <a:buSzPct val="80000"/>
+                <a:tabLst/>
+              </a:pPr>
+              <a:r>
+                <a:rPr lang="de-DE" sz="1800" kern="0" dirty="0" err="1">
+                  <a:ea typeface="Arial Unicode MS" pitchFamily="34" charset="-128"/>
+                  <a:cs typeface="Arial Unicode MS" pitchFamily="34" charset="-128"/>
+                </a:rPr>
+                <a:t>tls</a:t>
+              </a:r>
+              <a:r>
+                <a:rPr lang="de-DE" sz="1800" kern="0" dirty="0">
+                  <a:ea typeface="Arial Unicode MS" pitchFamily="34" charset="-128"/>
+                  <a:cs typeface="Arial Unicode MS" pitchFamily="34" charset="-128"/>
+                </a:rPr>
+                <a:t> </a:t>
+              </a:r>
+              <a:r>
+                <a:rPr lang="de-DE" sz="1800" kern="0" dirty="0" err="1">
+                  <a:ea typeface="Arial Unicode MS" pitchFamily="34" charset="-128"/>
+                  <a:cs typeface="Arial Unicode MS" pitchFamily="34" charset="-128"/>
+                </a:rPr>
+                <a:t>certs</a:t>
+              </a:r>
+              <a:endParaRPr kumimoji="0" lang="de-DE" sz="1800" b="0" i="0" u="none" strike="noStrike" kern="0" cap="none" spc="0" normalizeH="0" baseline="0" noProof="0" dirty="0">
+                <a:ln>
+                  <a:noFill/>
+                </a:ln>
+                <a:effectLst/>
+                <a:uLnTx/>
+                <a:uFillTx/>
+                <a:ea typeface="Arial Unicode MS" pitchFamily="34" charset="-128"/>
+                <a:cs typeface="Arial Unicode MS" pitchFamily="34" charset="-128"/>
+              </a:endParaRPr>
+            </a:p>
+          </p:txBody>
+        </p:sp>
+      </p:grpSp>
+      <p:sp>
+        <p:nvSpPr>
+          <p:cNvPr id="16" name="Arrow: Up-Down 15"/>
+          <p:cNvSpPr/>
+          <p:nvPr/>
+        </p:nvSpPr>
+        <p:spPr bwMode="gray">
+          <a:xfrm>
+            <a:off x="5657231" y="4702919"/>
+            <a:ext cx="222219" cy="635300"/>
+          </a:xfrm>
+          <a:prstGeom prst="upDownArrow">
+            <a:avLst/>
+          </a:prstGeom>
+          <a:solidFill>
+            <a:schemeClr val="accent4"/>
+          </a:solidFill>
+          <a:ln w="6350" algn="ctr">
+            <a:noFill/>
+            <a:miter lim="800000"/>
+            <a:headEnd/>
+            <a:tailEnd/>
+          </a:ln>
+        </p:spPr>
+        <p:txBody>
+          <a:bodyPr lIns="90000" tIns="72000" rIns="90000" bIns="72000" rtlCol="0" anchor="ctr"/>
+          <a:lstStyle/>
+          <a:p>
+            <a:pPr marR="0" algn="ctr" defTabSz="914400" eaLnBrk="1" fontAlgn="base" latinLnBrk="0" hangingPunct="1">
+              <a:lnSpc>
+                <a:spcPct val="100000"/>
+              </a:lnSpc>
+              <a:spcBef>
+                <a:spcPct val="50000"/>
+              </a:spcBef>
+              <a:spcAft>
+                <a:spcPct val="0"/>
+              </a:spcAft>
+              <a:buClr>
+                <a:srgbClr val="F0AB00"/>
+              </a:buClr>
+              <a:buSzPct val="80000"/>
+              <a:tabLst/>
+            </a:pPr>
+            <a:endParaRPr kumimoji="0" lang="en-US" sz="1800" b="0" i="0" u="none" strike="noStrike" kern="0" cap="none" spc="0" normalizeH="0" baseline="0" noProof="0" dirty="0" err="1">
+              <a:ln>
+                <a:noFill/>
+              </a:ln>
+              <a:effectLst/>
+              <a:uLnTx/>
+              <a:uFillTx/>
+              <a:ea typeface="Arial Unicode MS" pitchFamily="34" charset="-128"/>
+              <a:cs typeface="Arial Unicode MS" pitchFamily="34" charset="-128"/>
+            </a:endParaRPr>
+          </a:p>
+        </p:txBody>
+      </p:sp>
+      <p:sp>
+        <p:nvSpPr>
+          <p:cNvPr id="17" name="Cloud 16"/>
+          <p:cNvSpPr/>
+          <p:nvPr/>
+        </p:nvSpPr>
+        <p:spPr bwMode="gray">
+          <a:xfrm>
+            <a:off x="4077318" y="772619"/>
+            <a:ext cx="3382042" cy="807791"/>
+          </a:xfrm>
+          <a:prstGeom prst="cloud">
+            <a:avLst/>
+          </a:prstGeom>
+          <a:solidFill>
+            <a:schemeClr val="accent1"/>
+          </a:solidFill>
+          <a:ln w="6350" algn="ctr">
+            <a:noFill/>
+            <a:miter lim="800000"/>
+            <a:headEnd/>
+            <a:tailEnd/>
+          </a:ln>
+        </p:spPr>
+        <p:txBody>
+          <a:bodyPr lIns="90000" tIns="72000" rIns="90000" bIns="72000" rtlCol="0" anchor="ctr"/>
+          <a:lstStyle/>
+          <a:p>
+            <a:pPr marR="0" algn="ctr" defTabSz="914400" eaLnBrk="1" fontAlgn="base" latinLnBrk="0" hangingPunct="1">
+              <a:lnSpc>
+                <a:spcPct val="100000"/>
+              </a:lnSpc>
+              <a:spcBef>
+                <a:spcPct val="50000"/>
+              </a:spcBef>
+              <a:spcAft>
+                <a:spcPct val="0"/>
+              </a:spcAft>
+              <a:buClr>
+                <a:srgbClr val="F0AB00"/>
+              </a:buClr>
+              <a:buSzPct val="80000"/>
+              <a:tabLst/>
+            </a:pPr>
+            <a:endParaRPr kumimoji="0" lang="en-US" sz="1800" b="0" i="0" u="none" strike="noStrike" kern="0" cap="none" spc="0" normalizeH="0" baseline="0" noProof="0" dirty="0" err="1">
+              <a:ln>
+                <a:noFill/>
+              </a:ln>
+              <a:effectLst/>
+              <a:uLnTx/>
+              <a:uFillTx/>
+              <a:ea typeface="Arial Unicode MS" pitchFamily="34" charset="-128"/>
+              <a:cs typeface="Arial Unicode MS" pitchFamily="34" charset="-128"/>
+            </a:endParaRPr>
+          </a:p>
+        </p:txBody>
+      </p:sp>
+      <p:grpSp>
+        <p:nvGrpSpPr>
+          <p:cNvPr id="27" name="Group 26"/>
+          <p:cNvGrpSpPr/>
+          <p:nvPr/>
+        </p:nvGrpSpPr>
+        <p:grpSpPr>
+          <a:xfrm>
+            <a:off x="4165925" y="2129720"/>
+            <a:ext cx="3204830" cy="681069"/>
+            <a:chOff x="2697480" y="2743200"/>
+            <a:chExt cx="6187440" cy="2034540"/>
+          </a:xfrm>
+        </p:grpSpPr>
+        <p:sp>
+          <p:nvSpPr>
+            <p:cNvPr id="28" name="Rectangle: Rounded Corners 27"/>
+            <p:cNvSpPr/>
+            <p:nvPr/>
+          </p:nvSpPr>
+          <p:spPr bwMode="gray">
+            <a:xfrm>
+              <a:off x="2697480" y="2743200"/>
+              <a:ext cx="6187440" cy="2034540"/>
+            </a:xfrm>
+            <a:prstGeom prst="roundRect">
+              <a:avLst/>
+            </a:prstGeom>
+            <a:ln>
+              <a:headEnd/>
+              <a:tailEnd/>
+            </a:ln>
+          </p:spPr>
+          <p:style>
+            <a:lnRef idx="2">
+              <a:schemeClr val="accent4"/>
+            </a:lnRef>
+            <a:fillRef idx="1">
+              <a:schemeClr val="lt1"/>
+            </a:fillRef>
+            <a:effectRef idx="0">
+              <a:schemeClr val="accent4"/>
+            </a:effectRef>
+            <a:fontRef idx="minor">
+              <a:schemeClr val="dk1"/>
+            </a:fontRef>
+          </p:style>
+          <p:txBody>
+            <a:bodyPr lIns="90000" tIns="72000" rIns="90000" bIns="72000" rtlCol="0" anchor="ctr"/>
+            <a:lstStyle/>
+            <a:p>
+              <a:pPr marR="0" algn="ctr" defTabSz="914400" eaLnBrk="1" fontAlgn="base" latinLnBrk="0" hangingPunct="1">
+                <a:lnSpc>
+                  <a:spcPct val="100000"/>
+                </a:lnSpc>
+                <a:spcBef>
+                  <a:spcPct val="50000"/>
+                </a:spcBef>
+                <a:spcAft>
+                  <a:spcPct val="0"/>
+                </a:spcAft>
+                <a:buClr>
+                  <a:srgbClr val="F0AB00"/>
+                </a:buClr>
+                <a:buSzPct val="80000"/>
+                <a:tabLst/>
+              </a:pPr>
+              <a:endParaRPr kumimoji="0" lang="en-US" sz="1800" b="0" i="0" u="none" strike="noStrike" kern="0" cap="none" spc="0" normalizeH="0" baseline="0" noProof="0" dirty="0" err="1">
+                <a:ln>
+                  <a:noFill/>
+                </a:ln>
+                <a:effectLst/>
+                <a:uLnTx/>
+                <a:uFillTx/>
+                <a:ea typeface="Arial Unicode MS" pitchFamily="34" charset="-128"/>
+                <a:cs typeface="Arial Unicode MS" pitchFamily="34" charset="-128"/>
+              </a:endParaRPr>
+            </a:p>
+          </p:txBody>
+        </p:sp>
+        <p:sp>
+          <p:nvSpPr>
+            <p:cNvPr id="29" name="Rectangle 28"/>
+            <p:cNvSpPr/>
+            <p:nvPr/>
+          </p:nvSpPr>
+          <p:spPr bwMode="gray">
+            <a:xfrm>
+              <a:off x="3493771" y="3130180"/>
+              <a:ext cx="4594857" cy="1156257"/>
+            </a:xfrm>
+            <a:prstGeom prst="rect">
+              <a:avLst/>
+            </a:prstGeom>
+            <a:ln>
+              <a:headEnd/>
+              <a:tailEnd/>
+            </a:ln>
+          </p:spPr>
+          <p:style>
+            <a:lnRef idx="2">
+              <a:schemeClr val="accent4"/>
+            </a:lnRef>
+            <a:fillRef idx="1">
+              <a:schemeClr val="lt1"/>
+            </a:fillRef>
+            <a:effectRef idx="0">
+              <a:schemeClr val="accent4"/>
+            </a:effectRef>
+            <a:fontRef idx="minor">
+              <a:schemeClr val="dk1"/>
+            </a:fontRef>
+          </p:style>
+          <p:txBody>
+            <a:bodyPr lIns="90000" tIns="72000" rIns="90000" bIns="72000" rtlCol="0" anchor="ctr"/>
+            <a:lstStyle/>
+            <a:p>
+              <a:pPr marR="0" algn="ctr" defTabSz="914400" eaLnBrk="1" fontAlgn="base" latinLnBrk="0" hangingPunct="1">
+                <a:lnSpc>
+                  <a:spcPct val="100000"/>
+                </a:lnSpc>
+                <a:spcBef>
+                  <a:spcPct val="50000"/>
+                </a:spcBef>
+                <a:spcAft>
+                  <a:spcPct val="0"/>
+                </a:spcAft>
+                <a:buClr>
+                  <a:srgbClr val="F0AB00"/>
+                </a:buClr>
+                <a:buSzPct val="80000"/>
+                <a:tabLst/>
+              </a:pPr>
+              <a:r>
+                <a:rPr lang="de-DE" sz="1800" kern="0" dirty="0" err="1">
+                  <a:ea typeface="Arial Unicode MS" pitchFamily="34" charset="-128"/>
+                  <a:cs typeface="Arial Unicode MS" pitchFamily="34" charset="-128"/>
+                </a:rPr>
+                <a:t>service</a:t>
+              </a:r>
+              <a:r>
+                <a:rPr lang="de-DE" sz="1800" kern="0" dirty="0">
+                  <a:ea typeface="Arial Unicode MS" pitchFamily="34" charset="-128"/>
+                  <a:cs typeface="Arial Unicode MS" pitchFamily="34" charset="-128"/>
+                </a:rPr>
+                <a:t> http / https</a:t>
+              </a:r>
+              <a:endParaRPr kumimoji="0" lang="de-DE" sz="1800" b="0" i="0" u="none" strike="noStrike" kern="0" cap="none" spc="0" normalizeH="0" baseline="0" noProof="0" dirty="0">
+                <a:ln>
+                  <a:noFill/>
+                </a:ln>
+                <a:effectLst/>
+                <a:uLnTx/>
+                <a:uFillTx/>
+                <a:ea typeface="Arial Unicode MS" pitchFamily="34" charset="-128"/>
+                <a:cs typeface="Arial Unicode MS" pitchFamily="34" charset="-128"/>
+              </a:endParaRPr>
+            </a:p>
+          </p:txBody>
+        </p:sp>
+      </p:grpSp>
+      <p:sp>
+        <p:nvSpPr>
+          <p:cNvPr id="18" name="Arrow: Up-Down 17"/>
+          <p:cNvSpPr/>
+          <p:nvPr/>
+        </p:nvSpPr>
+        <p:spPr bwMode="gray">
+          <a:xfrm>
+            <a:off x="5657231" y="2669184"/>
+            <a:ext cx="222219" cy="686436"/>
+          </a:xfrm>
+          <a:prstGeom prst="upDownArrow">
+            <a:avLst/>
+          </a:prstGeom>
+          <a:solidFill>
+            <a:schemeClr val="accent4"/>
+          </a:solidFill>
+          <a:ln w="6350" algn="ctr">
+            <a:noFill/>
+            <a:miter lim="800000"/>
+            <a:headEnd/>
+            <a:tailEnd/>
+          </a:ln>
+        </p:spPr>
+        <p:txBody>
+          <a:bodyPr lIns="90000" tIns="72000" rIns="90000" bIns="72000" rtlCol="0" anchor="ctr"/>
+          <a:lstStyle/>
+          <a:p>
+            <a:pPr marR="0" algn="ctr" defTabSz="914400" eaLnBrk="1" fontAlgn="base" latinLnBrk="0" hangingPunct="1">
+              <a:lnSpc>
+                <a:spcPct val="100000"/>
+              </a:lnSpc>
+              <a:spcBef>
+                <a:spcPct val="50000"/>
+              </a:spcBef>
+              <a:spcAft>
+                <a:spcPct val="0"/>
+              </a:spcAft>
+              <a:buClr>
+                <a:srgbClr val="F0AB00"/>
+              </a:buClr>
+              <a:buSzPct val="80000"/>
+              <a:tabLst/>
+            </a:pPr>
+            <a:endParaRPr kumimoji="0" lang="en-US" sz="1800" b="0" i="0" u="none" strike="noStrike" kern="0" cap="none" spc="0" normalizeH="0" baseline="0" noProof="0" dirty="0" err="1">
+              <a:ln>
+                <a:noFill/>
+              </a:ln>
+              <a:effectLst/>
+              <a:uLnTx/>
+              <a:uFillTx/>
+              <a:ea typeface="Arial Unicode MS" pitchFamily="34" charset="-128"/>
+              <a:cs typeface="Arial Unicode MS" pitchFamily="34" charset="-128"/>
+            </a:endParaRPr>
+          </a:p>
+        </p:txBody>
+      </p:sp>
+      <p:sp>
+        <p:nvSpPr>
+          <p:cNvPr id="32" name="Arrow: Up-Down 31"/>
+          <p:cNvSpPr/>
+          <p:nvPr/>
+        </p:nvSpPr>
+        <p:spPr bwMode="gray">
+          <a:xfrm>
+            <a:off x="5657230" y="1585837"/>
+            <a:ext cx="222219" cy="686436"/>
+          </a:xfrm>
+          <a:prstGeom prst="upDownArrow">
+            <a:avLst/>
+          </a:prstGeom>
+          <a:solidFill>
+            <a:schemeClr val="accent4"/>
+          </a:solidFill>
+          <a:ln w="6350" algn="ctr">
+            <a:noFill/>
+            <a:miter lim="800000"/>
+            <a:headEnd/>
+            <a:tailEnd/>
+          </a:ln>
+        </p:spPr>
+        <p:txBody>
+          <a:bodyPr lIns="90000" tIns="72000" rIns="90000" bIns="72000" rtlCol="0" anchor="ctr"/>
+          <a:lstStyle/>
+          <a:p>
+            <a:pPr marR="0" algn="ctr" defTabSz="914400" eaLnBrk="1" fontAlgn="base" latinLnBrk="0" hangingPunct="1">
+              <a:lnSpc>
+                <a:spcPct val="100000"/>
+              </a:lnSpc>
+              <a:spcBef>
+                <a:spcPct val="50000"/>
+              </a:spcBef>
+              <a:spcAft>
+                <a:spcPct val="0"/>
+              </a:spcAft>
+              <a:buClr>
+                <a:srgbClr val="F0AB00"/>
+              </a:buClr>
+              <a:buSzPct val="80000"/>
+              <a:tabLst/>
+            </a:pPr>
+            <a:endParaRPr kumimoji="0" lang="en-US" sz="1800" b="0" i="0" u="none" strike="noStrike" kern="0" cap="none" spc="0" normalizeH="0" baseline="0" noProof="0" dirty="0" err="1">
+              <a:ln>
+                <a:noFill/>
+              </a:ln>
+              <a:effectLst/>
+              <a:uLnTx/>
+              <a:uFillTx/>
+              <a:ea typeface="Arial Unicode MS" pitchFamily="34" charset="-128"/>
+              <a:cs typeface="Arial Unicode MS" pitchFamily="34" charset="-128"/>
+            </a:endParaRPr>
+          </a:p>
+        </p:txBody>
+      </p:sp>
+      <p:sp>
+        <p:nvSpPr>
+          <p:cNvPr id="20" name="Rectangle: Single Corner Snipped 19">
+            <a:extLst>
+              <a:ext uri="{FF2B5EF4-FFF2-40B4-BE49-F238E27FC236}">
+                <a16:creationId xmlns:a16="http://schemas.microsoft.com/office/drawing/2014/main" id="{C7F2FB60-D7EF-485F-AA1B-FC0AF0234EFB}"/>
+              </a:ext>
+            </a:extLst>
+          </p:cNvPr>
+          <p:cNvSpPr/>
+          <p:nvPr/>
+        </p:nvSpPr>
+        <p:spPr bwMode="gray">
+          <a:xfrm>
+            <a:off x="8616279" y="873332"/>
+            <a:ext cx="2619143" cy="1338815"/>
+          </a:xfrm>
+          <a:prstGeom prst="snip1Rect">
+            <a:avLst/>
+          </a:prstGeom>
+          <a:ln>
+            <a:headEnd/>
+            <a:tailEnd/>
+          </a:ln>
+        </p:spPr>
+        <p:style>
+          <a:lnRef idx="2">
+            <a:schemeClr val="accent2"/>
+          </a:lnRef>
+          <a:fillRef idx="1">
+            <a:schemeClr val="lt1"/>
+          </a:fillRef>
+          <a:effectRef idx="0">
+            <a:schemeClr val="accent2"/>
+          </a:effectRef>
+          <a:fontRef idx="minor">
+            <a:schemeClr val="dk1"/>
+          </a:fontRef>
+        </p:style>
+        <p:txBody>
+          <a:bodyPr lIns="90000" tIns="72000" rIns="90000" bIns="72000" rtlCol="0" anchor="ctr"/>
+          <a:lstStyle/>
+          <a:p>
+            <a:pPr marR="0" algn="ctr" defTabSz="914400" eaLnBrk="1" fontAlgn="base" latinLnBrk="0" hangingPunct="1">
+              <a:lnSpc>
+                <a:spcPct val="100000"/>
+              </a:lnSpc>
+              <a:spcBef>
+                <a:spcPct val="50000"/>
+              </a:spcBef>
+              <a:spcAft>
+                <a:spcPct val="0"/>
+              </a:spcAft>
+              <a:buClr>
+                <a:srgbClr val="F0AB00"/>
+              </a:buClr>
+              <a:buSzPct val="80000"/>
+              <a:tabLst/>
+            </a:pPr>
+            <a:r>
+              <a:rPr lang="en-US" sz="1800" kern="0" dirty="0">
+                <a:ea typeface="Arial Unicode MS" pitchFamily="34" charset="-128"/>
+                <a:cs typeface="Arial Unicode MS" pitchFamily="34" charset="-128"/>
+              </a:rPr>
+              <a:t>Filter incoming traffic </a:t>
+            </a:r>
+            <a:r>
+              <a:rPr lang="en-US" sz="1800" kern="0">
+                <a:ea typeface="Arial Unicode MS" pitchFamily="34" charset="-128"/>
+                <a:cs typeface="Arial Unicode MS" pitchFamily="34" charset="-128"/>
+              </a:rPr>
+              <a:t>with a network </a:t>
+            </a:r>
+            <a:r>
+              <a:rPr lang="en-US" sz="1800" kern="0" dirty="0">
+                <a:ea typeface="Arial Unicode MS" pitchFamily="34" charset="-128"/>
+                <a:cs typeface="Arial Unicode MS" pitchFamily="34" charset="-128"/>
+              </a:rPr>
+              <a:t>Policy</a:t>
+            </a:r>
+            <a:endParaRPr kumimoji="0" lang="en-US" sz="1800" b="0" i="0" u="none" strike="noStrike" kern="0" cap="none" spc="0" normalizeH="0" baseline="0" noProof="0" dirty="0">
+              <a:ln>
+                <a:noFill/>
+              </a:ln>
+              <a:effectLst/>
+              <a:uLnTx/>
+              <a:uFillTx/>
+              <a:ea typeface="Arial Unicode MS" pitchFamily="34" charset="-128"/>
+              <a:cs typeface="Arial Unicode MS" pitchFamily="34" charset="-128"/>
+            </a:endParaRPr>
+          </a:p>
+        </p:txBody>
+      </p:sp>
+      <p:cxnSp>
+        <p:nvCxnSpPr>
+          <p:cNvPr id="21" name="Straight Arrow Connector 20">
+            <a:extLst>
+              <a:ext uri="{FF2B5EF4-FFF2-40B4-BE49-F238E27FC236}">
+                <a16:creationId xmlns:a16="http://schemas.microsoft.com/office/drawing/2014/main" id="{484F8FEA-C495-402A-8FB3-F57A76F2BE67}"/>
+              </a:ext>
+            </a:extLst>
+          </p:cNvPr>
+          <p:cNvCxnSpPr>
+            <a:cxnSpLocks/>
+            <a:stCxn id="20" idx="2"/>
+          </p:cNvCxnSpPr>
+          <p:nvPr/>
+        </p:nvCxnSpPr>
+        <p:spPr>
+          <a:xfrm flipH="1">
+            <a:off x="5812113" y="1542740"/>
+            <a:ext cx="2804166" cy="214913"/>
+          </a:xfrm>
+          <a:prstGeom prst="straightConnector1">
+            <a:avLst/>
+          </a:prstGeom>
+          <a:ln w="38100">
+            <a:solidFill>
+              <a:schemeClr val="tx2">
+                <a:lumMod val="60000"/>
+                <a:lumOff val="40000"/>
+              </a:schemeClr>
+            </a:solidFill>
+            <a:headEnd type="none" w="med" len="med"/>
+            <a:tailEnd type="triangle"/>
+          </a:ln>
+        </p:spPr>
+        <p:style>
+          <a:lnRef idx="1">
+            <a:schemeClr val="accent1"/>
+          </a:lnRef>
+          <a:fillRef idx="0">
+            <a:schemeClr val="accent1"/>
+          </a:fillRef>
+          <a:effectRef idx="0">
+            <a:schemeClr val="accent1"/>
+          </a:effectRef>
+          <a:fontRef idx="minor">
+            <a:schemeClr val="tx1"/>
+          </a:fontRef>
+        </p:style>
+      </p:cxnSp>
+    </p:spTree>
+    <p:extLst>
+      <p:ext uri="{BB962C8B-B14F-4D97-AF65-F5344CB8AC3E}">
+        <p14:creationId xmlns:p14="http://schemas.microsoft.com/office/powerpoint/2010/main" val="4085581448"/>
+      </p:ext>
+    </p:extLst>
+  </p:cSld>
+  <p:clrMapOvr>
+    <a:masterClrMapping/>
+  </p:clrMapOvr>
+</p:sld>
+</file>
+
+<file path=ppt/slides/slide12.xml><?xml version="1.0" encoding="utf-8"?>
+<p:sld xmlns:a="http://schemas.openxmlformats.org/drawingml/2006/main" xmlns:r="http://schemas.openxmlformats.org/officeDocument/2006/relationships" xmlns:p="http://schemas.openxmlformats.org/presentationml/2006/main">
+  <p:cSld>
+    <p:spTree>
+      <p:nvGrpSpPr>
+        <p:cNvPr id="1" name=""/>
+        <p:cNvGrpSpPr/>
+        <p:nvPr/>
+      </p:nvGrpSpPr>
+      <p:grpSpPr>
+        <a:xfrm>
+          <a:off x="0" y="0"/>
+          <a:ext cx="0" cy="0"/>
+          <a:chOff x="0" y="0"/>
+          <a:chExt cx="0" cy="0"/>
+        </a:xfrm>
+      </p:grpSpPr>
+      <p:sp>
+        <p:nvSpPr>
+          <p:cNvPr id="3" name="Title 2"/>
+          <p:cNvSpPr>
+            <a:spLocks noGrp="1"/>
+          </p:cNvSpPr>
+          <p:nvPr>
+            <p:ph type="title"/>
+          </p:nvPr>
+        </p:nvSpPr>
+        <p:spPr/>
+        <p:txBody>
+          <a:bodyPr/>
+          <a:lstStyle/>
+          <a:p>
+            <a:r>
+              <a:rPr lang="en-US" dirty="0"/>
               <a:t>Node Management</a:t>
             </a:r>
           </a:p>
@@ -17759,7 +18987,7 @@
 </p:sld>
 </file>
 
-<file path=ppt/slides/slide12.xml><?xml version="1.0" encoding="utf-8"?>
+<file path=ppt/slides/slide13.xml><?xml version="1.0" encoding="utf-8"?>
 <p:sld xmlns:a="http://schemas.openxmlformats.org/drawingml/2006/main" xmlns:r="http://schemas.openxmlformats.org/officeDocument/2006/relationships" xmlns:p="http://schemas.openxmlformats.org/presentationml/2006/main">
   <p:cSld>
     <p:spTree>
@@ -18864,7 +20092,7 @@
 </p:sld>
 </file>
 
-<file path=ppt/slides/slide13.xml><?xml version="1.0" encoding="utf-8"?>
+<file path=ppt/slides/slide14.xml><?xml version="1.0" encoding="utf-8"?>
 <p:sld xmlns:a="http://schemas.openxmlformats.org/drawingml/2006/main" xmlns:r="http://schemas.openxmlformats.org/officeDocument/2006/relationships" xmlns:p="http://schemas.openxmlformats.org/presentationml/2006/main">
   <p:cSld>
     <p:spTree>
@@ -18996,7 +20224,7 @@
 </p:sld>
 </file>
 
-<file path=ppt/slides/slide14.xml><?xml version="1.0" encoding="utf-8"?>
+<file path=ppt/slides/slide15.xml><?xml version="1.0" encoding="utf-8"?>
 <p:sld xmlns:a="http://schemas.openxmlformats.org/drawingml/2006/main" xmlns:r="http://schemas.openxmlformats.org/officeDocument/2006/relationships" xmlns:p="http://schemas.openxmlformats.org/presentationml/2006/main">
   <p:cSld>
     <p:spTree>
@@ -19072,7 +20300,7 @@
 </p:sld>
 </file>
 
-<file path=ppt/slides/slide15.xml><?xml version="1.0" encoding="utf-8"?>
+<file path=ppt/slides/slide16.xml><?xml version="1.0" encoding="utf-8"?>
 <p:sld xmlns:a="http://schemas.openxmlformats.org/drawingml/2006/main" xmlns:r="http://schemas.openxmlformats.org/officeDocument/2006/relationships" xmlns:p="http://schemas.openxmlformats.org/presentationml/2006/main">
   <p:cSld>
     <p:spTree>
@@ -19644,7 +20872,7 @@
 </p:sld>
 </file>
 
-<file path=ppt/slides/slide16.xml><?xml version="1.0" encoding="utf-8"?>
+<file path=ppt/slides/slide17.xml><?xml version="1.0" encoding="utf-8"?>
 <p:sld xmlns:a="http://schemas.openxmlformats.org/drawingml/2006/main" xmlns:r="http://schemas.openxmlformats.org/officeDocument/2006/relationships" xmlns:p="http://schemas.openxmlformats.org/presentationml/2006/main" show="0">
   <p:cSld>
     <p:spTree>

</xml_diff>